<commit_message>
Deployed 54fff9c with MkDocs version: 1.5.3
</commit_message>
<xml_diff>
--- a/img/Carla.pptx
+++ b/img/Carla.pptx
@@ -5,45 +5,46 @@
     <p:sldMasterId id="2147483648" r:id="rId1"/>
   </p:sldMasterIdLst>
   <p:notesMasterIdLst>
-    <p:notesMasterId r:id="rId3"/>
+    <p:notesMasterId r:id="rId4"/>
   </p:notesMasterIdLst>
   <p:sldIdLst>
     <p:sldId id="289" r:id="rId2"/>
+    <p:sldId id="290" r:id="rId3"/>
   </p:sldIdLst>
   <p:sldSz cx="9144000" cy="5143500" type="screen16x9"/>
   <p:notesSz cx="9144000" cy="5143500"/>
   <p:embeddedFontLst>
     <p:embeddedFont>
       <p:font typeface="Muli Regular" panose="020B0604020202020204" charset="0"/>
-      <p:regular r:id="rId4"/>
-      <p:bold r:id="rId5"/>
-      <p:italic r:id="rId6"/>
-      <p:boldItalic r:id="rId7"/>
+      <p:regular r:id="rId5"/>
+      <p:bold r:id="rId6"/>
+      <p:italic r:id="rId7"/>
+      <p:boldItalic r:id="rId8"/>
+    </p:embeddedFont>
+    <p:embeddedFont>
+      <p:font typeface="宋体" panose="02010600030101010101" pitchFamily="2" charset="-122"/>
+      <p:regular r:id="rId9"/>
+    </p:embeddedFont>
+    <p:embeddedFont>
+      <p:font typeface="Muli" panose="020B0604020202020204" charset="0"/>
+      <p:regular r:id="rId10"/>
+      <p:bold r:id="rId11"/>
+      <p:italic r:id="rId12"/>
+      <p:boldItalic r:id="rId13"/>
     </p:embeddedFont>
     <p:embeddedFont>
       <p:font typeface="Economica" panose="020B0604020202020204" charset="0"/>
-      <p:regular r:id="rId8"/>
-      <p:bold r:id="rId9"/>
-      <p:italic r:id="rId10"/>
-      <p:boldItalic r:id="rId11"/>
-    </p:embeddedFont>
-    <p:embeddedFont>
-      <p:font typeface="宋体" panose="02010600030101010101" pitchFamily="2" charset="-122"/>
-      <p:regular r:id="rId12"/>
+      <p:regular r:id="rId14"/>
+      <p:bold r:id="rId15"/>
+      <p:italic r:id="rId16"/>
+      <p:boldItalic r:id="rId17"/>
     </p:embeddedFont>
     <p:embeddedFont>
       <p:font typeface="Open Sans" panose="020B0604020202020204" charset="0"/>
-      <p:regular r:id="rId13"/>
-      <p:bold r:id="rId14"/>
-      <p:italic r:id="rId15"/>
-      <p:boldItalic r:id="rId16"/>
-    </p:embeddedFont>
-    <p:embeddedFont>
-      <p:font typeface="Muli" panose="020B0604020202020204" charset="0"/>
-      <p:regular r:id="rId17"/>
-      <p:bold r:id="rId18"/>
-      <p:italic r:id="rId19"/>
-      <p:boldItalic r:id="rId20"/>
+      <p:regular r:id="rId18"/>
+      <p:bold r:id="rId19"/>
+      <p:italic r:id="rId20"/>
+      <p:boldItalic r:id="rId21"/>
     </p:embeddedFont>
   </p:embeddedFontLst>
   <p:defaultTextStyle>
@@ -291,7 +292,7 @@
       </p15:sldGuideLst>
     </p:ext>
     <p:ext uri="http://customooxmlschemas.google.com/">
-      <go:slidesCustomData xmlns="" xmlns:mc="http://schemas.openxmlformats.org/markup-compatibility/2006" xmlns:mv="urn:schemas-microsoft-com:mac:vml" xmlns:c="http://schemas.openxmlformats.org/drawingml/2006/chart" xmlns:dgm="http://schemas.openxmlformats.org/drawingml/2006/diagram" xmlns:o="urn:schemas-microsoft-com:office:office" xmlns:v="urn:schemas-microsoft-com:vml" xmlns:pvml="urn:schemas-microsoft-com:office:powerpoint" xmlns:com="http://schemas.openxmlformats.org/drawingml/2006/compatibility" xmlns:p14="http://schemas.microsoft.com/office/powerpoint/2010/main" xmlns:p15="http://schemas.microsoft.com/office/powerpoint/2012/main" xmlns:go="http://customooxmlschemas.google.com/" r:id="rId66" roundtripDataSignature="AMtx7mjk7ddpjVrAQkfiI2o1sWSlPxIqDQ=="/>
+      <go:slidesCustomData xmlns:go="http://customooxmlschemas.google.com/" xmlns:p15="http://schemas.microsoft.com/office/powerpoint/2012/main" xmlns:p14="http://schemas.microsoft.com/office/powerpoint/2010/main" xmlns:com="http://schemas.openxmlformats.org/drawingml/2006/compatibility" xmlns:pvml="urn:schemas-microsoft-com:office:powerpoint" xmlns:v="urn:schemas-microsoft-com:vml" xmlns:o="urn:schemas-microsoft-com:office:office" xmlns:dgm="http://schemas.openxmlformats.org/drawingml/2006/diagram" xmlns:c="http://schemas.openxmlformats.org/drawingml/2006/chart" xmlns:mv="urn:schemas-microsoft-com:mac:vml" xmlns:mc="http://schemas.openxmlformats.org/markup-compatibility/2006" xmlns="" r:id="rId66" roundtripDataSignature="AMtx7mjk7ddpjVrAQkfiI2o1sWSlPxIqDQ=="/>
     </p:ext>
   </p:extLst>
 </p:presentation>
@@ -934,60 +935,13 @@
               <a:buNone/>
             </a:pPr>
             <a:r>
-              <a:rPr lang="es-ES">
+              <a:rPr lang="en-US" smtClean="0">
                 <a:solidFill>
                   <a:srgbClr val="39373D"/>
                 </a:solidFill>
               </a:rPr>
-              <a:t>Since CARLA 0.9.7 the Traffic Manager has replaced the former server-side Autopilot, to offload some work from the server’s side to the client’s by exploiting the Waypoint API. Its main purpose is to improve the way cars roam around the towns, whilst giving users the option to customize their traffic like never before.</a:t>
+              <a:t>Traffic_Manager</a:t>
             </a:r>
-            <a:br>
-              <a:rPr lang="es-ES">
-                <a:solidFill>
-                  <a:srgbClr val="39373D"/>
-                </a:solidFill>
-              </a:rPr>
-            </a:br>
-            <a:r>
-              <a:rPr lang="es-ES">
-                <a:solidFill>
-                  <a:srgbClr val="39373D"/>
-                </a:solidFill>
-              </a:rPr>
-              <a:t/>
-            </a:r>
-            <a:br>
-              <a:rPr lang="es-ES">
-                <a:solidFill>
-                  <a:srgbClr val="39373D"/>
-                </a:solidFill>
-              </a:rPr>
-            </a:br>
-            <a:r>
-              <a:rPr lang="es-ES">
-                <a:solidFill>
-                  <a:srgbClr val="39373D"/>
-                </a:solidFill>
-              </a:rPr>
-              <a:t>It is currently being used for background traffic support, given that it can manage fleet of vehicles, and can be configured to implement different behaviors, such as keeping safety distance or execute lane changes.</a:t>
-            </a:r>
-            <a:endParaRPr>
-              <a:solidFill>
-                <a:srgbClr val="39373D"/>
-              </a:solidFill>
-            </a:endParaRPr>
-          </a:p>
-          <a:p>
-            <a:pPr marL="0" lvl="0" indent="0" algn="l" rtl="0">
-              <a:spcBef>
-                <a:spcPts val="1600"/>
-              </a:spcBef>
-              <a:spcAft>
-                <a:spcPts val="1600"/>
-              </a:spcAft>
-              <a:buSzPts val="1100"/>
-              <a:buNone/>
-            </a:pPr>
             <a:endParaRPr/>
           </a:p>
         </p:txBody>
@@ -1056,8 +1010,144 @@
 </p:notes>
 </file>
 
+<file path=ppt/notesSlides/notesSlide2.xml><?xml version="1.0" encoding="utf-8"?>
+<p:notes xmlns:a="http://schemas.openxmlformats.org/drawingml/2006/main" xmlns:r="http://schemas.openxmlformats.org/officeDocument/2006/relationships" xmlns:p="http://schemas.openxmlformats.org/presentationml/2006/main" showMasterSp="0" showMasterPhAnim="0">
+  <p:cSld>
+    <p:spTree>
+      <p:nvGrpSpPr>
+        <p:cNvPr id="1" name="Shape 88"/>
+        <p:cNvGrpSpPr/>
+        <p:nvPr/>
+      </p:nvGrpSpPr>
+      <p:grpSpPr>
+        <a:xfrm>
+          <a:off x="0" y="0"/>
+          <a:ext cx="0" cy="0"/>
+          <a:chOff x="0" y="0"/>
+          <a:chExt cx="0" cy="0"/>
+        </a:xfrm>
+      </p:grpSpPr>
+      <p:sp>
+        <p:nvSpPr>
+          <p:cNvPr id="89" name="Google Shape;89;g80294dfa11_0_4:notes"/>
+          <p:cNvSpPr txBox="1">
+            <a:spLocks noGrp="1"/>
+          </p:cNvSpPr>
+          <p:nvPr>
+            <p:ph type="body" idx="1"/>
+          </p:nvPr>
+        </p:nvSpPr>
+        <p:spPr>
+          <a:xfrm>
+            <a:off x="914400" y="2443150"/>
+            <a:ext cx="7315200" cy="2314500"/>
+          </a:xfrm>
+          <a:prstGeom prst="rect">
+            <a:avLst/>
+          </a:prstGeom>
+          <a:noFill/>
+          <a:ln>
+            <a:noFill/>
+          </a:ln>
+        </p:spPr>
+        <p:txBody>
+          <a:bodyPr spcFirstLastPara="1" wrap="square" lIns="91425" tIns="91425" rIns="91425" bIns="91425" anchor="t" anchorCtr="0">
+            <a:noAutofit/>
+          </a:bodyPr>
+          <a:lstStyle/>
+          <a:p>
+            <a:pPr marL="0" lvl="0" indent="0" algn="l" rtl="0">
+              <a:spcBef>
+                <a:spcPts val="0"/>
+              </a:spcBef>
+              <a:spcAft>
+                <a:spcPts val="0"/>
+              </a:spcAft>
+              <a:buClr>
+                <a:schemeClr val="dk1"/>
+              </a:buClr>
+              <a:buSzPts val="1100"/>
+              <a:buFont typeface="Arial"/>
+              <a:buNone/>
+            </a:pPr>
+            <a:r>
+              <a:rPr lang="en-US" smtClean="0">
+                <a:solidFill>
+                  <a:srgbClr val="39373D"/>
+                </a:solidFill>
+              </a:rPr>
+              <a:t>build_modules</a:t>
+            </a:r>
+            <a:endParaRPr/>
+          </a:p>
+        </p:txBody>
+      </p:sp>
+      <p:sp>
+        <p:nvSpPr>
+          <p:cNvPr id="90" name="Google Shape;90;g80294dfa11_0_4:notes"/>
+          <p:cNvSpPr>
+            <a:spLocks noGrp="1" noRot="1" noChangeAspect="1"/>
+          </p:cNvSpPr>
+          <p:nvPr>
+            <p:ph type="sldImg" idx="2"/>
+          </p:nvPr>
+        </p:nvSpPr>
+        <p:spPr>
+          <a:xfrm>
+            <a:off x="2857500" y="385763"/>
+            <a:ext cx="3429000" cy="1928812"/>
+          </a:xfrm>
+          <a:custGeom>
+            <a:avLst/>
+            <a:gdLst/>
+            <a:ahLst/>
+            <a:cxnLst/>
+            <a:rect l="l" t="t" r="r" b="b"/>
+            <a:pathLst>
+              <a:path w="120000" h="120000" extrusionOk="0">
+                <a:moveTo>
+                  <a:pt x="0" y="0"/>
+                </a:moveTo>
+                <a:lnTo>
+                  <a:pt x="120000" y="0"/>
+                </a:lnTo>
+                <a:lnTo>
+                  <a:pt x="120000" y="120000"/>
+                </a:lnTo>
+                <a:lnTo>
+                  <a:pt x="0" y="120000"/>
+                </a:lnTo>
+                <a:close/>
+              </a:path>
+            </a:pathLst>
+          </a:custGeom>
+          <a:noFill/>
+          <a:ln w="9525" cap="flat" cmpd="sng">
+            <a:solidFill>
+              <a:srgbClr val="000000"/>
+            </a:solidFill>
+            <a:prstDash val="solid"/>
+            <a:round/>
+            <a:headEnd type="none" w="sm" len="sm"/>
+            <a:tailEnd type="none" w="sm" len="sm"/>
+          </a:ln>
+        </p:spPr>
+      </p:sp>
+    </p:spTree>
+    <p:extLst>
+      <p:ext uri="{BB962C8B-B14F-4D97-AF65-F5344CB8AC3E}">
+        <p14:creationId xmlns:p14="http://schemas.microsoft.com/office/powerpoint/2010/main" val="2206606658"/>
+      </p:ext>
+    </p:extLst>
+  </p:cSld>
+  <p:clrMapOvr>
+    <a:masterClrMapping/>
+  </p:clrMapOvr>
+</p:notes>
+</file>
+
 <file path=ppt/slideLayouts/slideLayout1.xml><?xml version="1.0" encoding="utf-8"?>
-<p:sldLayout xmlns:a="http://schemas.openxmlformats.org/drawingml/2006/main" xmlns:r="http://schemas.openxmlformats.org/officeDocument/2006/relationships" xmlns:p="http://schemas.openxmlformats.org/presentationml/2006/main" matchingName="Title and Content" type="obj">
+<p:sldLayout xmlns:a="http://schemas.openxmlformats.org/drawingml/2006/main" xmlns:r="http://schemas.openxmlformats.org/officeDocument/2006/relationships" xmlns:p="http://schemas.openxmlformats.org/presentationml/2006/main" showMasterSp="0" matchingName="Title and Content" type="obj">
   <p:cSld name="OBJECT">
     <p:spTree>
       <p:nvGrpSpPr>
@@ -1357,13 +1447,20 @@
     </p:spTree>
   </p:cSld>
   <p:clrMapOvr>
-    <a:masterClrMapping/>
+    <a:overrideClrMapping bg1="lt1" tx1="dk1" bg2="lt2" tx2="dk2" accent1="accent1" accent2="accent2" accent3="accent3" accent4="accent4" accent5="accent5" accent6="accent6" hlink="hlink" folHlink="folHlink"/>
   </p:clrMapOvr>
+  <p:timing>
+    <p:tnLst>
+      <p:par>
+        <p:cTn id="1" dur="indefinite" restart="never" nodeType="tmRoot"/>
+      </p:par>
+    </p:tnLst>
+  </p:timing>
 </p:sldLayout>
 </file>
 
 <file path=ppt/slideLayouts/slideLayout10.xml><?xml version="1.0" encoding="utf-8"?>
-<p:sldLayout xmlns:a="http://schemas.openxmlformats.org/drawingml/2006/main" xmlns:r="http://schemas.openxmlformats.org/officeDocument/2006/relationships" xmlns:p="http://schemas.openxmlformats.org/presentationml/2006/main" matchingName="Caption">
+<p:sldLayout xmlns:a="http://schemas.openxmlformats.org/drawingml/2006/main" xmlns:r="http://schemas.openxmlformats.org/officeDocument/2006/relationships" xmlns:p="http://schemas.openxmlformats.org/presentationml/2006/main" showMasterSp="0" matchingName="Caption">
   <p:cSld name="CAPTION_ONLY">
     <p:spTree>
       <p:nvGrpSpPr>
@@ -1723,7 +1820,7 @@
 </file>
 
 <file path=ppt/slideLayouts/slideLayout11.xml><?xml version="1.0" encoding="utf-8"?>
-<p:sldLayout xmlns:a="http://schemas.openxmlformats.org/drawingml/2006/main" xmlns:r="http://schemas.openxmlformats.org/officeDocument/2006/relationships" xmlns:p="http://schemas.openxmlformats.org/presentationml/2006/main" matchingName="Big number">
+<p:sldLayout xmlns:a="http://schemas.openxmlformats.org/drawingml/2006/main" xmlns:r="http://schemas.openxmlformats.org/officeDocument/2006/relationships" xmlns:p="http://schemas.openxmlformats.org/presentationml/2006/main" showMasterSp="0" matchingName="Big number">
   <p:cSld name="BIG_NUMBER">
     <p:spTree>
       <p:nvGrpSpPr>
@@ -2470,7 +2567,7 @@
 </file>
 
 <file path=ppt/slideLayouts/slideLayout12.xml><?xml version="1.0" encoding="utf-8"?>
-<p:sldLayout xmlns:a="http://schemas.openxmlformats.org/drawingml/2006/main" xmlns:r="http://schemas.openxmlformats.org/officeDocument/2006/relationships" xmlns:p="http://schemas.openxmlformats.org/presentationml/2006/main" matchingName="Blank" type="blank">
+<p:sldLayout xmlns:a="http://schemas.openxmlformats.org/drawingml/2006/main" xmlns:r="http://schemas.openxmlformats.org/officeDocument/2006/relationships" xmlns:p="http://schemas.openxmlformats.org/presentationml/2006/main" showMasterSp="0" matchingName="Blank" type="blank">
   <p:cSld name="BLANK">
     <p:spTree>
       <p:nvGrpSpPr>
@@ -2776,7 +2873,7 @@
 </file>
 
 <file path=ppt/slideLayouts/slideLayout2.xml><?xml version="1.0" encoding="utf-8"?>
-<p:sldLayout xmlns:a="http://schemas.openxmlformats.org/drawingml/2006/main" xmlns:r="http://schemas.openxmlformats.org/officeDocument/2006/relationships" xmlns:p="http://schemas.openxmlformats.org/presentationml/2006/main" matchingName="Title slide" type="title">
+<p:sldLayout xmlns:a="http://schemas.openxmlformats.org/drawingml/2006/main" xmlns:r="http://schemas.openxmlformats.org/officeDocument/2006/relationships" xmlns:p="http://schemas.openxmlformats.org/presentationml/2006/main" showMasterSp="0" matchingName="Title slide" type="title">
   <p:cSld name="TITLE">
     <p:spTree>
       <p:nvGrpSpPr>
@@ -3538,11 +3635,18 @@
   <p:clrMapOvr>
     <a:masterClrMapping/>
   </p:clrMapOvr>
+  <p:timing>
+    <p:tnLst>
+      <p:par>
+        <p:cTn id="1" dur="indefinite" restart="never" nodeType="tmRoot"/>
+      </p:par>
+    </p:tnLst>
+  </p:timing>
 </p:sldLayout>
 </file>
 
 <file path=ppt/slideLayouts/slideLayout3.xml><?xml version="1.0" encoding="utf-8"?>
-<p:sldLayout xmlns:a="http://schemas.openxmlformats.org/drawingml/2006/main" xmlns:r="http://schemas.openxmlformats.org/officeDocument/2006/relationships" xmlns:p="http://schemas.openxmlformats.org/presentationml/2006/main" matchingName="Section header" type="secHead">
+<p:sldLayout xmlns:a="http://schemas.openxmlformats.org/drawingml/2006/main" xmlns:r="http://schemas.openxmlformats.org/officeDocument/2006/relationships" xmlns:p="http://schemas.openxmlformats.org/presentationml/2006/main" showMasterSp="0" matchingName="Section header" type="secHead">
   <p:cSld name="SECTION_HEADER">
     <p:spTree>
       <p:nvGrpSpPr>
@@ -4090,11 +4194,18 @@
   <p:clrMapOvr>
     <a:masterClrMapping/>
   </p:clrMapOvr>
+  <p:timing>
+    <p:tnLst>
+      <p:par>
+        <p:cTn id="1" dur="indefinite" restart="never" nodeType="tmRoot"/>
+      </p:par>
+    </p:tnLst>
+  </p:timing>
 </p:sldLayout>
 </file>
 
 <file path=ppt/slideLayouts/slideLayout4.xml><?xml version="1.0" encoding="utf-8"?>
-<p:sldLayout xmlns:a="http://schemas.openxmlformats.org/drawingml/2006/main" xmlns:r="http://schemas.openxmlformats.org/officeDocument/2006/relationships" xmlns:p="http://schemas.openxmlformats.org/presentationml/2006/main" matchingName="Title and body" type="tx">
+<p:sldLayout xmlns:a="http://schemas.openxmlformats.org/drawingml/2006/main" xmlns:r="http://schemas.openxmlformats.org/officeDocument/2006/relationships" xmlns:p="http://schemas.openxmlformats.org/presentationml/2006/main" showMasterSp="0" matchingName="Title and body" type="tx">
   <p:cSld name="TITLE_AND_BODY">
     <p:spTree>
       <p:nvGrpSpPr>
@@ -4776,7 +4887,7 @@
 </file>
 
 <file path=ppt/slideLayouts/slideLayout5.xml><?xml version="1.0" encoding="utf-8"?>
-<p:sldLayout xmlns:a="http://schemas.openxmlformats.org/drawingml/2006/main" xmlns:r="http://schemas.openxmlformats.org/officeDocument/2006/relationships" xmlns:p="http://schemas.openxmlformats.org/presentationml/2006/main" matchingName="Title and two columns" type="twoColTx">
+<p:sldLayout xmlns:a="http://schemas.openxmlformats.org/drawingml/2006/main" xmlns:r="http://schemas.openxmlformats.org/officeDocument/2006/relationships" xmlns:p="http://schemas.openxmlformats.org/presentationml/2006/main" showMasterSp="0" matchingName="Title and two columns" type="twoColTx">
   <p:cSld name="TITLE_AND_TWO_COLUMNS">
     <p:spTree>
       <p:nvGrpSpPr>
@@ -5562,7 +5673,7 @@
 </file>
 
 <file path=ppt/slideLayouts/slideLayout6.xml><?xml version="1.0" encoding="utf-8"?>
-<p:sldLayout xmlns:a="http://schemas.openxmlformats.org/drawingml/2006/main" xmlns:r="http://schemas.openxmlformats.org/officeDocument/2006/relationships" xmlns:p="http://schemas.openxmlformats.org/presentationml/2006/main" matchingName="Title only" type="titleOnly">
+<p:sldLayout xmlns:a="http://schemas.openxmlformats.org/drawingml/2006/main" xmlns:r="http://schemas.openxmlformats.org/officeDocument/2006/relationships" xmlns:p="http://schemas.openxmlformats.org/presentationml/2006/main" showMasterSp="0" matchingName="Title only" type="titleOnly">
   <p:cSld name="TITLE_ONLY">
     <p:spTree>
       <p:nvGrpSpPr>
@@ -6028,7 +6139,7 @@
 </file>
 
 <file path=ppt/slideLayouts/slideLayout7.xml><?xml version="1.0" encoding="utf-8"?>
-<p:sldLayout xmlns:a="http://schemas.openxmlformats.org/drawingml/2006/main" xmlns:r="http://schemas.openxmlformats.org/officeDocument/2006/relationships" xmlns:p="http://schemas.openxmlformats.org/presentationml/2006/main" matchingName="One column text">
+<p:sldLayout xmlns:a="http://schemas.openxmlformats.org/drawingml/2006/main" xmlns:r="http://schemas.openxmlformats.org/officeDocument/2006/relationships" xmlns:p="http://schemas.openxmlformats.org/presentationml/2006/main" showMasterSp="0" matchingName="One column text">
   <p:cSld name="ONE_COLUMN_TEXT">
     <p:spTree>
       <p:nvGrpSpPr>
@@ -6654,7 +6765,7 @@
 </file>
 
 <file path=ppt/slideLayouts/slideLayout8.xml><?xml version="1.0" encoding="utf-8"?>
-<p:sldLayout xmlns:a="http://schemas.openxmlformats.org/drawingml/2006/main" xmlns:r="http://schemas.openxmlformats.org/officeDocument/2006/relationships" xmlns:p="http://schemas.openxmlformats.org/presentationml/2006/main" matchingName="Main point">
+<p:sldLayout xmlns:a="http://schemas.openxmlformats.org/drawingml/2006/main" xmlns:r="http://schemas.openxmlformats.org/officeDocument/2006/relationships" xmlns:p="http://schemas.openxmlformats.org/presentationml/2006/main" showMasterSp="0" matchingName="Main point">
   <p:cSld name="MAIN_POINT">
     <p:spTree>
       <p:nvGrpSpPr>
@@ -7176,7 +7287,7 @@
 </file>
 
 <file path=ppt/slideLayouts/slideLayout9.xml><?xml version="1.0" encoding="utf-8"?>
-<p:sldLayout xmlns:a="http://schemas.openxmlformats.org/drawingml/2006/main" xmlns:r="http://schemas.openxmlformats.org/officeDocument/2006/relationships" xmlns:p="http://schemas.openxmlformats.org/presentationml/2006/main" matchingName="Section title and description">
+<p:sldLayout xmlns:a="http://schemas.openxmlformats.org/drawingml/2006/main" xmlns:r="http://schemas.openxmlformats.org/officeDocument/2006/relationships" xmlns:p="http://schemas.openxmlformats.org/presentationml/2006/main" showMasterSp="0" matchingName="Section title and description">
   <p:cSld name="SECTION_TITLE_AND_DESCRIPTION">
     <p:spTree>
       <p:nvGrpSpPr>
@@ -8228,14 +8339,9 @@
   <p:cSld name="luxe">
     <p:bg>
       <p:bgPr>
-        <a:blipFill>
-          <a:blip r:embed="rId14">
-            <a:alphaModFix/>
-          </a:blip>
-          <a:stretch>
-            <a:fillRect/>
-          </a:stretch>
-        </a:blipFill>
+        <a:solidFill>
+          <a:schemeClr val="bg1"/>
+        </a:solidFill>
         <a:effectLst/>
       </p:bgPr>
     </p:bg>
@@ -9781,16 +9887,8 @@
 </file>
 
 <file path=ppt/slides/slide1.xml><?xml version="1.0" encoding="utf-8"?>
-<p:sld xmlns:a="http://schemas.openxmlformats.org/drawingml/2006/main" xmlns:r="http://schemas.openxmlformats.org/officeDocument/2006/relationships" xmlns:p="http://schemas.openxmlformats.org/presentationml/2006/main">
+<p:sld xmlns:a="http://schemas.openxmlformats.org/drawingml/2006/main" xmlns:r="http://schemas.openxmlformats.org/officeDocument/2006/relationships" xmlns:p="http://schemas.openxmlformats.org/presentationml/2006/main" showMasterSp="0">
   <p:cSld>
-    <p:bg>
-      <p:bgPr>
-        <a:solidFill>
-          <a:schemeClr val="bg1"/>
-        </a:solidFill>
-        <a:effectLst/>
-      </p:bgPr>
-    </p:bg>
     <p:spTree>
       <p:nvGrpSpPr>
         <p:cNvPr id="1" name="Shape 91"/>
@@ -11877,6 +11975,1327 @@
     <p:extLst>
       <p:ext uri="{BB962C8B-B14F-4D97-AF65-F5344CB8AC3E}">
         <p14:creationId xmlns:p14="http://schemas.microsoft.com/office/powerpoint/2010/main" val="1186428309"/>
+      </p:ext>
+    </p:extLst>
+  </p:cSld>
+  <p:clrMapOvr>
+    <a:masterClrMapping/>
+  </p:clrMapOvr>
+  <p:timing>
+    <p:tnLst>
+      <p:par>
+        <p:cTn id="1" dur="indefinite" restart="never" nodeType="tmRoot"/>
+      </p:par>
+    </p:tnLst>
+  </p:timing>
+</p:sld>
+</file>
+
+<file path=ppt/slides/slide2.xml><?xml version="1.0" encoding="utf-8"?>
+<p:sld xmlns:a="http://schemas.openxmlformats.org/drawingml/2006/main" xmlns:r="http://schemas.openxmlformats.org/officeDocument/2006/relationships" xmlns:p="http://schemas.openxmlformats.org/presentationml/2006/main" showMasterSp="0">
+  <p:cSld>
+    <p:spTree>
+      <p:nvGrpSpPr>
+        <p:cNvPr id="1" name="Shape 91"/>
+        <p:cNvGrpSpPr/>
+        <p:nvPr/>
+      </p:nvGrpSpPr>
+      <p:grpSpPr>
+        <a:xfrm>
+          <a:off x="0" y="0"/>
+          <a:ext cx="0" cy="0"/>
+          <a:chOff x="0" y="0"/>
+          <a:chExt cx="0" cy="0"/>
+        </a:xfrm>
+      </p:grpSpPr>
+      <p:sp>
+        <p:nvSpPr>
+          <p:cNvPr id="8" name="矩形 7"/>
+          <p:cNvSpPr/>
+          <p:nvPr/>
+        </p:nvSpPr>
+        <p:spPr>
+          <a:xfrm>
+            <a:off x="335661" y="416689"/>
+            <a:ext cx="4294208" cy="3703898"/>
+          </a:xfrm>
+          <a:prstGeom prst="rect">
+            <a:avLst/>
+          </a:prstGeom>
+          <a:noFill/>
+          <a:ln>
+            <a:prstDash val="sysDot"/>
+          </a:ln>
+        </p:spPr>
+        <p:style>
+          <a:lnRef idx="2">
+            <a:schemeClr val="accent1">
+              <a:shade val="50000"/>
+            </a:schemeClr>
+          </a:lnRef>
+          <a:fillRef idx="1">
+            <a:schemeClr val="accent1"/>
+          </a:fillRef>
+          <a:effectRef idx="0">
+            <a:schemeClr val="accent1"/>
+          </a:effectRef>
+          <a:fontRef idx="minor">
+            <a:schemeClr val="lt1"/>
+          </a:fontRef>
+        </p:style>
+        <p:txBody>
+          <a:bodyPr rtlCol="0" anchor="ctr"/>
+          <a:lstStyle/>
+          <a:p>
+            <a:pPr algn="ctr"/>
+            <a:endParaRPr lang="zh-CN" altLang="en-US"/>
+          </a:p>
+        </p:txBody>
+      </p:sp>
+      <p:sp>
+        <p:nvSpPr>
+          <p:cNvPr id="2" name="圆角矩形 1"/>
+          <p:cNvSpPr/>
+          <p:nvPr/>
+        </p:nvSpPr>
+        <p:spPr>
+          <a:xfrm>
+            <a:off x="462983" y="729206"/>
+            <a:ext cx="1388962" cy="567159"/>
+          </a:xfrm>
+          <a:prstGeom prst="roundRect">
+            <a:avLst/>
+          </a:prstGeom>
+          <a:solidFill>
+            <a:srgbClr val="92D050"/>
+          </a:solidFill>
+        </p:spPr>
+        <p:style>
+          <a:lnRef idx="2">
+            <a:schemeClr val="accent1">
+              <a:shade val="50000"/>
+            </a:schemeClr>
+          </a:lnRef>
+          <a:fillRef idx="1">
+            <a:schemeClr val="accent1"/>
+          </a:fillRef>
+          <a:effectRef idx="0">
+            <a:schemeClr val="accent1"/>
+          </a:effectRef>
+          <a:fontRef idx="minor">
+            <a:schemeClr val="lt1"/>
+          </a:fontRef>
+        </p:style>
+        <p:txBody>
+          <a:bodyPr rtlCol="0" anchor="ctr"/>
+          <a:lstStyle/>
+          <a:p>
+            <a:pPr algn="ctr"/>
+            <a:r>
+              <a:rPr lang="en-US" altLang="zh-CN" b="1">
+                <a:solidFill>
+                  <a:schemeClr val="tx1"/>
+                </a:solidFill>
+              </a:rPr>
+              <a:t>Python </a:t>
+            </a:r>
+            <a:r>
+              <a:rPr lang="zh-CN" altLang="en-US" b="1">
+                <a:solidFill>
+                  <a:schemeClr val="tx1"/>
+                </a:solidFill>
+              </a:rPr>
+              <a:t>脚本</a:t>
+            </a:r>
+            <a:endParaRPr lang="zh-CN" altLang="en-US" b="1">
+              <a:solidFill>
+                <a:schemeClr val="tx1"/>
+              </a:solidFill>
+            </a:endParaRPr>
+          </a:p>
+        </p:txBody>
+      </p:sp>
+      <p:sp>
+        <p:nvSpPr>
+          <p:cNvPr id="50" name="圆角矩形 49"/>
+          <p:cNvSpPr/>
+          <p:nvPr/>
+        </p:nvSpPr>
+        <p:spPr>
+          <a:xfrm>
+            <a:off x="2802998" y="729206"/>
+            <a:ext cx="1388962" cy="567159"/>
+          </a:xfrm>
+          <a:prstGeom prst="roundRect">
+            <a:avLst/>
+          </a:prstGeom>
+          <a:solidFill>
+            <a:srgbClr val="92D050"/>
+          </a:solidFill>
+        </p:spPr>
+        <p:style>
+          <a:lnRef idx="2">
+            <a:schemeClr val="accent1">
+              <a:shade val="50000"/>
+            </a:schemeClr>
+          </a:lnRef>
+          <a:fillRef idx="1">
+            <a:schemeClr val="accent1"/>
+          </a:fillRef>
+          <a:effectRef idx="0">
+            <a:schemeClr val="accent1"/>
+          </a:effectRef>
+          <a:fontRef idx="minor">
+            <a:schemeClr val="lt1"/>
+          </a:fontRef>
+        </p:style>
+        <p:txBody>
+          <a:bodyPr rtlCol="0" anchor="ctr"/>
+          <a:lstStyle/>
+          <a:p>
+            <a:pPr algn="ctr"/>
+            <a:r>
+              <a:rPr lang="en-US" altLang="zh-CN" b="1" smtClean="0">
+                <a:solidFill>
+                  <a:schemeClr val="tx1"/>
+                </a:solidFill>
+              </a:rPr>
+              <a:t>Carla</a:t>
+            </a:r>
+            <a:endParaRPr lang="zh-CN" altLang="en-US" b="1">
+              <a:solidFill>
+                <a:schemeClr val="tx1"/>
+              </a:solidFill>
+            </a:endParaRPr>
+          </a:p>
+        </p:txBody>
+      </p:sp>
+      <p:cxnSp>
+        <p:nvCxnSpPr>
+          <p:cNvPr id="6" name="直接箭头连接符 5"/>
+          <p:cNvCxnSpPr>
+            <a:stCxn id="2" idx="3"/>
+            <a:endCxn id="50" idx="1"/>
+          </p:cNvCxnSpPr>
+          <p:nvPr/>
+        </p:nvCxnSpPr>
+        <p:spPr>
+          <a:xfrm>
+            <a:off x="1851945" y="1012786"/>
+            <a:ext cx="951053" cy="0"/>
+          </a:xfrm>
+          <a:prstGeom prst="straightConnector1">
+            <a:avLst/>
+          </a:prstGeom>
+          <a:ln w="19050">
+            <a:headEnd type="triangle"/>
+            <a:tailEnd type="triangle"/>
+          </a:ln>
+        </p:spPr>
+        <p:style>
+          <a:lnRef idx="1">
+            <a:schemeClr val="accent1"/>
+          </a:lnRef>
+          <a:fillRef idx="0">
+            <a:schemeClr val="accent1"/>
+          </a:fillRef>
+          <a:effectRef idx="0">
+            <a:schemeClr val="accent1"/>
+          </a:effectRef>
+          <a:fontRef idx="minor">
+            <a:schemeClr val="tx1"/>
+          </a:fontRef>
+        </p:style>
+      </p:cxnSp>
+      <p:sp>
+        <p:nvSpPr>
+          <p:cNvPr id="53" name="矩形 52"/>
+          <p:cNvSpPr/>
+          <p:nvPr/>
+        </p:nvSpPr>
+        <p:spPr>
+          <a:xfrm>
+            <a:off x="1920275" y="780817"/>
+            <a:ext cx="814392" cy="156735"/>
+          </a:xfrm>
+          <a:prstGeom prst="rect">
+            <a:avLst/>
+          </a:prstGeom>
+          <a:solidFill>
+            <a:schemeClr val="bg1"/>
+          </a:solidFill>
+          <a:ln>
+            <a:noFill/>
+          </a:ln>
+        </p:spPr>
+        <p:style>
+          <a:lnRef idx="2">
+            <a:schemeClr val="accent1">
+              <a:shade val="50000"/>
+            </a:schemeClr>
+          </a:lnRef>
+          <a:fillRef idx="1">
+            <a:schemeClr val="accent1"/>
+          </a:fillRef>
+          <a:effectRef idx="0">
+            <a:schemeClr val="accent1"/>
+          </a:effectRef>
+          <a:fontRef idx="minor">
+            <a:schemeClr val="lt1"/>
+          </a:fontRef>
+        </p:style>
+        <p:txBody>
+          <a:bodyPr rtlCol="0" anchor="ctr"/>
+          <a:lstStyle/>
+          <a:p>
+            <a:pPr algn="ctr"/>
+            <a:r>
+              <a:rPr lang="zh-CN" altLang="en-US" sz="1200" b="1" smtClean="0">
+                <a:solidFill>
+                  <a:schemeClr val="tx1"/>
+                </a:solidFill>
+              </a:rPr>
+              <a:t>导入</a:t>
+            </a:r>
+            <a:endParaRPr lang="zh-CN" altLang="en-US" sz="1200" b="1">
+              <a:solidFill>
+                <a:schemeClr val="tx1"/>
+              </a:solidFill>
+            </a:endParaRPr>
+          </a:p>
+        </p:txBody>
+      </p:sp>
+      <p:sp>
+        <p:nvSpPr>
+          <p:cNvPr id="54" name="圆角矩形 53"/>
+          <p:cNvSpPr/>
+          <p:nvPr/>
+        </p:nvSpPr>
+        <p:spPr>
+          <a:xfrm>
+            <a:off x="2723092" y="1684120"/>
+            <a:ext cx="1560653" cy="434047"/>
+          </a:xfrm>
+          <a:prstGeom prst="roundRect">
+            <a:avLst/>
+          </a:prstGeom>
+          <a:solidFill>
+            <a:schemeClr val="accent4">
+              <a:lumMod val="60000"/>
+              <a:lumOff val="40000"/>
+            </a:schemeClr>
+          </a:solidFill>
+        </p:spPr>
+        <p:style>
+          <a:lnRef idx="2">
+            <a:schemeClr val="accent1">
+              <a:shade val="50000"/>
+            </a:schemeClr>
+          </a:lnRef>
+          <a:fillRef idx="1">
+            <a:schemeClr val="accent1"/>
+          </a:fillRef>
+          <a:effectRef idx="0">
+            <a:schemeClr val="accent1"/>
+          </a:effectRef>
+          <a:fontRef idx="minor">
+            <a:schemeClr val="lt1"/>
+          </a:fontRef>
+        </p:style>
+        <p:txBody>
+          <a:bodyPr rtlCol="0" anchor="ctr"/>
+          <a:lstStyle/>
+          <a:p>
+            <a:pPr algn="ctr"/>
+            <a:r>
+              <a:rPr lang="en-US" altLang="zh-CN" b="1">
+                <a:solidFill>
+                  <a:schemeClr val="tx1"/>
+                </a:solidFill>
+              </a:rPr>
+              <a:t>b</a:t>
+            </a:r>
+            <a:r>
+              <a:rPr lang="en-US" altLang="zh-CN" b="1" smtClean="0">
+                <a:solidFill>
+                  <a:schemeClr val="tx1"/>
+                </a:solidFill>
+              </a:rPr>
+              <a:t>oost:python</a:t>
+            </a:r>
+            <a:endParaRPr lang="zh-CN" altLang="en-US" b="1">
+              <a:solidFill>
+                <a:schemeClr val="tx1"/>
+              </a:solidFill>
+            </a:endParaRPr>
+          </a:p>
+        </p:txBody>
+      </p:sp>
+      <p:sp>
+        <p:nvSpPr>
+          <p:cNvPr id="56" name="圆角矩形 55"/>
+          <p:cNvSpPr/>
+          <p:nvPr/>
+        </p:nvSpPr>
+        <p:spPr>
+          <a:xfrm>
+            <a:off x="2728727" y="2505922"/>
+            <a:ext cx="1560653" cy="434047"/>
+          </a:xfrm>
+          <a:prstGeom prst="roundRect">
+            <a:avLst/>
+          </a:prstGeom>
+          <a:solidFill>
+            <a:schemeClr val="accent4">
+              <a:lumMod val="60000"/>
+              <a:lumOff val="40000"/>
+            </a:schemeClr>
+          </a:solidFill>
+        </p:spPr>
+        <p:style>
+          <a:lnRef idx="2">
+            <a:schemeClr val="accent1">
+              <a:shade val="50000"/>
+            </a:schemeClr>
+          </a:lnRef>
+          <a:fillRef idx="1">
+            <a:schemeClr val="accent1"/>
+          </a:fillRef>
+          <a:effectRef idx="0">
+            <a:schemeClr val="accent1"/>
+          </a:effectRef>
+          <a:fontRef idx="minor">
+            <a:schemeClr val="lt1"/>
+          </a:fontRef>
+        </p:style>
+        <p:txBody>
+          <a:bodyPr rtlCol="0" anchor="ctr"/>
+          <a:lstStyle/>
+          <a:p>
+            <a:pPr algn="ctr"/>
+            <a:r>
+              <a:rPr lang="en-US" altLang="zh-CN" b="1">
+                <a:solidFill>
+                  <a:schemeClr val="tx1"/>
+                </a:solidFill>
+              </a:rPr>
+              <a:t>l</a:t>
+            </a:r>
+            <a:r>
+              <a:rPr lang="en-US" altLang="zh-CN" b="1" smtClean="0">
+                <a:solidFill>
+                  <a:schemeClr val="tx1"/>
+                </a:solidFill>
+              </a:rPr>
+              <a:t>ibcarla </a:t>
+            </a:r>
+            <a:r>
+              <a:rPr lang="zh-CN" altLang="en-US" b="1" smtClean="0">
+                <a:solidFill>
+                  <a:schemeClr val="tx1"/>
+                </a:solidFill>
+              </a:rPr>
+              <a:t>客户端</a:t>
+            </a:r>
+            <a:endParaRPr lang="zh-CN" altLang="en-US" b="1">
+              <a:solidFill>
+                <a:schemeClr val="tx1"/>
+              </a:solidFill>
+            </a:endParaRPr>
+          </a:p>
+        </p:txBody>
+      </p:sp>
+      <p:sp>
+        <p:nvSpPr>
+          <p:cNvPr id="58" name="圆角矩形 57"/>
+          <p:cNvSpPr/>
+          <p:nvPr/>
+        </p:nvSpPr>
+        <p:spPr>
+          <a:xfrm>
+            <a:off x="2723092" y="3327724"/>
+            <a:ext cx="1560653" cy="434047"/>
+          </a:xfrm>
+          <a:prstGeom prst="roundRect">
+            <a:avLst/>
+          </a:prstGeom>
+          <a:solidFill>
+            <a:schemeClr val="accent4">
+              <a:lumMod val="60000"/>
+              <a:lumOff val="40000"/>
+            </a:schemeClr>
+          </a:solidFill>
+        </p:spPr>
+        <p:style>
+          <a:lnRef idx="2">
+            <a:schemeClr val="accent1">
+              <a:shade val="50000"/>
+            </a:schemeClr>
+          </a:lnRef>
+          <a:fillRef idx="1">
+            <a:schemeClr val="accent1"/>
+          </a:fillRef>
+          <a:effectRef idx="0">
+            <a:schemeClr val="accent1"/>
+          </a:effectRef>
+          <a:fontRef idx="minor">
+            <a:schemeClr val="lt1"/>
+          </a:fontRef>
+        </p:style>
+        <p:txBody>
+          <a:bodyPr rtlCol="0" anchor="ctr"/>
+          <a:lstStyle/>
+          <a:p>
+            <a:pPr algn="ctr"/>
+            <a:r>
+              <a:rPr lang="en-US" altLang="zh-CN" b="1" smtClean="0">
+                <a:solidFill>
+                  <a:schemeClr val="tx1"/>
+                </a:solidFill>
+              </a:rPr>
+              <a:t>rpc:client</a:t>
+            </a:r>
+            <a:endParaRPr lang="zh-CN" altLang="en-US" b="1">
+              <a:solidFill>
+                <a:schemeClr val="tx1"/>
+              </a:solidFill>
+            </a:endParaRPr>
+          </a:p>
+        </p:txBody>
+      </p:sp>
+      <p:sp>
+        <p:nvSpPr>
+          <p:cNvPr id="60" name="圆角矩形 59"/>
+          <p:cNvSpPr/>
+          <p:nvPr/>
+        </p:nvSpPr>
+        <p:spPr>
+          <a:xfrm>
+            <a:off x="5583968" y="3327723"/>
+            <a:ext cx="1560653" cy="434047"/>
+          </a:xfrm>
+          <a:prstGeom prst="roundRect">
+            <a:avLst/>
+          </a:prstGeom>
+          <a:solidFill>
+            <a:schemeClr val="accent4">
+              <a:lumMod val="60000"/>
+              <a:lumOff val="40000"/>
+            </a:schemeClr>
+          </a:solidFill>
+        </p:spPr>
+        <p:style>
+          <a:lnRef idx="2">
+            <a:schemeClr val="accent1">
+              <a:shade val="50000"/>
+            </a:schemeClr>
+          </a:lnRef>
+          <a:fillRef idx="1">
+            <a:schemeClr val="accent1"/>
+          </a:fillRef>
+          <a:effectRef idx="0">
+            <a:schemeClr val="accent1"/>
+          </a:effectRef>
+          <a:fontRef idx="minor">
+            <a:schemeClr val="lt1"/>
+          </a:fontRef>
+        </p:style>
+        <p:txBody>
+          <a:bodyPr rtlCol="0" anchor="ctr"/>
+          <a:lstStyle/>
+          <a:p>
+            <a:pPr algn="ctr"/>
+            <a:r>
+              <a:rPr lang="en-US" altLang="zh-CN" b="1" smtClean="0">
+                <a:solidFill>
+                  <a:schemeClr val="tx1"/>
+                </a:solidFill>
+              </a:rPr>
+              <a:t>rpc:server</a:t>
+            </a:r>
+            <a:endParaRPr lang="zh-CN" altLang="en-US" b="1">
+              <a:solidFill>
+                <a:schemeClr val="tx1"/>
+              </a:solidFill>
+            </a:endParaRPr>
+          </a:p>
+        </p:txBody>
+      </p:sp>
+      <p:sp>
+        <p:nvSpPr>
+          <p:cNvPr id="62" name="圆角矩形 61"/>
+          <p:cNvSpPr/>
+          <p:nvPr/>
+        </p:nvSpPr>
+        <p:spPr>
+          <a:xfrm>
+            <a:off x="5583967" y="2505922"/>
+            <a:ext cx="1560653" cy="434047"/>
+          </a:xfrm>
+          <a:prstGeom prst="roundRect">
+            <a:avLst/>
+          </a:prstGeom>
+          <a:solidFill>
+            <a:schemeClr val="accent4">
+              <a:lumMod val="60000"/>
+              <a:lumOff val="40000"/>
+            </a:schemeClr>
+          </a:solidFill>
+        </p:spPr>
+        <p:style>
+          <a:lnRef idx="2">
+            <a:schemeClr val="accent1">
+              <a:shade val="50000"/>
+            </a:schemeClr>
+          </a:lnRef>
+          <a:fillRef idx="1">
+            <a:schemeClr val="accent1"/>
+          </a:fillRef>
+          <a:effectRef idx="0">
+            <a:schemeClr val="accent1"/>
+          </a:effectRef>
+          <a:fontRef idx="minor">
+            <a:schemeClr val="lt1"/>
+          </a:fontRef>
+        </p:style>
+        <p:txBody>
+          <a:bodyPr rtlCol="0" anchor="ctr"/>
+          <a:lstStyle/>
+          <a:p>
+            <a:pPr algn="ctr"/>
+            <a:r>
+              <a:rPr lang="en-US" altLang="zh-CN" b="1" smtClean="0">
+                <a:solidFill>
+                  <a:schemeClr val="tx1"/>
+                </a:solidFill>
+              </a:rPr>
+              <a:t>libcarla </a:t>
+            </a:r>
+            <a:r>
+              <a:rPr lang="zh-CN" altLang="en-US" b="1" smtClean="0">
+                <a:solidFill>
+                  <a:schemeClr val="tx1"/>
+                </a:solidFill>
+              </a:rPr>
+              <a:t>服务端</a:t>
+            </a:r>
+            <a:endParaRPr lang="zh-CN" altLang="en-US" b="1">
+              <a:solidFill>
+                <a:schemeClr val="tx1"/>
+              </a:solidFill>
+            </a:endParaRPr>
+          </a:p>
+        </p:txBody>
+      </p:sp>
+      <p:sp>
+        <p:nvSpPr>
+          <p:cNvPr id="64" name="圆角矩形 63"/>
+          <p:cNvSpPr/>
+          <p:nvPr/>
+        </p:nvSpPr>
+        <p:spPr>
+          <a:xfrm>
+            <a:off x="5583967" y="1684120"/>
+            <a:ext cx="1560653" cy="434047"/>
+          </a:xfrm>
+          <a:prstGeom prst="roundRect">
+            <a:avLst/>
+          </a:prstGeom>
+          <a:solidFill>
+            <a:schemeClr val="accent4">
+              <a:lumMod val="60000"/>
+              <a:lumOff val="40000"/>
+            </a:schemeClr>
+          </a:solidFill>
+        </p:spPr>
+        <p:style>
+          <a:lnRef idx="2">
+            <a:schemeClr val="accent1">
+              <a:shade val="50000"/>
+            </a:schemeClr>
+          </a:lnRef>
+          <a:fillRef idx="1">
+            <a:schemeClr val="accent1"/>
+          </a:fillRef>
+          <a:effectRef idx="0">
+            <a:schemeClr val="accent1"/>
+          </a:effectRef>
+          <a:fontRef idx="minor">
+            <a:schemeClr val="lt1"/>
+          </a:fontRef>
+        </p:style>
+        <p:txBody>
+          <a:bodyPr rtlCol="0" anchor="ctr"/>
+          <a:lstStyle/>
+          <a:p>
+            <a:pPr algn="ctr"/>
+            <a:r>
+              <a:rPr lang="en-US" altLang="zh-CN" b="1" smtClean="0">
+                <a:solidFill>
+                  <a:schemeClr val="tx1"/>
+                </a:solidFill>
+              </a:rPr>
+              <a:t>Carla Plugin</a:t>
+            </a:r>
+            <a:endParaRPr lang="zh-CN" altLang="en-US" b="1">
+              <a:solidFill>
+                <a:schemeClr val="tx1"/>
+              </a:solidFill>
+            </a:endParaRPr>
+          </a:p>
+        </p:txBody>
+      </p:sp>
+      <p:sp>
+        <p:nvSpPr>
+          <p:cNvPr id="66" name="圆角矩形 65"/>
+          <p:cNvSpPr/>
+          <p:nvPr/>
+        </p:nvSpPr>
+        <p:spPr>
+          <a:xfrm>
+            <a:off x="5583967" y="729206"/>
+            <a:ext cx="1560653" cy="567159"/>
+          </a:xfrm>
+          <a:prstGeom prst="roundRect">
+            <a:avLst/>
+          </a:prstGeom>
+          <a:solidFill>
+            <a:schemeClr val="accent4">
+              <a:lumMod val="60000"/>
+              <a:lumOff val="40000"/>
+            </a:schemeClr>
+          </a:solidFill>
+        </p:spPr>
+        <p:style>
+          <a:lnRef idx="2">
+            <a:schemeClr val="accent1">
+              <a:shade val="50000"/>
+            </a:schemeClr>
+          </a:lnRef>
+          <a:fillRef idx="1">
+            <a:schemeClr val="accent1"/>
+          </a:fillRef>
+          <a:effectRef idx="0">
+            <a:schemeClr val="accent1"/>
+          </a:effectRef>
+          <a:fontRef idx="minor">
+            <a:schemeClr val="lt1"/>
+          </a:fontRef>
+        </p:style>
+        <p:txBody>
+          <a:bodyPr rtlCol="0" anchor="ctr"/>
+          <a:lstStyle/>
+          <a:p>
+            <a:pPr algn="ctr"/>
+            <a:r>
+              <a:rPr lang="en-US" altLang="zh-CN" b="1" smtClean="0">
+                <a:solidFill>
+                  <a:schemeClr val="tx1"/>
+                </a:solidFill>
+              </a:rPr>
+              <a:t>CarlaUE4</a:t>
+            </a:r>
+            <a:endParaRPr lang="zh-CN" altLang="en-US" b="1">
+              <a:solidFill>
+                <a:schemeClr val="tx1"/>
+              </a:solidFill>
+            </a:endParaRPr>
+          </a:p>
+        </p:txBody>
+      </p:sp>
+      <p:sp>
+        <p:nvSpPr>
+          <p:cNvPr id="68" name="矩形 67"/>
+          <p:cNvSpPr/>
+          <p:nvPr/>
+        </p:nvSpPr>
+        <p:spPr>
+          <a:xfrm>
+            <a:off x="5184488" y="416689"/>
+            <a:ext cx="2292753" cy="3703898"/>
+          </a:xfrm>
+          <a:prstGeom prst="rect">
+            <a:avLst/>
+          </a:prstGeom>
+          <a:noFill/>
+          <a:ln>
+            <a:prstDash val="sysDot"/>
+          </a:ln>
+        </p:spPr>
+        <p:style>
+          <a:lnRef idx="2">
+            <a:schemeClr val="accent1">
+              <a:shade val="50000"/>
+            </a:schemeClr>
+          </a:lnRef>
+          <a:fillRef idx="1">
+            <a:schemeClr val="accent1"/>
+          </a:fillRef>
+          <a:effectRef idx="0">
+            <a:schemeClr val="accent1"/>
+          </a:effectRef>
+          <a:fontRef idx="minor">
+            <a:schemeClr val="lt1"/>
+          </a:fontRef>
+        </p:style>
+        <p:txBody>
+          <a:bodyPr rtlCol="0" anchor="ctr"/>
+          <a:lstStyle/>
+          <a:p>
+            <a:pPr algn="ctr"/>
+            <a:endParaRPr lang="zh-CN" altLang="en-US"/>
+          </a:p>
+        </p:txBody>
+      </p:sp>
+      <p:cxnSp>
+        <p:nvCxnSpPr>
+          <p:cNvPr id="23" name="直接箭头连接符 22"/>
+          <p:cNvCxnSpPr>
+            <a:stCxn id="50" idx="2"/>
+            <a:endCxn id="54" idx="0"/>
+          </p:cNvCxnSpPr>
+          <p:nvPr/>
+        </p:nvCxnSpPr>
+        <p:spPr>
+          <a:xfrm>
+            <a:off x="3497479" y="1296365"/>
+            <a:ext cx="5940" cy="387755"/>
+          </a:xfrm>
+          <a:prstGeom prst="straightConnector1">
+            <a:avLst/>
+          </a:prstGeom>
+          <a:ln w="19050">
+            <a:headEnd type="triangle"/>
+            <a:tailEnd type="triangle"/>
+          </a:ln>
+        </p:spPr>
+        <p:style>
+          <a:lnRef idx="1">
+            <a:schemeClr val="accent1"/>
+          </a:lnRef>
+          <a:fillRef idx="0">
+            <a:schemeClr val="accent1"/>
+          </a:fillRef>
+          <a:effectRef idx="0">
+            <a:schemeClr val="accent1"/>
+          </a:effectRef>
+          <a:fontRef idx="minor">
+            <a:schemeClr val="tx1"/>
+          </a:fontRef>
+        </p:style>
+      </p:cxnSp>
+      <p:cxnSp>
+        <p:nvCxnSpPr>
+          <p:cNvPr id="26" name="直接箭头连接符 25"/>
+          <p:cNvCxnSpPr>
+            <a:stCxn id="54" idx="2"/>
+            <a:endCxn id="56" idx="0"/>
+          </p:cNvCxnSpPr>
+          <p:nvPr/>
+        </p:nvCxnSpPr>
+        <p:spPr>
+          <a:xfrm>
+            <a:off x="3503419" y="2118167"/>
+            <a:ext cx="5635" cy="387755"/>
+          </a:xfrm>
+          <a:prstGeom prst="straightConnector1">
+            <a:avLst/>
+          </a:prstGeom>
+          <a:ln w="19050">
+            <a:headEnd type="triangle"/>
+            <a:tailEnd type="triangle"/>
+          </a:ln>
+        </p:spPr>
+        <p:style>
+          <a:lnRef idx="1">
+            <a:schemeClr val="accent1"/>
+          </a:lnRef>
+          <a:fillRef idx="0">
+            <a:schemeClr val="accent1"/>
+          </a:fillRef>
+          <a:effectRef idx="0">
+            <a:schemeClr val="accent1"/>
+          </a:effectRef>
+          <a:fontRef idx="minor">
+            <a:schemeClr val="tx1"/>
+          </a:fontRef>
+        </p:style>
+      </p:cxnSp>
+      <p:cxnSp>
+        <p:nvCxnSpPr>
+          <p:cNvPr id="28" name="直接箭头连接符 27"/>
+          <p:cNvCxnSpPr>
+            <a:stCxn id="56" idx="2"/>
+            <a:endCxn id="58" idx="0"/>
+          </p:cNvCxnSpPr>
+          <p:nvPr/>
+        </p:nvCxnSpPr>
+        <p:spPr>
+          <a:xfrm flipH="1">
+            <a:off x="3503419" y="2939969"/>
+            <a:ext cx="5635" cy="387755"/>
+          </a:xfrm>
+          <a:prstGeom prst="straightConnector1">
+            <a:avLst/>
+          </a:prstGeom>
+          <a:ln w="19050">
+            <a:headEnd type="triangle"/>
+            <a:tailEnd type="triangle"/>
+          </a:ln>
+        </p:spPr>
+        <p:style>
+          <a:lnRef idx="1">
+            <a:schemeClr val="accent1"/>
+          </a:lnRef>
+          <a:fillRef idx="0">
+            <a:schemeClr val="accent1"/>
+          </a:fillRef>
+          <a:effectRef idx="0">
+            <a:schemeClr val="accent1"/>
+          </a:effectRef>
+          <a:fontRef idx="minor">
+            <a:schemeClr val="tx1"/>
+          </a:fontRef>
+        </p:style>
+      </p:cxnSp>
+      <p:cxnSp>
+        <p:nvCxnSpPr>
+          <p:cNvPr id="31" name="直接箭头连接符 30"/>
+          <p:cNvCxnSpPr>
+            <a:stCxn id="58" idx="3"/>
+            <a:endCxn id="60" idx="1"/>
+          </p:cNvCxnSpPr>
+          <p:nvPr/>
+        </p:nvCxnSpPr>
+        <p:spPr>
+          <a:xfrm flipV="1">
+            <a:off x="4283745" y="3544747"/>
+            <a:ext cx="1300223" cy="1"/>
+          </a:xfrm>
+          <a:prstGeom prst="straightConnector1">
+            <a:avLst/>
+          </a:prstGeom>
+          <a:ln w="19050">
+            <a:prstDash val="sysDash"/>
+            <a:headEnd type="triangle"/>
+            <a:tailEnd type="triangle"/>
+          </a:ln>
+        </p:spPr>
+        <p:style>
+          <a:lnRef idx="1">
+            <a:schemeClr val="accent1"/>
+          </a:lnRef>
+          <a:fillRef idx="0">
+            <a:schemeClr val="accent1"/>
+          </a:fillRef>
+          <a:effectRef idx="0">
+            <a:schemeClr val="accent1"/>
+          </a:effectRef>
+          <a:fontRef idx="minor">
+            <a:schemeClr val="tx1"/>
+          </a:fontRef>
+        </p:style>
+      </p:cxnSp>
+      <p:cxnSp>
+        <p:nvCxnSpPr>
+          <p:cNvPr id="35" name="直接箭头连接符 34"/>
+          <p:cNvCxnSpPr>
+            <a:stCxn id="60" idx="0"/>
+            <a:endCxn id="62" idx="2"/>
+          </p:cNvCxnSpPr>
+          <p:nvPr/>
+        </p:nvCxnSpPr>
+        <p:spPr>
+          <a:xfrm flipH="1" flipV="1">
+            <a:off x="6364294" y="2939969"/>
+            <a:ext cx="1" cy="387754"/>
+          </a:xfrm>
+          <a:prstGeom prst="straightConnector1">
+            <a:avLst/>
+          </a:prstGeom>
+          <a:ln w="19050">
+            <a:headEnd type="triangle"/>
+            <a:tailEnd type="triangle"/>
+          </a:ln>
+        </p:spPr>
+        <p:style>
+          <a:lnRef idx="1">
+            <a:schemeClr val="accent1"/>
+          </a:lnRef>
+          <a:fillRef idx="0">
+            <a:schemeClr val="accent1"/>
+          </a:fillRef>
+          <a:effectRef idx="0">
+            <a:schemeClr val="accent1"/>
+          </a:effectRef>
+          <a:fontRef idx="minor">
+            <a:schemeClr val="tx1"/>
+          </a:fontRef>
+        </p:style>
+      </p:cxnSp>
+      <p:cxnSp>
+        <p:nvCxnSpPr>
+          <p:cNvPr id="38" name="直接箭头连接符 37"/>
+          <p:cNvCxnSpPr>
+            <a:stCxn id="62" idx="0"/>
+            <a:endCxn id="64" idx="2"/>
+          </p:cNvCxnSpPr>
+          <p:nvPr/>
+        </p:nvCxnSpPr>
+        <p:spPr>
+          <a:xfrm flipV="1">
+            <a:off x="6364294" y="2118167"/>
+            <a:ext cx="0" cy="387755"/>
+          </a:xfrm>
+          <a:prstGeom prst="straightConnector1">
+            <a:avLst/>
+          </a:prstGeom>
+          <a:ln w="19050">
+            <a:headEnd type="triangle"/>
+            <a:tailEnd type="triangle"/>
+          </a:ln>
+        </p:spPr>
+        <p:style>
+          <a:lnRef idx="1">
+            <a:schemeClr val="accent1"/>
+          </a:lnRef>
+          <a:fillRef idx="0">
+            <a:schemeClr val="accent1"/>
+          </a:fillRef>
+          <a:effectRef idx="0">
+            <a:schemeClr val="accent1"/>
+          </a:effectRef>
+          <a:fontRef idx="minor">
+            <a:schemeClr val="tx1"/>
+          </a:fontRef>
+        </p:style>
+      </p:cxnSp>
+      <p:cxnSp>
+        <p:nvCxnSpPr>
+          <p:cNvPr id="42" name="直接箭头连接符 41"/>
+          <p:cNvCxnSpPr>
+            <a:stCxn id="64" idx="0"/>
+            <a:endCxn id="66" idx="2"/>
+          </p:cNvCxnSpPr>
+          <p:nvPr/>
+        </p:nvCxnSpPr>
+        <p:spPr>
+          <a:xfrm flipV="1">
+            <a:off x="6364294" y="1296365"/>
+            <a:ext cx="0" cy="387755"/>
+          </a:xfrm>
+          <a:prstGeom prst="straightConnector1">
+            <a:avLst/>
+          </a:prstGeom>
+          <a:ln w="19050">
+            <a:headEnd type="triangle"/>
+            <a:tailEnd type="triangle"/>
+          </a:ln>
+        </p:spPr>
+        <p:style>
+          <a:lnRef idx="1">
+            <a:schemeClr val="accent1"/>
+          </a:lnRef>
+          <a:fillRef idx="0">
+            <a:schemeClr val="accent1"/>
+          </a:fillRef>
+          <a:effectRef idx="0">
+            <a:schemeClr val="accent1"/>
+          </a:effectRef>
+          <a:fontRef idx="minor">
+            <a:schemeClr val="tx1"/>
+          </a:fontRef>
+        </p:style>
+      </p:cxnSp>
+      <p:sp>
+        <p:nvSpPr>
+          <p:cNvPr id="44" name="椭圆 43"/>
+          <p:cNvSpPr/>
+          <p:nvPr/>
+        </p:nvSpPr>
+        <p:spPr>
+          <a:xfrm>
+            <a:off x="7921900" y="1012785"/>
+            <a:ext cx="219919" cy="243066"/>
+          </a:xfrm>
+          <a:prstGeom prst="ellipse">
+            <a:avLst/>
+          </a:prstGeom>
+          <a:solidFill>
+            <a:srgbClr val="92D050"/>
+          </a:solidFill>
+          <a:ln>
+            <a:noFill/>
+          </a:ln>
+        </p:spPr>
+        <p:style>
+          <a:lnRef idx="2">
+            <a:schemeClr val="accent1">
+              <a:shade val="50000"/>
+            </a:schemeClr>
+          </a:lnRef>
+          <a:fillRef idx="1">
+            <a:schemeClr val="accent1"/>
+          </a:fillRef>
+          <a:effectRef idx="0">
+            <a:schemeClr val="accent1"/>
+          </a:effectRef>
+          <a:fontRef idx="minor">
+            <a:schemeClr val="lt1"/>
+          </a:fontRef>
+        </p:style>
+        <p:txBody>
+          <a:bodyPr rtlCol="0" anchor="ctr"/>
+          <a:lstStyle/>
+          <a:p>
+            <a:pPr algn="ctr"/>
+            <a:endParaRPr lang="zh-CN" altLang="en-US"/>
+          </a:p>
+        </p:txBody>
+      </p:sp>
+      <p:sp>
+        <p:nvSpPr>
+          <p:cNvPr id="78" name="矩形 77"/>
+          <p:cNvSpPr/>
+          <p:nvPr/>
+        </p:nvSpPr>
+        <p:spPr>
+          <a:xfrm>
+            <a:off x="8430549" y="1054666"/>
+            <a:ext cx="713451" cy="156735"/>
+          </a:xfrm>
+          <a:prstGeom prst="rect">
+            <a:avLst/>
+          </a:prstGeom>
+          <a:solidFill>
+            <a:schemeClr val="bg1"/>
+          </a:solidFill>
+          <a:ln>
+            <a:noFill/>
+          </a:ln>
+        </p:spPr>
+        <p:style>
+          <a:lnRef idx="2">
+            <a:schemeClr val="accent1">
+              <a:shade val="50000"/>
+            </a:schemeClr>
+          </a:lnRef>
+          <a:fillRef idx="1">
+            <a:schemeClr val="accent1"/>
+          </a:fillRef>
+          <a:effectRef idx="0">
+            <a:schemeClr val="accent1"/>
+          </a:effectRef>
+          <a:fontRef idx="minor">
+            <a:schemeClr val="lt1"/>
+          </a:fontRef>
+        </p:style>
+        <p:txBody>
+          <a:bodyPr rtlCol="0" anchor="ctr"/>
+          <a:lstStyle/>
+          <a:p>
+            <a:pPr algn="ctr"/>
+            <a:r>
+              <a:rPr lang="en-US" altLang="zh-CN" sz="1200" b="1" smtClean="0">
+                <a:solidFill>
+                  <a:schemeClr val="tx1"/>
+                </a:solidFill>
+              </a:rPr>
+              <a:t>Python</a:t>
+            </a:r>
+            <a:endParaRPr lang="zh-CN" altLang="en-US" sz="1200" b="1">
+              <a:solidFill>
+                <a:schemeClr val="tx1"/>
+              </a:solidFill>
+            </a:endParaRPr>
+          </a:p>
+        </p:txBody>
+      </p:sp>
+      <p:cxnSp>
+        <p:nvCxnSpPr>
+          <p:cNvPr id="51" name="直接箭头连接符 50"/>
+          <p:cNvCxnSpPr>
+            <a:stCxn id="44" idx="6"/>
+            <a:endCxn id="78" idx="1"/>
+          </p:cNvCxnSpPr>
+          <p:nvPr/>
+        </p:nvCxnSpPr>
+        <p:spPr>
+          <a:xfrm flipV="1">
+            <a:off x="8141819" y="1133034"/>
+            <a:ext cx="288730" cy="1284"/>
+          </a:xfrm>
+          <a:prstGeom prst="straightConnector1">
+            <a:avLst/>
+          </a:prstGeom>
+          <a:ln w="19050">
+            <a:prstDash val="sysDash"/>
+            <a:tailEnd type="triangle"/>
+          </a:ln>
+        </p:spPr>
+        <p:style>
+          <a:lnRef idx="1">
+            <a:schemeClr val="accent1"/>
+          </a:lnRef>
+          <a:fillRef idx="0">
+            <a:schemeClr val="accent1"/>
+          </a:fillRef>
+          <a:effectRef idx="0">
+            <a:schemeClr val="accent1"/>
+          </a:effectRef>
+          <a:fontRef idx="minor">
+            <a:schemeClr val="tx1"/>
+          </a:fontRef>
+        </p:style>
+      </p:cxnSp>
+      <p:sp>
+        <p:nvSpPr>
+          <p:cNvPr id="86" name="椭圆 85"/>
+          <p:cNvSpPr/>
+          <p:nvPr/>
+        </p:nvSpPr>
+        <p:spPr>
+          <a:xfrm>
+            <a:off x="7921900" y="1485504"/>
+            <a:ext cx="219919" cy="243066"/>
+          </a:xfrm>
+          <a:prstGeom prst="ellipse">
+            <a:avLst/>
+          </a:prstGeom>
+          <a:solidFill>
+            <a:schemeClr val="accent4">
+              <a:lumMod val="60000"/>
+              <a:lumOff val="40000"/>
+            </a:schemeClr>
+          </a:solidFill>
+          <a:ln>
+            <a:noFill/>
+          </a:ln>
+        </p:spPr>
+        <p:style>
+          <a:lnRef idx="2">
+            <a:schemeClr val="accent1">
+              <a:shade val="50000"/>
+            </a:schemeClr>
+          </a:lnRef>
+          <a:fillRef idx="1">
+            <a:schemeClr val="accent1"/>
+          </a:fillRef>
+          <a:effectRef idx="0">
+            <a:schemeClr val="accent1"/>
+          </a:effectRef>
+          <a:fontRef idx="minor">
+            <a:schemeClr val="lt1"/>
+          </a:fontRef>
+        </p:style>
+        <p:txBody>
+          <a:bodyPr rtlCol="0" anchor="ctr"/>
+          <a:lstStyle/>
+          <a:p>
+            <a:pPr algn="ctr"/>
+            <a:endParaRPr lang="zh-CN" altLang="en-US"/>
+          </a:p>
+        </p:txBody>
+      </p:sp>
+      <p:sp>
+        <p:nvSpPr>
+          <p:cNvPr id="87" name="矩形 86"/>
+          <p:cNvSpPr/>
+          <p:nvPr/>
+        </p:nvSpPr>
+        <p:spPr>
+          <a:xfrm>
+            <a:off x="8430549" y="1527385"/>
+            <a:ext cx="713451" cy="156735"/>
+          </a:xfrm>
+          <a:prstGeom prst="rect">
+            <a:avLst/>
+          </a:prstGeom>
+          <a:solidFill>
+            <a:schemeClr val="bg1"/>
+          </a:solidFill>
+          <a:ln>
+            <a:noFill/>
+          </a:ln>
+        </p:spPr>
+        <p:style>
+          <a:lnRef idx="2">
+            <a:schemeClr val="accent1">
+              <a:shade val="50000"/>
+            </a:schemeClr>
+          </a:lnRef>
+          <a:fillRef idx="1">
+            <a:schemeClr val="accent1"/>
+          </a:fillRef>
+          <a:effectRef idx="0">
+            <a:schemeClr val="accent1"/>
+          </a:effectRef>
+          <a:fontRef idx="minor">
+            <a:schemeClr val="lt1"/>
+          </a:fontRef>
+        </p:style>
+        <p:txBody>
+          <a:bodyPr rtlCol="0" anchor="ctr"/>
+          <a:lstStyle/>
+          <a:p>
+            <a:pPr algn="ctr"/>
+            <a:r>
+              <a:rPr lang="en-US" altLang="zh-CN" sz="1200" b="1" smtClean="0">
+                <a:solidFill>
+                  <a:schemeClr val="tx1"/>
+                </a:solidFill>
+              </a:rPr>
+              <a:t>C++</a:t>
+            </a:r>
+            <a:endParaRPr lang="zh-CN" altLang="en-US" sz="1200" b="1">
+              <a:solidFill>
+                <a:schemeClr val="tx1"/>
+              </a:solidFill>
+            </a:endParaRPr>
+          </a:p>
+        </p:txBody>
+      </p:sp>
+      <p:cxnSp>
+        <p:nvCxnSpPr>
+          <p:cNvPr id="88" name="直接箭头连接符 87"/>
+          <p:cNvCxnSpPr>
+            <a:stCxn id="86" idx="6"/>
+            <a:endCxn id="87" idx="1"/>
+          </p:cNvCxnSpPr>
+          <p:nvPr/>
+        </p:nvCxnSpPr>
+        <p:spPr>
+          <a:xfrm flipV="1">
+            <a:off x="8141819" y="1605753"/>
+            <a:ext cx="288730" cy="1284"/>
+          </a:xfrm>
+          <a:prstGeom prst="straightConnector1">
+            <a:avLst/>
+          </a:prstGeom>
+          <a:ln w="19050">
+            <a:prstDash val="sysDash"/>
+            <a:tailEnd type="triangle"/>
+          </a:ln>
+        </p:spPr>
+        <p:style>
+          <a:lnRef idx="1">
+            <a:schemeClr val="accent1"/>
+          </a:lnRef>
+          <a:fillRef idx="0">
+            <a:schemeClr val="accent1"/>
+          </a:fillRef>
+          <a:effectRef idx="0">
+            <a:schemeClr val="accent1"/>
+          </a:effectRef>
+          <a:fontRef idx="minor">
+            <a:schemeClr val="tx1"/>
+          </a:fontRef>
+        </p:style>
+      </p:cxnSp>
+    </p:spTree>
+    <p:extLst>
+      <p:ext uri="{BB962C8B-B14F-4D97-AF65-F5344CB8AC3E}">
+        <p14:creationId xmlns:p14="http://schemas.microsoft.com/office/powerpoint/2010/main" val="4272108871"/>
       </p:ext>
     </p:extLst>
   </p:cSld>

</xml_diff>

<commit_message>
Deployed 017216d with MkDocs version: 1.5.3
</commit_message>
<xml_diff>
--- a/img/Carla.pptx
+++ b/img/Carla.pptx
@@ -21,28 +21,28 @@
       <p:regular r:id="rId7"/>
     </p:embeddedFont>
     <p:embeddedFont>
-      <p:font typeface="Muli Regular" panose="020B0604020202020204" charset="0"/>
+      <p:font typeface="Muli" panose="020B0604020202020204" charset="0"/>
       <p:regular r:id="rId8"/>
       <p:bold r:id="rId9"/>
       <p:italic r:id="rId10"/>
       <p:boldItalic r:id="rId11"/>
     </p:embeddedFont>
     <p:embeddedFont>
-      <p:font typeface="Muli" panose="020B0604020202020204" charset="0"/>
+      <p:font typeface="Economica" panose="020B0604020202020204" charset="0"/>
       <p:regular r:id="rId12"/>
       <p:bold r:id="rId13"/>
       <p:italic r:id="rId14"/>
       <p:boldItalic r:id="rId15"/>
     </p:embeddedFont>
     <p:embeddedFont>
-      <p:font typeface="Economica" panose="020B0604020202020204" charset="0"/>
+      <p:font typeface="Open Sans" panose="020B0604020202020204" charset="0"/>
       <p:regular r:id="rId16"/>
       <p:bold r:id="rId17"/>
       <p:italic r:id="rId18"/>
       <p:boldItalic r:id="rId19"/>
     </p:embeddedFont>
     <p:embeddedFont>
-      <p:font typeface="Open Sans" panose="020B0604020202020204" charset="0"/>
+      <p:font typeface="Muli Regular" panose="020B0604020202020204" charset="0"/>
       <p:regular r:id="rId20"/>
       <p:bold r:id="rId21"/>
       <p:italic r:id="rId22"/>
@@ -294,7 +294,7 @@
       </p15:sldGuideLst>
     </p:ext>
     <p:ext uri="http://customooxmlschemas.google.com/">
-      <go:slidesCustomData xmlns:go="http://customooxmlschemas.google.com/" xmlns:p15="http://schemas.microsoft.com/office/powerpoint/2012/main" xmlns:p14="http://schemas.microsoft.com/office/powerpoint/2010/main" xmlns:com="http://schemas.openxmlformats.org/drawingml/2006/compatibility" xmlns:pvml="urn:schemas-microsoft-com:office:powerpoint" xmlns:v="urn:schemas-microsoft-com:vml" xmlns:o="urn:schemas-microsoft-com:office:office" xmlns:dgm="http://schemas.openxmlformats.org/drawingml/2006/diagram" xmlns:c="http://schemas.openxmlformats.org/drawingml/2006/chart" xmlns:mv="urn:schemas-microsoft-com:mac:vml" xmlns:mc="http://schemas.openxmlformats.org/markup-compatibility/2006" xmlns="" r:id="rId66" roundtripDataSignature="AMtx7mjk7ddpjVrAQkfiI2o1sWSlPxIqDQ=="/>
+      <go:slidesCustomData xmlns="" xmlns:mc="http://schemas.openxmlformats.org/markup-compatibility/2006" xmlns:mv="urn:schemas-microsoft-com:mac:vml" xmlns:c="http://schemas.openxmlformats.org/drawingml/2006/chart" xmlns:dgm="http://schemas.openxmlformats.org/drawingml/2006/diagram" xmlns:o="urn:schemas-microsoft-com:office:office" xmlns:v="urn:schemas-microsoft-com:vml" xmlns:pvml="urn:schemas-microsoft-com:office:powerpoint" xmlns:com="http://schemas.openxmlformats.org/drawingml/2006/compatibility" xmlns:p14="http://schemas.microsoft.com/office/powerpoint/2010/main" xmlns:p15="http://schemas.microsoft.com/office/powerpoint/2012/main" xmlns:go="http://customooxmlschemas.google.com/" r:id="rId66" roundtripDataSignature="AMtx7mjk7ddpjVrAQkfiI2o1sWSlPxIqDQ=="/>
     </p:ext>
   </p:extLst>
 </p:presentation>
@@ -12137,8 +12137,8 @@
         </p:nvSpPr>
         <p:spPr>
           <a:xfrm>
-            <a:off x="358713" y="816257"/>
-            <a:ext cx="4294208" cy="3703898"/>
+            <a:off x="358713" y="584200"/>
+            <a:ext cx="4294208" cy="3935955"/>
           </a:xfrm>
           <a:prstGeom prst="rect">
             <a:avLst/>
@@ -13100,7 +13100,7 @@
         </p:nvSpPr>
         <p:spPr>
           <a:xfrm>
-            <a:off x="7944952" y="1412353"/>
+            <a:off x="7912121" y="595220"/>
             <a:ext cx="219919" cy="243066"/>
           </a:xfrm>
           <a:prstGeom prst="ellipse">
@@ -13146,7 +13146,7 @@
         </p:nvSpPr>
         <p:spPr>
           <a:xfrm>
-            <a:off x="8453601" y="1454234"/>
+            <a:off x="8420770" y="637101"/>
             <a:ext cx="713451" cy="156735"/>
           </a:xfrm>
           <a:prstGeom prst="rect">
@@ -13207,7 +13207,7 @@
         </p:nvCxnSpPr>
         <p:spPr>
           <a:xfrm flipV="1">
-            <a:off x="8164871" y="1532602"/>
+            <a:off x="8132040" y="715469"/>
             <a:ext cx="288730" cy="1284"/>
           </a:xfrm>
           <a:prstGeom prst="straightConnector1">
@@ -13241,7 +13241,7 @@
         </p:nvSpPr>
         <p:spPr>
           <a:xfrm>
-            <a:off x="7944952" y="1885072"/>
+            <a:off x="7912121" y="934589"/>
             <a:ext cx="219919" cy="243066"/>
           </a:xfrm>
           <a:prstGeom prst="ellipse">
@@ -13290,7 +13290,7 @@
         </p:nvSpPr>
         <p:spPr>
           <a:xfrm>
-            <a:off x="8453601" y="1926953"/>
+            <a:off x="8420770" y="976470"/>
             <a:ext cx="713451" cy="156735"/>
           </a:xfrm>
           <a:prstGeom prst="rect">
@@ -13351,7 +13351,7 @@
         </p:nvCxnSpPr>
         <p:spPr>
           <a:xfrm flipV="1">
-            <a:off x="8164871" y="2005321"/>
+            <a:off x="8132040" y="1054838"/>
             <a:ext cx="288730" cy="1284"/>
           </a:xfrm>
           <a:prstGeom prst="straightConnector1">
@@ -13377,6 +13377,450 @@
           </a:fontRef>
         </p:style>
       </p:cxnSp>
+      <p:sp>
+        <p:nvSpPr>
+          <p:cNvPr id="29" name="矩形 28"/>
+          <p:cNvSpPr/>
+          <p:nvPr/>
+        </p:nvSpPr>
+        <p:spPr>
+          <a:xfrm>
+            <a:off x="529457" y="2119118"/>
+            <a:ext cx="1976360" cy="305652"/>
+          </a:xfrm>
+          <a:prstGeom prst="rect">
+            <a:avLst/>
+          </a:prstGeom>
+          <a:solidFill>
+            <a:schemeClr val="bg1"/>
+          </a:solidFill>
+          <a:ln>
+            <a:noFill/>
+          </a:ln>
+        </p:spPr>
+        <p:style>
+          <a:lnRef idx="2">
+            <a:schemeClr val="accent1">
+              <a:shade val="50000"/>
+            </a:schemeClr>
+          </a:lnRef>
+          <a:fillRef idx="1">
+            <a:schemeClr val="accent1"/>
+          </a:fillRef>
+          <a:effectRef idx="0">
+            <a:schemeClr val="accent1"/>
+          </a:effectRef>
+          <a:fontRef idx="minor">
+            <a:schemeClr val="lt1"/>
+          </a:fontRef>
+        </p:style>
+        <p:txBody>
+          <a:bodyPr rtlCol="0" anchor="ctr"/>
+          <a:lstStyle/>
+          <a:p>
+            <a:pPr algn="ctr"/>
+            <a:r>
+              <a:rPr lang="en-US" altLang="zh-CN" sz="1200" b="1" smtClean="0">
+                <a:solidFill>
+                  <a:schemeClr val="bg1">
+                    <a:lumMod val="50000"/>
+                  </a:schemeClr>
+                </a:solidFill>
+              </a:rPr>
+              <a:t>PythonAPI/Carla/source/libcarla/*.cpp</a:t>
+            </a:r>
+            <a:endParaRPr lang="zh-CN" altLang="en-US" sz="1200" b="1">
+              <a:solidFill>
+                <a:schemeClr val="bg1">
+                  <a:lumMod val="50000"/>
+                </a:schemeClr>
+              </a:solidFill>
+            </a:endParaRPr>
+          </a:p>
+        </p:txBody>
+      </p:sp>
+      <p:sp>
+        <p:nvSpPr>
+          <p:cNvPr id="30" name="矩形 29"/>
+          <p:cNvSpPr/>
+          <p:nvPr/>
+        </p:nvSpPr>
+        <p:spPr>
+          <a:xfrm>
+            <a:off x="2505817" y="891846"/>
+            <a:ext cx="2019804" cy="181594"/>
+          </a:xfrm>
+          <a:prstGeom prst="rect">
+            <a:avLst/>
+          </a:prstGeom>
+          <a:solidFill>
+            <a:schemeClr val="bg1"/>
+          </a:solidFill>
+          <a:ln>
+            <a:noFill/>
+          </a:ln>
+        </p:spPr>
+        <p:style>
+          <a:lnRef idx="2">
+            <a:schemeClr val="accent1">
+              <a:shade val="50000"/>
+            </a:schemeClr>
+          </a:lnRef>
+          <a:fillRef idx="1">
+            <a:schemeClr val="accent1"/>
+          </a:fillRef>
+          <a:effectRef idx="0">
+            <a:schemeClr val="accent1"/>
+          </a:effectRef>
+          <a:fontRef idx="minor">
+            <a:schemeClr val="lt1"/>
+          </a:fontRef>
+        </p:style>
+        <p:txBody>
+          <a:bodyPr rtlCol="0" anchor="ctr"/>
+          <a:lstStyle/>
+          <a:p>
+            <a:pPr algn="ctr"/>
+            <a:r>
+              <a:rPr lang="en-US" altLang="zh-CN" sz="1200" b="1" smtClean="0">
+                <a:solidFill>
+                  <a:schemeClr val="bg1">
+                    <a:lumMod val="50000"/>
+                  </a:schemeClr>
+                </a:solidFill>
+              </a:rPr>
+              <a:t>PythonAPI/carla/agent/*</a:t>
+            </a:r>
+            <a:endParaRPr lang="zh-CN" altLang="en-US" sz="1200" b="1">
+              <a:solidFill>
+                <a:schemeClr val="bg1">
+                  <a:lumMod val="50000"/>
+                </a:schemeClr>
+              </a:solidFill>
+            </a:endParaRPr>
+          </a:p>
+        </p:txBody>
+      </p:sp>
+      <p:sp>
+        <p:nvSpPr>
+          <p:cNvPr id="32" name="矩形 31"/>
+          <p:cNvSpPr/>
+          <p:nvPr/>
+        </p:nvSpPr>
+        <p:spPr>
+          <a:xfrm>
+            <a:off x="1147439" y="659259"/>
+            <a:ext cx="3357221" cy="181594"/>
+          </a:xfrm>
+          <a:prstGeom prst="rect">
+            <a:avLst/>
+          </a:prstGeom>
+          <a:solidFill>
+            <a:schemeClr val="bg1"/>
+          </a:solidFill>
+          <a:ln>
+            <a:noFill/>
+          </a:ln>
+        </p:spPr>
+        <p:style>
+          <a:lnRef idx="2">
+            <a:schemeClr val="accent1">
+              <a:shade val="50000"/>
+            </a:schemeClr>
+          </a:lnRef>
+          <a:fillRef idx="1">
+            <a:schemeClr val="accent1"/>
+          </a:fillRef>
+          <a:effectRef idx="0">
+            <a:schemeClr val="accent1"/>
+          </a:effectRef>
+          <a:fontRef idx="minor">
+            <a:schemeClr val="lt1"/>
+          </a:fontRef>
+        </p:style>
+        <p:txBody>
+          <a:bodyPr rtlCol="0" anchor="ctr"/>
+          <a:lstStyle/>
+          <a:p>
+            <a:pPr algn="ctr"/>
+            <a:r>
+              <a:rPr lang="en-US" altLang="zh-CN" sz="1200" b="1" smtClean="0">
+                <a:solidFill>
+                  <a:schemeClr val="bg1">
+                    <a:lumMod val="50000"/>
+                  </a:schemeClr>
+                </a:solidFill>
+              </a:rPr>
+              <a:t>PythonAPI/carla/source/Carla/command.py</a:t>
+            </a:r>
+            <a:endParaRPr lang="zh-CN" altLang="en-US" sz="1200" b="1">
+              <a:solidFill>
+                <a:schemeClr val="bg1">
+                  <a:lumMod val="50000"/>
+                </a:schemeClr>
+              </a:solidFill>
+            </a:endParaRPr>
+          </a:p>
+        </p:txBody>
+      </p:sp>
+      <p:sp>
+        <p:nvSpPr>
+          <p:cNvPr id="33" name="矩形 32"/>
+          <p:cNvSpPr/>
+          <p:nvPr/>
+        </p:nvSpPr>
+        <p:spPr>
+          <a:xfrm>
+            <a:off x="7605722" y="2938110"/>
+            <a:ext cx="1349794" cy="398617"/>
+          </a:xfrm>
+          <a:prstGeom prst="rect">
+            <a:avLst/>
+          </a:prstGeom>
+          <a:solidFill>
+            <a:schemeClr val="bg1"/>
+          </a:solidFill>
+          <a:ln>
+            <a:noFill/>
+          </a:ln>
+        </p:spPr>
+        <p:style>
+          <a:lnRef idx="2">
+            <a:schemeClr val="accent1">
+              <a:shade val="50000"/>
+            </a:schemeClr>
+          </a:lnRef>
+          <a:fillRef idx="1">
+            <a:schemeClr val="accent1"/>
+          </a:fillRef>
+          <a:effectRef idx="0">
+            <a:schemeClr val="accent1"/>
+          </a:effectRef>
+          <a:fontRef idx="minor">
+            <a:schemeClr val="lt1"/>
+          </a:fontRef>
+        </p:style>
+        <p:txBody>
+          <a:bodyPr rtlCol="0" anchor="ctr"/>
+          <a:lstStyle/>
+          <a:p>
+            <a:pPr algn="ctr"/>
+            <a:r>
+              <a:rPr lang="en-US" altLang="zh-CN" sz="1200" b="1" smtClean="0">
+                <a:solidFill>
+                  <a:schemeClr val="bg1">
+                    <a:lumMod val="50000"/>
+                  </a:schemeClr>
+                </a:solidFill>
+              </a:rPr>
+              <a:t>LibCarla/source/carla/*</a:t>
+            </a:r>
+            <a:endParaRPr lang="zh-CN" altLang="en-US" sz="1200" b="1">
+              <a:solidFill>
+                <a:schemeClr val="bg1">
+                  <a:lumMod val="50000"/>
+                </a:schemeClr>
+              </a:solidFill>
+            </a:endParaRPr>
+          </a:p>
+        </p:txBody>
+      </p:sp>
+      <p:sp>
+        <p:nvSpPr>
+          <p:cNvPr id="34" name="矩形 33"/>
+          <p:cNvSpPr/>
+          <p:nvPr/>
+        </p:nvSpPr>
+        <p:spPr>
+          <a:xfrm>
+            <a:off x="7570766" y="2119118"/>
+            <a:ext cx="1411278" cy="398617"/>
+          </a:xfrm>
+          <a:prstGeom prst="rect">
+            <a:avLst/>
+          </a:prstGeom>
+          <a:solidFill>
+            <a:schemeClr val="bg1"/>
+          </a:solidFill>
+          <a:ln>
+            <a:noFill/>
+          </a:ln>
+        </p:spPr>
+        <p:style>
+          <a:lnRef idx="2">
+            <a:schemeClr val="accent1">
+              <a:shade val="50000"/>
+            </a:schemeClr>
+          </a:lnRef>
+          <a:fillRef idx="1">
+            <a:schemeClr val="accent1"/>
+          </a:fillRef>
+          <a:effectRef idx="0">
+            <a:schemeClr val="accent1"/>
+          </a:effectRef>
+          <a:fontRef idx="minor">
+            <a:schemeClr val="lt1"/>
+          </a:fontRef>
+        </p:style>
+        <p:txBody>
+          <a:bodyPr rtlCol="0" anchor="ctr"/>
+          <a:lstStyle/>
+          <a:p>
+            <a:pPr algn="ctr"/>
+            <a:r>
+              <a:rPr lang="en-US" altLang="zh-CN" sz="1200" b="1" smtClean="0">
+                <a:solidFill>
+                  <a:schemeClr val="bg1">
+                    <a:lumMod val="50000"/>
+                  </a:schemeClr>
+                </a:solidFill>
+              </a:rPr>
+              <a:t>Unreal/CarlaUE4/Plugins/Carla</a:t>
+            </a:r>
+            <a:endParaRPr lang="zh-CN" altLang="en-US" sz="1200" b="1">
+              <a:solidFill>
+                <a:schemeClr val="bg1">
+                  <a:lumMod val="50000"/>
+                </a:schemeClr>
+              </a:solidFill>
+            </a:endParaRPr>
+          </a:p>
+        </p:txBody>
+      </p:sp>
+      <p:sp>
+        <p:nvSpPr>
+          <p:cNvPr id="36" name="矩形 35"/>
+          <p:cNvSpPr/>
+          <p:nvPr/>
+        </p:nvSpPr>
+        <p:spPr>
+          <a:xfrm>
+            <a:off x="7544238" y="1259599"/>
+            <a:ext cx="1411278" cy="398617"/>
+          </a:xfrm>
+          <a:prstGeom prst="rect">
+            <a:avLst/>
+          </a:prstGeom>
+          <a:solidFill>
+            <a:schemeClr val="bg1"/>
+          </a:solidFill>
+          <a:ln>
+            <a:noFill/>
+          </a:ln>
+        </p:spPr>
+        <p:style>
+          <a:lnRef idx="2">
+            <a:schemeClr val="accent1">
+              <a:shade val="50000"/>
+            </a:schemeClr>
+          </a:lnRef>
+          <a:fillRef idx="1">
+            <a:schemeClr val="accent1"/>
+          </a:fillRef>
+          <a:effectRef idx="0">
+            <a:schemeClr val="accent1"/>
+          </a:effectRef>
+          <a:fontRef idx="minor">
+            <a:schemeClr val="lt1"/>
+          </a:fontRef>
+        </p:style>
+        <p:txBody>
+          <a:bodyPr rtlCol="0" anchor="ctr"/>
+          <a:lstStyle/>
+          <a:p>
+            <a:pPr algn="ctr"/>
+            <a:r>
+              <a:rPr lang="en-US" altLang="zh-CN" sz="1200" b="1" smtClean="0">
+                <a:solidFill>
+                  <a:schemeClr val="bg1">
+                    <a:lumMod val="50000"/>
+                  </a:schemeClr>
+                </a:solidFill>
+              </a:rPr>
+              <a:t>Unreal/CarlaUE4</a:t>
+            </a:r>
+            <a:endParaRPr lang="zh-CN" altLang="en-US" sz="1200" b="1">
+              <a:solidFill>
+                <a:schemeClr val="bg1">
+                  <a:lumMod val="50000"/>
+                </a:schemeClr>
+              </a:solidFill>
+            </a:endParaRPr>
+          </a:p>
+        </p:txBody>
+      </p:sp>
+      <p:sp>
+        <p:nvSpPr>
+          <p:cNvPr id="37" name="矩形 36"/>
+          <p:cNvSpPr/>
+          <p:nvPr/>
+        </p:nvSpPr>
+        <p:spPr>
+          <a:xfrm>
+            <a:off x="612101" y="2903550"/>
+            <a:ext cx="1835610" cy="305652"/>
+          </a:xfrm>
+          <a:prstGeom prst="rect">
+            <a:avLst/>
+          </a:prstGeom>
+          <a:solidFill>
+            <a:schemeClr val="bg1"/>
+          </a:solidFill>
+          <a:ln>
+            <a:noFill/>
+          </a:ln>
+        </p:spPr>
+        <p:style>
+          <a:lnRef idx="2">
+            <a:schemeClr val="accent1">
+              <a:shade val="50000"/>
+            </a:schemeClr>
+          </a:lnRef>
+          <a:fillRef idx="1">
+            <a:schemeClr val="accent1"/>
+          </a:fillRef>
+          <a:effectRef idx="0">
+            <a:schemeClr val="accent1"/>
+          </a:effectRef>
+          <a:fontRef idx="minor">
+            <a:schemeClr val="lt1"/>
+          </a:fontRef>
+        </p:style>
+        <p:txBody>
+          <a:bodyPr rtlCol="0" anchor="ctr"/>
+          <a:lstStyle/>
+          <a:p>
+            <a:pPr algn="ctr"/>
+            <a:r>
+              <a:rPr lang="en-US" altLang="zh-CN" sz="1200" b="1" smtClean="0">
+                <a:solidFill>
+                  <a:schemeClr val="bg1">
+                    <a:lumMod val="50000"/>
+                  </a:schemeClr>
+                </a:solidFill>
+              </a:rPr>
+              <a:t>LibCarla/source/Carla/client</a:t>
+            </a:r>
+            <a:r>
+              <a:rPr lang="en-US" altLang="zh-CN" sz="1200" b="1">
+                <a:solidFill>
+                  <a:schemeClr val="bg1">
+                    <a:lumMod val="50000"/>
+                  </a:schemeClr>
+                </a:solidFill>
+              </a:rPr>
+              <a:t>/*.cpp</a:t>
+            </a:r>
+            <a:endParaRPr lang="zh-CN" altLang="en-US" sz="1200" b="1">
+              <a:solidFill>
+                <a:schemeClr val="bg1">
+                  <a:lumMod val="50000"/>
+                </a:schemeClr>
+              </a:solidFill>
+            </a:endParaRPr>
+          </a:p>
+        </p:txBody>
+      </p:sp>
     </p:spTree>
     <p:extLst>
       <p:ext uri="{BB962C8B-B14F-4D97-AF65-F5344CB8AC3E}">

</xml_diff>

<commit_message>
Deployed 9abb59a with MkDocs version: 1.5.3
</commit_message>
<xml_diff>
--- a/img/Carla.pptx
+++ b/img/Carla.pptx
@@ -5,50 +5,56 @@
     <p:sldMasterId id="2147483648" r:id="rId1"/>
   </p:sldMasterIdLst>
   <p:notesMasterIdLst>
-    <p:notesMasterId r:id="rId8"/>
+    <p:notesMasterId r:id="rId10"/>
   </p:notesMasterIdLst>
   <p:sldIdLst>
     <p:sldId id="289" r:id="rId2"/>
     <p:sldId id="290" r:id="rId3"/>
     <p:sldId id="294" r:id="rId4"/>
-    <p:sldId id="291" r:id="rId5"/>
-    <p:sldId id="292" r:id="rId6"/>
-    <p:sldId id="293" r:id="rId7"/>
+    <p:sldId id="295" r:id="rId5"/>
+    <p:sldId id="297" r:id="rId6"/>
+    <p:sldId id="291" r:id="rId7"/>
+    <p:sldId id="292" r:id="rId8"/>
+    <p:sldId id="293" r:id="rId9"/>
   </p:sldIdLst>
   <p:sldSz cx="9144000" cy="5143500" type="screen16x9"/>
   <p:notesSz cx="9144000" cy="5143500"/>
   <p:embeddedFontLst>
     <p:embeddedFont>
-      <p:font typeface="Economica" panose="020B0604020202020204" charset="0"/>
-      <p:regular r:id="rId9"/>
-      <p:bold r:id="rId10"/>
-      <p:italic r:id="rId11"/>
-      <p:boldItalic r:id="rId12"/>
+      <p:font typeface="Open Sans" panose="020B0604020202020204" charset="0"/>
+      <p:regular r:id="rId11"/>
+      <p:bold r:id="rId12"/>
+      <p:italic r:id="rId13"/>
+      <p:boldItalic r:id="rId14"/>
+    </p:embeddedFont>
+    <p:embeddedFont>
+      <p:font typeface="Wingdings 2" panose="05020102010507070707" pitchFamily="18" charset="2"/>
+      <p:regular r:id="rId15"/>
     </p:embeddedFont>
     <p:embeddedFont>
       <p:font typeface="宋体" panose="02010600030101010101" pitchFamily="2" charset="-122"/>
-      <p:regular r:id="rId13"/>
-    </p:embeddedFont>
-    <p:embeddedFont>
-      <p:font typeface="Open Sans" panose="020B0604020202020204" charset="0"/>
-      <p:regular r:id="rId14"/>
-      <p:bold r:id="rId15"/>
-      <p:italic r:id="rId16"/>
-      <p:boldItalic r:id="rId17"/>
+      <p:regular r:id="rId16"/>
     </p:embeddedFont>
     <p:embeddedFont>
       <p:font typeface="Muli Regular" panose="020B0604020202020204" charset="0"/>
-      <p:regular r:id="rId18"/>
-      <p:bold r:id="rId19"/>
-      <p:italic r:id="rId20"/>
-      <p:boldItalic r:id="rId21"/>
+      <p:regular r:id="rId17"/>
+      <p:bold r:id="rId18"/>
+      <p:italic r:id="rId19"/>
+      <p:boldItalic r:id="rId20"/>
+    </p:embeddedFont>
+    <p:embeddedFont>
+      <p:font typeface="Economica" panose="020B0604020202020204" charset="0"/>
+      <p:regular r:id="rId21"/>
+      <p:bold r:id="rId22"/>
+      <p:italic r:id="rId23"/>
+      <p:boldItalic r:id="rId24"/>
     </p:embeddedFont>
     <p:embeddedFont>
       <p:font typeface="Muli" panose="020B0604020202020204" charset="0"/>
-      <p:regular r:id="rId22"/>
-      <p:bold r:id="rId23"/>
-      <p:italic r:id="rId24"/>
-      <p:boldItalic r:id="rId25"/>
+      <p:regular r:id="rId25"/>
+      <p:bold r:id="rId26"/>
+      <p:italic r:id="rId27"/>
+      <p:boldItalic r:id="rId28"/>
     </p:embeddedFont>
   </p:embeddedFontLst>
   <p:defaultTextStyle>
@@ -296,7 +302,7 @@
       </p15:sldGuideLst>
     </p:ext>
     <p:ext uri="http://customooxmlschemas.google.com/">
-      <go:slidesCustomData xmlns="" xmlns:mc="http://schemas.openxmlformats.org/markup-compatibility/2006" xmlns:mv="urn:schemas-microsoft-com:mac:vml" xmlns:c="http://schemas.openxmlformats.org/drawingml/2006/chart" xmlns:dgm="http://schemas.openxmlformats.org/drawingml/2006/diagram" xmlns:o="urn:schemas-microsoft-com:office:office" xmlns:v="urn:schemas-microsoft-com:vml" xmlns:pvml="urn:schemas-microsoft-com:office:powerpoint" xmlns:com="http://schemas.openxmlformats.org/drawingml/2006/compatibility" xmlns:p14="http://schemas.microsoft.com/office/powerpoint/2010/main" xmlns:p15="http://schemas.microsoft.com/office/powerpoint/2012/main" xmlns:go="http://customooxmlschemas.google.com/" r:id="rId66" roundtripDataSignature="AMtx7mjk7ddpjVrAQkfiI2o1sWSlPxIqDQ=="/>
+      <go:slidesCustomData xmlns:go="http://customooxmlschemas.google.com/" xmlns:p15="http://schemas.microsoft.com/office/powerpoint/2012/main" xmlns:p14="http://schemas.microsoft.com/office/powerpoint/2010/main" xmlns:com="http://schemas.openxmlformats.org/drawingml/2006/compatibility" xmlns:pvml="urn:schemas-microsoft-com:office:powerpoint" xmlns:v="urn:schemas-microsoft-com:vml" xmlns:o="urn:schemas-microsoft-com:office:office" xmlns:dgm="http://schemas.openxmlformats.org/drawingml/2006/diagram" xmlns:c="http://schemas.openxmlformats.org/drawingml/2006/chart" xmlns:mv="urn:schemas-microsoft-com:mac:vml" xmlns:mc="http://schemas.openxmlformats.org/markup-compatibility/2006" xmlns="" r:id="rId66" roundtripDataSignature="AMtx7mjk7ddpjVrAQkfiI2o1sWSlPxIqDQ=="/>
     </p:ext>
   </p:extLst>
 </p:presentation>
@@ -1384,14 +1390,10 @@
               <a:buNone/>
             </a:pPr>
             <a:r>
-              <a:rPr lang="en-US" dirty="0" err="1">
-                <a:solidFill>
-                  <a:srgbClr val="39373D"/>
-                </a:solidFill>
-              </a:rPr>
-              <a:t>adv_multigpu</a:t>
+              <a:rPr lang="zh-CN" altLang="en-US" smtClean="0"/>
+              <a:t>数字孪生工具</a:t>
             </a:r>
-            <a:endParaRPr dirty="0"/>
+            <a:endParaRPr/>
           </a:p>
         </p:txBody>
       </p:sp>
@@ -1449,7 +1451,7 @@
     </p:spTree>
     <p:extLst>
       <p:ext uri="{BB962C8B-B14F-4D97-AF65-F5344CB8AC3E}">
-        <p14:creationId xmlns:p14="http://schemas.microsoft.com/office/powerpoint/2010/main" val="1240623699"/>
+        <p14:creationId xmlns:p14="http://schemas.microsoft.com/office/powerpoint/2010/main" val="3898426645"/>
       </p:ext>
     </p:extLst>
   </p:cSld>
@@ -1525,17 +1527,46 @@
                   <a:srgbClr val="39373D"/>
                 </a:solidFill>
               </a:rPr>
-              <a:t>adv_</a:t>
+              <a:t>tuto_D_create_sensor</a:t>
             </a:r>
-            <a:r>
-              <a:rPr lang="en-US" altLang="zh-CN" smtClean="0">
-                <a:solidFill>
-                  <a:srgbClr val="39373D"/>
-                </a:solidFill>
-              </a:rPr>
-              <a:t>rss</a:t>
-            </a:r>
-            <a:endParaRPr dirty="0"/>
+          </a:p>
+          <a:p>
+            <a:pPr marL="0" lvl="0" indent="0" algn="l" rtl="0">
+              <a:spcBef>
+                <a:spcPts val="0"/>
+              </a:spcBef>
+              <a:spcAft>
+                <a:spcPts val="0"/>
+              </a:spcAft>
+              <a:buClr>
+                <a:schemeClr val="dk1"/>
+              </a:buClr>
+              <a:buSzPts val="1100"/>
+              <a:buFont typeface="Arial"/>
+              <a:buNone/>
+            </a:pPr>
+            <a:endParaRPr lang="en-US" smtClean="0">
+              <a:solidFill>
+                <a:srgbClr val="39373D"/>
+              </a:solidFill>
+            </a:endParaRPr>
+          </a:p>
+          <a:p>
+            <a:pPr marL="0" lvl="0" indent="0" algn="l" rtl="0">
+              <a:spcBef>
+                <a:spcPts val="0"/>
+              </a:spcBef>
+              <a:spcAft>
+                <a:spcPts val="0"/>
+              </a:spcAft>
+              <a:buClr>
+                <a:schemeClr val="dk1"/>
+              </a:buClr>
+              <a:buSzPts val="1100"/>
+              <a:buFont typeface="Arial"/>
+              <a:buNone/>
+            </a:pPr>
+            <a:endParaRPr/>
           </a:p>
         </p:txBody>
       </p:sp>
@@ -1593,6 +1624,286 @@
     </p:spTree>
     <p:extLst>
       <p:ext uri="{BB962C8B-B14F-4D97-AF65-F5344CB8AC3E}">
+        <p14:creationId xmlns:p14="http://schemas.microsoft.com/office/powerpoint/2010/main" val="2729791648"/>
+      </p:ext>
+    </p:extLst>
+  </p:cSld>
+  <p:clrMapOvr>
+    <a:masterClrMapping/>
+  </p:clrMapOvr>
+</p:notes>
+</file>
+
+<file path=ppt/notesSlides/notesSlide6.xml><?xml version="1.0" encoding="utf-8"?>
+<p:notes xmlns:a="http://schemas.openxmlformats.org/drawingml/2006/main" xmlns:r="http://schemas.openxmlformats.org/officeDocument/2006/relationships" xmlns:p="http://schemas.openxmlformats.org/presentationml/2006/main" showMasterSp="0" showMasterPhAnim="0">
+  <p:cSld>
+    <p:spTree>
+      <p:nvGrpSpPr>
+        <p:cNvPr id="1" name="Shape 88"/>
+        <p:cNvGrpSpPr/>
+        <p:nvPr/>
+      </p:nvGrpSpPr>
+      <p:grpSpPr>
+        <a:xfrm>
+          <a:off x="0" y="0"/>
+          <a:ext cx="0" cy="0"/>
+          <a:chOff x="0" y="0"/>
+          <a:chExt cx="0" cy="0"/>
+        </a:xfrm>
+      </p:grpSpPr>
+      <p:sp>
+        <p:nvSpPr>
+          <p:cNvPr id="89" name="Google Shape;89;g80294dfa11_0_4:notes"/>
+          <p:cNvSpPr txBox="1">
+            <a:spLocks noGrp="1"/>
+          </p:cNvSpPr>
+          <p:nvPr>
+            <p:ph type="body" idx="1"/>
+          </p:nvPr>
+        </p:nvSpPr>
+        <p:spPr>
+          <a:xfrm>
+            <a:off x="914400" y="2443150"/>
+            <a:ext cx="7315200" cy="2314500"/>
+          </a:xfrm>
+          <a:prstGeom prst="rect">
+            <a:avLst/>
+          </a:prstGeom>
+          <a:noFill/>
+          <a:ln>
+            <a:noFill/>
+          </a:ln>
+        </p:spPr>
+        <p:txBody>
+          <a:bodyPr spcFirstLastPara="1" wrap="square" lIns="91425" tIns="91425" rIns="91425" bIns="91425" anchor="t" anchorCtr="0">
+            <a:noAutofit/>
+          </a:bodyPr>
+          <a:lstStyle/>
+          <a:p>
+            <a:pPr marL="0" lvl="0" indent="0" algn="l" rtl="0">
+              <a:spcBef>
+                <a:spcPts val="0"/>
+              </a:spcBef>
+              <a:spcAft>
+                <a:spcPts val="0"/>
+              </a:spcAft>
+              <a:buClr>
+                <a:schemeClr val="dk1"/>
+              </a:buClr>
+              <a:buSzPts val="1100"/>
+              <a:buFont typeface="Arial"/>
+              <a:buNone/>
+            </a:pPr>
+            <a:r>
+              <a:rPr lang="en-US" dirty="0" err="1">
+                <a:solidFill>
+                  <a:srgbClr val="39373D"/>
+                </a:solidFill>
+              </a:rPr>
+              <a:t>adv_multigpu</a:t>
+            </a:r>
+            <a:endParaRPr dirty="0"/>
+          </a:p>
+        </p:txBody>
+      </p:sp>
+      <p:sp>
+        <p:nvSpPr>
+          <p:cNvPr id="90" name="Google Shape;90;g80294dfa11_0_4:notes"/>
+          <p:cNvSpPr>
+            <a:spLocks noGrp="1" noRot="1" noChangeAspect="1"/>
+          </p:cNvSpPr>
+          <p:nvPr>
+            <p:ph type="sldImg" idx="2"/>
+          </p:nvPr>
+        </p:nvSpPr>
+        <p:spPr>
+          <a:xfrm>
+            <a:off x="2857500" y="385763"/>
+            <a:ext cx="3429000" cy="1928812"/>
+          </a:xfrm>
+          <a:custGeom>
+            <a:avLst/>
+            <a:gdLst/>
+            <a:ahLst/>
+            <a:cxnLst/>
+            <a:rect l="l" t="t" r="r" b="b"/>
+            <a:pathLst>
+              <a:path w="120000" h="120000" extrusionOk="0">
+                <a:moveTo>
+                  <a:pt x="0" y="0"/>
+                </a:moveTo>
+                <a:lnTo>
+                  <a:pt x="120000" y="0"/>
+                </a:lnTo>
+                <a:lnTo>
+                  <a:pt x="120000" y="120000"/>
+                </a:lnTo>
+                <a:lnTo>
+                  <a:pt x="0" y="120000"/>
+                </a:lnTo>
+                <a:close/>
+              </a:path>
+            </a:pathLst>
+          </a:custGeom>
+          <a:noFill/>
+          <a:ln w="9525" cap="flat" cmpd="sng">
+            <a:solidFill>
+              <a:srgbClr val="000000"/>
+            </a:solidFill>
+            <a:prstDash val="solid"/>
+            <a:round/>
+            <a:headEnd type="none" w="sm" len="sm"/>
+            <a:tailEnd type="none" w="sm" len="sm"/>
+          </a:ln>
+        </p:spPr>
+      </p:sp>
+    </p:spTree>
+    <p:extLst>
+      <p:ext uri="{BB962C8B-B14F-4D97-AF65-F5344CB8AC3E}">
+        <p14:creationId xmlns:p14="http://schemas.microsoft.com/office/powerpoint/2010/main" val="1240623699"/>
+      </p:ext>
+    </p:extLst>
+  </p:cSld>
+  <p:clrMapOvr>
+    <a:masterClrMapping/>
+  </p:clrMapOvr>
+</p:notes>
+</file>
+
+<file path=ppt/notesSlides/notesSlide7.xml><?xml version="1.0" encoding="utf-8"?>
+<p:notes xmlns:a="http://schemas.openxmlformats.org/drawingml/2006/main" xmlns:r="http://schemas.openxmlformats.org/officeDocument/2006/relationships" xmlns:p="http://schemas.openxmlformats.org/presentationml/2006/main" showMasterSp="0" showMasterPhAnim="0">
+  <p:cSld>
+    <p:spTree>
+      <p:nvGrpSpPr>
+        <p:cNvPr id="1" name="Shape 88"/>
+        <p:cNvGrpSpPr/>
+        <p:nvPr/>
+      </p:nvGrpSpPr>
+      <p:grpSpPr>
+        <a:xfrm>
+          <a:off x="0" y="0"/>
+          <a:ext cx="0" cy="0"/>
+          <a:chOff x="0" y="0"/>
+          <a:chExt cx="0" cy="0"/>
+        </a:xfrm>
+      </p:grpSpPr>
+      <p:sp>
+        <p:nvSpPr>
+          <p:cNvPr id="89" name="Google Shape;89;g80294dfa11_0_4:notes"/>
+          <p:cNvSpPr txBox="1">
+            <a:spLocks noGrp="1"/>
+          </p:cNvSpPr>
+          <p:nvPr>
+            <p:ph type="body" idx="1"/>
+          </p:nvPr>
+        </p:nvSpPr>
+        <p:spPr>
+          <a:xfrm>
+            <a:off x="914400" y="2443150"/>
+            <a:ext cx="7315200" cy="2314500"/>
+          </a:xfrm>
+          <a:prstGeom prst="rect">
+            <a:avLst/>
+          </a:prstGeom>
+          <a:noFill/>
+          <a:ln>
+            <a:noFill/>
+          </a:ln>
+        </p:spPr>
+        <p:txBody>
+          <a:bodyPr spcFirstLastPara="1" wrap="square" lIns="91425" tIns="91425" rIns="91425" bIns="91425" anchor="t" anchorCtr="0">
+            <a:noAutofit/>
+          </a:bodyPr>
+          <a:lstStyle/>
+          <a:p>
+            <a:pPr marL="0" lvl="0" indent="0" algn="l" rtl="0">
+              <a:spcBef>
+                <a:spcPts val="0"/>
+              </a:spcBef>
+              <a:spcAft>
+                <a:spcPts val="0"/>
+              </a:spcAft>
+              <a:buClr>
+                <a:schemeClr val="dk1"/>
+              </a:buClr>
+              <a:buSzPts val="1100"/>
+              <a:buFont typeface="Arial"/>
+              <a:buNone/>
+            </a:pPr>
+            <a:r>
+              <a:rPr lang="en-US" smtClean="0">
+                <a:solidFill>
+                  <a:srgbClr val="39373D"/>
+                </a:solidFill>
+              </a:rPr>
+              <a:t>adv_</a:t>
+            </a:r>
+            <a:r>
+              <a:rPr lang="en-US" altLang="zh-CN" smtClean="0">
+                <a:solidFill>
+                  <a:srgbClr val="39373D"/>
+                </a:solidFill>
+              </a:rPr>
+              <a:t>rss</a:t>
+            </a:r>
+            <a:endParaRPr dirty="0"/>
+          </a:p>
+        </p:txBody>
+      </p:sp>
+      <p:sp>
+        <p:nvSpPr>
+          <p:cNvPr id="90" name="Google Shape;90;g80294dfa11_0_4:notes"/>
+          <p:cNvSpPr>
+            <a:spLocks noGrp="1" noRot="1" noChangeAspect="1"/>
+          </p:cNvSpPr>
+          <p:nvPr>
+            <p:ph type="sldImg" idx="2"/>
+          </p:nvPr>
+        </p:nvSpPr>
+        <p:spPr>
+          <a:xfrm>
+            <a:off x="2857500" y="385763"/>
+            <a:ext cx="3429000" cy="1928812"/>
+          </a:xfrm>
+          <a:custGeom>
+            <a:avLst/>
+            <a:gdLst/>
+            <a:ahLst/>
+            <a:cxnLst/>
+            <a:rect l="l" t="t" r="r" b="b"/>
+            <a:pathLst>
+              <a:path w="120000" h="120000" extrusionOk="0">
+                <a:moveTo>
+                  <a:pt x="0" y="0"/>
+                </a:moveTo>
+                <a:lnTo>
+                  <a:pt x="120000" y="0"/>
+                </a:lnTo>
+                <a:lnTo>
+                  <a:pt x="120000" y="120000"/>
+                </a:lnTo>
+                <a:lnTo>
+                  <a:pt x="0" y="120000"/>
+                </a:lnTo>
+                <a:close/>
+              </a:path>
+            </a:pathLst>
+          </a:custGeom>
+          <a:noFill/>
+          <a:ln w="9525" cap="flat" cmpd="sng">
+            <a:solidFill>
+              <a:srgbClr val="000000"/>
+            </a:solidFill>
+            <a:prstDash val="solid"/>
+            <a:round/>
+            <a:headEnd type="none" w="sm" len="sm"/>
+            <a:tailEnd type="none" w="sm" len="sm"/>
+          </a:ln>
+        </p:spPr>
+      </p:sp>
+    </p:spTree>
+    <p:extLst>
+      <p:ext uri="{BB962C8B-B14F-4D97-AF65-F5344CB8AC3E}">
         <p14:creationId xmlns:p14="http://schemas.microsoft.com/office/powerpoint/2010/main" val="1768176120"/>
       </p:ext>
     </p:extLst>
@@ -1603,7 +1914,7 @@
 </p:notes>
 </file>
 
-<file path=ppt/notesSlides/notesSlide6.xml><?xml version="1.0" encoding="utf-8"?>
+<file path=ppt/notesSlides/notesSlide8.xml><?xml version="1.0" encoding="utf-8"?>
 <p:notes xmlns:a="http://schemas.openxmlformats.org/drawingml/2006/main" xmlns:r="http://schemas.openxmlformats.org/officeDocument/2006/relationships" xmlns:p="http://schemas.openxmlformats.org/presentationml/2006/main" showMasterSp="0" showMasterPhAnim="0">
   <p:cSld>
     <p:spTree>
@@ -12416,6 +12727,13 @@
   <p:clrMapOvr>
     <a:masterClrMapping/>
   </p:clrMapOvr>
+  <p:timing>
+    <p:tnLst>
+      <p:par>
+        <p:cTn id="1" dur="indefinite" restart="never" nodeType="tmRoot"/>
+      </p:par>
+    </p:tnLst>
+  </p:timing>
 </p:sld>
 </file>
 
@@ -14146,6 +14464,13 @@
   <p:clrMapOvr>
     <a:masterClrMapping/>
   </p:clrMapOvr>
+  <p:timing>
+    <p:tnLst>
+      <p:par>
+        <p:cTn id="1" dur="indefinite" restart="never" nodeType="tmRoot"/>
+      </p:par>
+    </p:tnLst>
+  </p:timing>
 </p:sld>
 </file>
 
@@ -15158,6 +15483,13 @@
   <p:clrMapOvr>
     <a:masterClrMapping/>
   </p:clrMapOvr>
+  <p:timing>
+    <p:tnLst>
+      <p:par>
+        <p:cTn id="1" dur="indefinite" restart="never" nodeType="tmRoot"/>
+      </p:par>
+    </p:tnLst>
+  </p:timing>
 </p:sld>
 </file>
 
@@ -15180,6 +15512,1373 @@
       </p:grpSpPr>
       <p:sp>
         <p:nvSpPr>
+          <p:cNvPr id="33" name="矩形 32"/>
+          <p:cNvSpPr/>
+          <p:nvPr/>
+        </p:nvSpPr>
+        <p:spPr>
+          <a:xfrm>
+            <a:off x="2947614" y="3277732"/>
+            <a:ext cx="1304418" cy="434470"/>
+          </a:xfrm>
+          <a:prstGeom prst="rect">
+            <a:avLst/>
+          </a:prstGeom>
+          <a:solidFill>
+            <a:schemeClr val="bg1"/>
+          </a:solidFill>
+          <a:ln>
+            <a:noFill/>
+          </a:ln>
+        </p:spPr>
+        <p:style>
+          <a:lnRef idx="2">
+            <a:schemeClr val="accent1">
+              <a:shade val="50000"/>
+            </a:schemeClr>
+          </a:lnRef>
+          <a:fillRef idx="1">
+            <a:schemeClr val="accent1"/>
+          </a:fillRef>
+          <a:effectRef idx="0">
+            <a:schemeClr val="accent1"/>
+          </a:effectRef>
+          <a:fontRef idx="minor">
+            <a:schemeClr val="lt1"/>
+          </a:fontRef>
+        </p:style>
+        <p:txBody>
+          <a:bodyPr rtlCol="0" anchor="ctr"/>
+          <a:lstStyle/>
+          <a:p>
+            <a:pPr algn="ctr"/>
+            <a:r>
+              <a:rPr lang="zh-CN" altLang="en-US" b="1" smtClean="0">
+                <a:solidFill>
+                  <a:schemeClr val="tx1"/>
+                </a:solidFill>
+                <a:sym typeface="Wingdings 2" panose="05020102010507070707" pitchFamily="18" charset="2"/>
+              </a:rPr>
+              <a:t> 生成</a:t>
+            </a:r>
+            <a:r>
+              <a:rPr lang="zh-CN" altLang="en-US" b="1" smtClean="0">
+                <a:solidFill>
+                  <a:schemeClr val="tx1"/>
+                </a:solidFill>
+              </a:rPr>
+              <a:t>独特</a:t>
+            </a:r>
+            <a:endParaRPr lang="en-US" altLang="zh-CN" b="1" smtClean="0">
+              <a:solidFill>
+                <a:schemeClr val="tx1"/>
+              </a:solidFill>
+            </a:endParaRPr>
+          </a:p>
+          <a:p>
+            <a:pPr algn="ctr"/>
+            <a:r>
+              <a:rPr lang="zh-CN" altLang="en-US" b="1" smtClean="0">
+                <a:solidFill>
+                  <a:schemeClr val="tx1"/>
+                </a:solidFill>
+              </a:rPr>
+              <a:t>的 </a:t>
+            </a:r>
+            <a:r>
+              <a:rPr lang="en-US" altLang="zh-CN" b="1" smtClean="0">
+                <a:solidFill>
+                  <a:schemeClr val="tx1"/>
+                </a:solidFill>
+              </a:rPr>
+              <a:t>Carla </a:t>
+            </a:r>
+            <a:r>
+              <a:rPr lang="zh-CN" altLang="en-US" b="1" smtClean="0">
+                <a:solidFill>
+                  <a:schemeClr val="tx1"/>
+                </a:solidFill>
+              </a:rPr>
+              <a:t>地图</a:t>
+            </a:r>
+            <a:endParaRPr lang="zh-CN" altLang="en-US" b="1">
+              <a:solidFill>
+                <a:schemeClr val="tx1"/>
+              </a:solidFill>
+            </a:endParaRPr>
+          </a:p>
+        </p:txBody>
+      </p:sp>
+      <p:sp>
+        <p:nvSpPr>
+          <p:cNvPr id="73" name="矩形 72"/>
+          <p:cNvSpPr/>
+          <p:nvPr/>
+        </p:nvSpPr>
+        <p:spPr>
+          <a:xfrm>
+            <a:off x="1152606" y="2243739"/>
+            <a:ext cx="1922874" cy="434470"/>
+          </a:xfrm>
+          <a:prstGeom prst="rect">
+            <a:avLst/>
+          </a:prstGeom>
+          <a:solidFill>
+            <a:schemeClr val="bg1"/>
+          </a:solidFill>
+          <a:ln>
+            <a:noFill/>
+          </a:ln>
+        </p:spPr>
+        <p:style>
+          <a:lnRef idx="2">
+            <a:schemeClr val="accent1">
+              <a:shade val="50000"/>
+            </a:schemeClr>
+          </a:lnRef>
+          <a:fillRef idx="1">
+            <a:schemeClr val="accent1"/>
+          </a:fillRef>
+          <a:effectRef idx="0">
+            <a:schemeClr val="accent1"/>
+          </a:effectRef>
+          <a:fontRef idx="minor">
+            <a:schemeClr val="lt1"/>
+          </a:fontRef>
+        </p:style>
+        <p:txBody>
+          <a:bodyPr rtlCol="0" anchor="ctr"/>
+          <a:lstStyle/>
+          <a:p>
+            <a:pPr algn="ctr"/>
+            <a:r>
+              <a:rPr lang="en-US" altLang="zh-CN" b="1" smtClean="0">
+                <a:solidFill>
+                  <a:schemeClr val="tx1"/>
+                </a:solidFill>
+              </a:rPr>
+              <a:t>OpenStreetMap </a:t>
+            </a:r>
+            <a:r>
+              <a:rPr lang="zh-CN" altLang="en-US" b="1" smtClean="0">
+                <a:solidFill>
+                  <a:schemeClr val="tx1"/>
+                </a:solidFill>
+              </a:rPr>
+              <a:t>区域</a:t>
+            </a:r>
+            <a:r>
+              <a:rPr lang="zh-CN" altLang="en-US" b="1" smtClean="0">
+                <a:solidFill>
+                  <a:schemeClr val="tx1"/>
+                </a:solidFill>
+              </a:rPr>
+              <a:t>（</a:t>
+            </a:r>
+            <a:r>
+              <a:rPr lang="en-US" altLang="zh-CN" b="1" smtClean="0">
+                <a:solidFill>
+                  <a:schemeClr val="tx1"/>
+                </a:solidFill>
+              </a:rPr>
+              <a:t>URL</a:t>
+            </a:r>
+            <a:r>
+              <a:rPr lang="zh-CN" altLang="en-US" b="1" smtClean="0">
+                <a:solidFill>
+                  <a:schemeClr val="tx1"/>
+                </a:solidFill>
+              </a:rPr>
+              <a:t>或</a:t>
+            </a:r>
+            <a:r>
+              <a:rPr lang="en-US" altLang="zh-CN" b="1" smtClean="0">
+                <a:solidFill>
+                  <a:schemeClr val="tx1"/>
+                </a:solidFill>
+              </a:rPr>
+              <a:t>.osm</a:t>
+            </a:r>
+            <a:r>
+              <a:rPr lang="zh-CN" altLang="en-US" b="1" smtClean="0">
+                <a:solidFill>
+                  <a:schemeClr val="tx1"/>
+                </a:solidFill>
+              </a:rPr>
+              <a:t>）</a:t>
+            </a:r>
+            <a:endParaRPr lang="zh-CN" altLang="en-US" b="1">
+              <a:solidFill>
+                <a:schemeClr val="tx1"/>
+              </a:solidFill>
+            </a:endParaRPr>
+          </a:p>
+        </p:txBody>
+      </p:sp>
+      <p:pic>
+        <p:nvPicPr>
+          <p:cNvPr id="3" name="图片 2"/>
+          <p:cNvPicPr>
+            <a:picLocks noChangeAspect="1"/>
+          </p:cNvPicPr>
+          <p:nvPr/>
+        </p:nvPicPr>
+        <p:blipFill>
+          <a:blip r:embed="rId3">
+            <a:extLst>
+              <a:ext uri="{28A0092B-C50C-407E-A947-70E740481C1C}">
+                <a14:useLocalDpi xmlns:a14="http://schemas.microsoft.com/office/drawing/2010/main" val="0"/>
+              </a:ext>
+            </a:extLst>
+          </a:blip>
+          <a:stretch>
+            <a:fillRect/>
+          </a:stretch>
+        </p:blipFill>
+        <p:spPr>
+          <a:xfrm>
+            <a:off x="1223603" y="646020"/>
+            <a:ext cx="1809750" cy="1571625"/>
+          </a:xfrm>
+          <a:prstGeom prst="rect">
+            <a:avLst/>
+          </a:prstGeom>
+        </p:spPr>
+      </p:pic>
+      <p:pic>
+        <p:nvPicPr>
+          <p:cNvPr id="5" name="图片 4"/>
+          <p:cNvPicPr>
+            <a:picLocks noChangeAspect="1"/>
+          </p:cNvPicPr>
+          <p:nvPr/>
+        </p:nvPicPr>
+        <p:blipFill>
+          <a:blip r:embed="rId4">
+            <a:extLst>
+              <a:ext uri="{28A0092B-C50C-407E-A947-70E740481C1C}">
+                <a14:useLocalDpi xmlns:a14="http://schemas.microsoft.com/office/drawing/2010/main" val="0"/>
+              </a:ext>
+            </a:extLst>
+          </a:blip>
+          <a:stretch>
+            <a:fillRect/>
+          </a:stretch>
+        </p:blipFill>
+        <p:spPr>
+          <a:xfrm>
+            <a:off x="4124165" y="650783"/>
+            <a:ext cx="1771650" cy="1562100"/>
+          </a:xfrm>
+          <a:prstGeom prst="rect">
+            <a:avLst/>
+          </a:prstGeom>
+        </p:spPr>
+      </p:pic>
+      <p:pic>
+        <p:nvPicPr>
+          <p:cNvPr id="7" name="图片 6"/>
+          <p:cNvPicPr>
+            <a:picLocks noChangeAspect="1"/>
+          </p:cNvPicPr>
+          <p:nvPr/>
+        </p:nvPicPr>
+        <p:blipFill>
+          <a:blip r:embed="rId5">
+            <a:extLst>
+              <a:ext uri="{28A0092B-C50C-407E-A947-70E740481C1C}">
+                <a14:useLocalDpi xmlns:a14="http://schemas.microsoft.com/office/drawing/2010/main" val="0"/>
+              </a:ext>
+            </a:extLst>
+          </a:blip>
+          <a:stretch>
+            <a:fillRect/>
+          </a:stretch>
+        </p:blipFill>
+        <p:spPr>
+          <a:xfrm>
+            <a:off x="4124165" y="3024766"/>
+            <a:ext cx="1781175" cy="1543050"/>
+          </a:xfrm>
+          <a:prstGeom prst="rect">
+            <a:avLst/>
+          </a:prstGeom>
+        </p:spPr>
+      </p:pic>
+      <p:sp>
+        <p:nvSpPr>
+          <p:cNvPr id="30" name="矩形 29"/>
+          <p:cNvSpPr/>
+          <p:nvPr/>
+        </p:nvSpPr>
+        <p:spPr>
+          <a:xfrm>
+            <a:off x="5080907" y="2372459"/>
+            <a:ext cx="1014292" cy="434470"/>
+          </a:xfrm>
+          <a:prstGeom prst="rect">
+            <a:avLst/>
+          </a:prstGeom>
+          <a:solidFill>
+            <a:schemeClr val="bg1"/>
+          </a:solidFill>
+          <a:ln>
+            <a:noFill/>
+          </a:ln>
+        </p:spPr>
+        <p:style>
+          <a:lnRef idx="2">
+            <a:schemeClr val="accent1">
+              <a:shade val="50000"/>
+            </a:schemeClr>
+          </a:lnRef>
+          <a:fillRef idx="1">
+            <a:schemeClr val="accent1"/>
+          </a:fillRef>
+          <a:effectRef idx="0">
+            <a:schemeClr val="accent1"/>
+          </a:effectRef>
+          <a:fontRef idx="minor">
+            <a:schemeClr val="lt1"/>
+          </a:fontRef>
+        </p:style>
+        <p:txBody>
+          <a:bodyPr rtlCol="0" anchor="ctr"/>
+          <a:lstStyle/>
+          <a:p>
+            <a:pPr algn="ctr"/>
+            <a:r>
+              <a:rPr lang="zh-CN" altLang="en-US" sz="1500" b="1" smtClean="0">
+                <a:solidFill>
+                  <a:schemeClr val="tx1"/>
+                </a:solidFill>
+                <a:sym typeface="Wingdings 2" panose="05020102010507070707" pitchFamily="18" charset="2"/>
+              </a:rPr>
+              <a:t></a:t>
+            </a:r>
+            <a:r>
+              <a:rPr lang="zh-CN" altLang="en-US" b="1" smtClean="0">
+                <a:solidFill>
+                  <a:schemeClr val="tx1"/>
+                </a:solidFill>
+                <a:sym typeface="Wingdings 2" panose="05020102010507070707" pitchFamily="18" charset="2"/>
+              </a:rPr>
+              <a:t> </a:t>
+            </a:r>
+            <a:r>
+              <a:rPr lang="zh-CN" altLang="en-US" b="1" smtClean="0">
+                <a:solidFill>
+                  <a:schemeClr val="tx1"/>
+                </a:solidFill>
+              </a:rPr>
+              <a:t>程序化</a:t>
+            </a:r>
+            <a:endParaRPr lang="en-US" altLang="zh-CN" b="1" smtClean="0">
+              <a:solidFill>
+                <a:schemeClr val="tx1"/>
+              </a:solidFill>
+            </a:endParaRPr>
+          </a:p>
+          <a:p>
+            <a:pPr algn="ctr"/>
+            <a:r>
+              <a:rPr lang="zh-CN" altLang="en-US" b="1" smtClean="0">
+                <a:solidFill>
+                  <a:schemeClr val="tx1"/>
+                </a:solidFill>
+              </a:rPr>
+              <a:t>建筑生成</a:t>
+            </a:r>
+            <a:endParaRPr lang="zh-CN" altLang="en-US" b="1">
+              <a:solidFill>
+                <a:schemeClr val="tx1"/>
+              </a:solidFill>
+            </a:endParaRPr>
+          </a:p>
+        </p:txBody>
+      </p:sp>
+      <p:pic>
+        <p:nvPicPr>
+          <p:cNvPr id="9" name="图片 8"/>
+          <p:cNvPicPr>
+            <a:picLocks noChangeAspect="1"/>
+          </p:cNvPicPr>
+          <p:nvPr/>
+        </p:nvPicPr>
+        <p:blipFill>
+          <a:blip r:embed="rId6">
+            <a:extLst>
+              <a:ext uri="{28A0092B-C50C-407E-A947-70E740481C1C}">
+                <a14:useLocalDpi xmlns:a14="http://schemas.microsoft.com/office/drawing/2010/main" val="0"/>
+              </a:ext>
+            </a:extLst>
+          </a:blip>
+          <a:stretch>
+            <a:fillRect/>
+          </a:stretch>
+        </p:blipFill>
+        <p:spPr>
+          <a:xfrm>
+            <a:off x="1284780" y="2998695"/>
+            <a:ext cx="1790700" cy="1562100"/>
+          </a:xfrm>
+          <a:prstGeom prst="rect">
+            <a:avLst/>
+          </a:prstGeom>
+        </p:spPr>
+      </p:pic>
+      <p:cxnSp>
+        <p:nvCxnSpPr>
+          <p:cNvPr id="14" name="直接箭头连接符 13"/>
+          <p:cNvCxnSpPr>
+            <a:stCxn id="3" idx="3"/>
+            <a:endCxn id="5" idx="1"/>
+          </p:cNvCxnSpPr>
+          <p:nvPr/>
+        </p:nvCxnSpPr>
+        <p:spPr>
+          <a:xfrm>
+            <a:off x="3033353" y="1431833"/>
+            <a:ext cx="1090812" cy="0"/>
+          </a:xfrm>
+          <a:prstGeom prst="straightConnector1">
+            <a:avLst/>
+          </a:prstGeom>
+          <a:ln w="19050">
+            <a:tailEnd type="triangle"/>
+          </a:ln>
+        </p:spPr>
+        <p:style>
+          <a:lnRef idx="1">
+            <a:schemeClr val="accent1"/>
+          </a:lnRef>
+          <a:fillRef idx="0">
+            <a:schemeClr val="accent1"/>
+          </a:fillRef>
+          <a:effectRef idx="0">
+            <a:schemeClr val="accent1"/>
+          </a:effectRef>
+          <a:fontRef idx="minor">
+            <a:schemeClr val="tx1"/>
+          </a:fontRef>
+        </p:style>
+      </p:cxnSp>
+      <p:cxnSp>
+        <p:nvCxnSpPr>
+          <p:cNvPr id="17" name="直接箭头连接符 16"/>
+          <p:cNvCxnSpPr>
+            <a:endCxn id="7" idx="0"/>
+          </p:cNvCxnSpPr>
+          <p:nvPr/>
+        </p:nvCxnSpPr>
+        <p:spPr>
+          <a:xfrm>
+            <a:off x="5009990" y="2243739"/>
+            <a:ext cx="4763" cy="781027"/>
+          </a:xfrm>
+          <a:prstGeom prst="straightConnector1">
+            <a:avLst/>
+          </a:prstGeom>
+          <a:ln w="19050">
+            <a:tailEnd type="triangle"/>
+          </a:ln>
+        </p:spPr>
+        <p:style>
+          <a:lnRef idx="1">
+            <a:schemeClr val="accent1"/>
+          </a:lnRef>
+          <a:fillRef idx="0">
+            <a:schemeClr val="accent1"/>
+          </a:fillRef>
+          <a:effectRef idx="0">
+            <a:schemeClr val="accent1"/>
+          </a:effectRef>
+          <a:fontRef idx="minor">
+            <a:schemeClr val="tx1"/>
+          </a:fontRef>
+        </p:style>
+      </p:cxnSp>
+      <p:cxnSp>
+        <p:nvCxnSpPr>
+          <p:cNvPr id="24" name="直接箭头连接符 23"/>
+          <p:cNvCxnSpPr>
+            <a:stCxn id="7" idx="1"/>
+          </p:cNvCxnSpPr>
+          <p:nvPr/>
+        </p:nvCxnSpPr>
+        <p:spPr>
+          <a:xfrm flipH="1">
+            <a:off x="3119571" y="3796291"/>
+            <a:ext cx="1004594" cy="0"/>
+          </a:xfrm>
+          <a:prstGeom prst="straightConnector1">
+            <a:avLst/>
+          </a:prstGeom>
+          <a:ln w="19050">
+            <a:tailEnd type="triangle"/>
+          </a:ln>
+        </p:spPr>
+        <p:style>
+          <a:lnRef idx="1">
+            <a:schemeClr val="accent1"/>
+          </a:lnRef>
+          <a:fillRef idx="0">
+            <a:schemeClr val="accent1"/>
+          </a:fillRef>
+          <a:effectRef idx="0">
+            <a:schemeClr val="accent1"/>
+          </a:effectRef>
+          <a:fontRef idx="minor">
+            <a:schemeClr val="tx1"/>
+          </a:fontRef>
+        </p:style>
+      </p:cxnSp>
+      <p:sp>
+        <p:nvSpPr>
+          <p:cNvPr id="25" name="文本框 24"/>
+          <p:cNvSpPr txBox="1"/>
+          <p:nvPr/>
+        </p:nvSpPr>
+        <p:spPr>
+          <a:xfrm>
+            <a:off x="3011360" y="1066625"/>
+            <a:ext cx="1124026" cy="323165"/>
+          </a:xfrm>
+          <a:prstGeom prst="rect">
+            <a:avLst/>
+          </a:prstGeom>
+          <a:noFill/>
+        </p:spPr>
+        <p:txBody>
+          <a:bodyPr wrap="none" rtlCol="0">
+            <a:spAutoFit/>
+          </a:bodyPr>
+          <a:lstStyle/>
+          <a:p>
+            <a:r>
+              <a:rPr lang="zh-CN" altLang="en-US" sz="1500" smtClean="0">
+                <a:sym typeface="Wingdings 2" panose="05020102010507070707" pitchFamily="18" charset="2"/>
+              </a:rPr>
+              <a:t></a:t>
+            </a:r>
+            <a:r>
+              <a:rPr lang="zh-CN" altLang="en-US" smtClean="0">
+                <a:sym typeface="Wingdings 2" panose="05020102010507070707" pitchFamily="18" charset="2"/>
+              </a:rPr>
+              <a:t> 路网抽取</a:t>
+            </a:r>
+            <a:endParaRPr lang="zh-CN" altLang="en-US"/>
+          </a:p>
+        </p:txBody>
+      </p:sp>
+      <p:sp>
+        <p:nvSpPr>
+          <p:cNvPr id="50" name="文本框 49"/>
+          <p:cNvSpPr txBox="1"/>
+          <p:nvPr/>
+        </p:nvSpPr>
+        <p:spPr>
+          <a:xfrm>
+            <a:off x="5837804" y="1228207"/>
+            <a:ext cx="582211" cy="307777"/>
+          </a:xfrm>
+          <a:prstGeom prst="rect">
+            <a:avLst/>
+          </a:prstGeom>
+          <a:noFill/>
+        </p:spPr>
+        <p:txBody>
+          <a:bodyPr wrap="none" rtlCol="0">
+            <a:spAutoFit/>
+          </a:bodyPr>
+          <a:lstStyle/>
+          <a:p>
+            <a:r>
+              <a:rPr lang="en-US" altLang="zh-CN" smtClean="0">
+                <a:sym typeface="Wingdings 2" panose="05020102010507070707" pitchFamily="18" charset="2"/>
+              </a:rPr>
+              <a:t>.xodr</a:t>
+            </a:r>
+            <a:endParaRPr lang="zh-CN" altLang="en-US"/>
+          </a:p>
+        </p:txBody>
+      </p:sp>
+      <p:sp>
+        <p:nvSpPr>
+          <p:cNvPr id="51" name="文本框 50"/>
+          <p:cNvSpPr txBox="1"/>
+          <p:nvPr/>
+        </p:nvSpPr>
+        <p:spPr>
+          <a:xfrm>
+            <a:off x="3181683" y="1434660"/>
+            <a:ext cx="880369" cy="307777"/>
+          </a:xfrm>
+          <a:prstGeom prst="rect">
+            <a:avLst/>
+          </a:prstGeom>
+          <a:noFill/>
+        </p:spPr>
+        <p:txBody>
+          <a:bodyPr wrap="none" rtlCol="0">
+            <a:spAutoFit/>
+          </a:bodyPr>
+          <a:lstStyle/>
+          <a:p>
+            <a:r>
+              <a:rPr lang="en-US" altLang="zh-CN" smtClean="0">
+                <a:sym typeface="Wingdings 2" panose="05020102010507070707" pitchFamily="18" charset="2"/>
+              </a:rPr>
+              <a:t>osm2odr</a:t>
+            </a:r>
+            <a:endParaRPr lang="zh-CN" altLang="en-US"/>
+          </a:p>
+        </p:txBody>
+      </p:sp>
+      <p:sp>
+        <p:nvSpPr>
+          <p:cNvPr id="53" name="文本框 52"/>
+          <p:cNvSpPr txBox="1"/>
+          <p:nvPr/>
+        </p:nvSpPr>
+        <p:spPr>
+          <a:xfrm>
+            <a:off x="3181683" y="2344178"/>
+            <a:ext cx="1911463" cy="523220"/>
+          </a:xfrm>
+          <a:prstGeom prst="rect">
+            <a:avLst/>
+          </a:prstGeom>
+          <a:noFill/>
+        </p:spPr>
+        <p:txBody>
+          <a:bodyPr wrap="square" rtlCol="0">
+            <a:spAutoFit/>
+          </a:bodyPr>
+          <a:lstStyle/>
+          <a:p>
+            <a:pPr algn="ctr"/>
+            <a:r>
+              <a:rPr lang="en-US" altLang="zh-CN">
+                <a:sym typeface="Wingdings 2" panose="05020102010507070707" pitchFamily="18" charset="2"/>
+              </a:rPr>
+              <a:t>UOpenDriveToMap</a:t>
+            </a:r>
+            <a:r>
+              <a:rPr lang="en-US" altLang="zh-CN" smtClean="0">
+                <a:sym typeface="Wingdings 2" panose="05020102010507070707" pitchFamily="18" charset="2"/>
+              </a:rPr>
+              <a:t>::</a:t>
+            </a:r>
+          </a:p>
+          <a:p>
+            <a:pPr algn="ctr"/>
+            <a:r>
+              <a:rPr lang="en-US" altLang="zh-CN" smtClean="0">
+                <a:sym typeface="Wingdings 2" panose="05020102010507070707" pitchFamily="18" charset="2"/>
+              </a:rPr>
+              <a:t>GenerateAll</a:t>
+            </a:r>
+            <a:endParaRPr lang="zh-CN" altLang="en-US"/>
+          </a:p>
+        </p:txBody>
+      </p:sp>
+    </p:spTree>
+    <p:extLst>
+      <p:ext uri="{BB962C8B-B14F-4D97-AF65-F5344CB8AC3E}">
+        <p14:creationId xmlns:p14="http://schemas.microsoft.com/office/powerpoint/2010/main" val="2227473386"/>
+      </p:ext>
+    </p:extLst>
+  </p:cSld>
+  <p:clrMapOvr>
+    <a:masterClrMapping/>
+  </p:clrMapOvr>
+  <p:timing>
+    <p:tnLst>
+      <p:par>
+        <p:cTn id="1" dur="indefinite" restart="never" nodeType="tmRoot"/>
+      </p:par>
+    </p:tnLst>
+  </p:timing>
+</p:sld>
+</file>
+
+<file path=ppt/slides/slide5.xml><?xml version="1.0" encoding="utf-8"?>
+<p:sld xmlns:a="http://schemas.openxmlformats.org/drawingml/2006/main" xmlns:r="http://schemas.openxmlformats.org/officeDocument/2006/relationships" xmlns:p="http://schemas.openxmlformats.org/presentationml/2006/main">
+  <p:cSld>
+    <p:spTree>
+      <p:nvGrpSpPr>
+        <p:cNvPr id="1" name="Shape 91"/>
+        <p:cNvGrpSpPr/>
+        <p:nvPr/>
+      </p:nvGrpSpPr>
+      <p:grpSpPr>
+        <a:xfrm>
+          <a:off x="0" y="0"/>
+          <a:ext cx="0" cy="0"/>
+          <a:chOff x="0" y="0"/>
+          <a:chExt cx="0" cy="0"/>
+        </a:xfrm>
+      </p:grpSpPr>
+      <p:sp>
+        <p:nvSpPr>
+          <p:cNvPr id="62" name="圆角矩形 61"/>
+          <p:cNvSpPr/>
+          <p:nvPr/>
+        </p:nvSpPr>
+        <p:spPr>
+          <a:xfrm>
+            <a:off x="3504975" y="1826382"/>
+            <a:ext cx="921091" cy="543209"/>
+          </a:xfrm>
+          <a:prstGeom prst="roundRect">
+            <a:avLst/>
+          </a:prstGeom>
+          <a:solidFill>
+            <a:schemeClr val="accent4">
+              <a:lumMod val="60000"/>
+              <a:lumOff val="40000"/>
+            </a:schemeClr>
+          </a:solidFill>
+        </p:spPr>
+        <p:style>
+          <a:lnRef idx="2">
+            <a:schemeClr val="accent1">
+              <a:shade val="50000"/>
+            </a:schemeClr>
+          </a:lnRef>
+          <a:fillRef idx="1">
+            <a:schemeClr val="accent1"/>
+          </a:fillRef>
+          <a:effectRef idx="0">
+            <a:schemeClr val="accent1"/>
+          </a:effectRef>
+          <a:fontRef idx="minor">
+            <a:schemeClr val="lt1"/>
+          </a:fontRef>
+        </p:style>
+        <p:txBody>
+          <a:bodyPr rtlCol="0" anchor="ctr"/>
+          <a:lstStyle/>
+          <a:p>
+            <a:pPr algn="ctr"/>
+            <a:r>
+              <a:rPr lang="zh-CN" altLang="en-US" b="1" smtClean="0">
+                <a:solidFill>
+                  <a:schemeClr val="tx1"/>
+                </a:solidFill>
+              </a:rPr>
+              <a:t>生成</a:t>
+            </a:r>
+            <a:endParaRPr lang="en-US" altLang="zh-CN" b="1" smtClean="0">
+              <a:solidFill>
+                <a:schemeClr val="tx1"/>
+              </a:solidFill>
+            </a:endParaRPr>
+          </a:p>
+          <a:p>
+            <a:pPr algn="ctr"/>
+            <a:r>
+              <a:rPr lang="zh-CN" altLang="en-US" b="1" smtClean="0">
+                <a:solidFill>
+                  <a:schemeClr val="tx1"/>
+                </a:solidFill>
+              </a:rPr>
+              <a:t>生成点</a:t>
+            </a:r>
+            <a:endParaRPr lang="zh-CN" altLang="en-US" b="1">
+              <a:solidFill>
+                <a:schemeClr val="tx1"/>
+              </a:solidFill>
+            </a:endParaRPr>
+          </a:p>
+        </p:txBody>
+      </p:sp>
+      <p:sp>
+        <p:nvSpPr>
+          <p:cNvPr id="64" name="圆角矩形 63"/>
+          <p:cNvSpPr/>
+          <p:nvPr/>
+        </p:nvSpPr>
+        <p:spPr>
+          <a:xfrm>
+            <a:off x="1888815" y="1826537"/>
+            <a:ext cx="1230830" cy="543209"/>
+          </a:xfrm>
+          <a:prstGeom prst="roundRect">
+            <a:avLst/>
+          </a:prstGeom>
+          <a:solidFill>
+            <a:schemeClr val="accent4">
+              <a:lumMod val="60000"/>
+              <a:lumOff val="40000"/>
+            </a:schemeClr>
+          </a:solidFill>
+        </p:spPr>
+        <p:style>
+          <a:lnRef idx="2">
+            <a:schemeClr val="accent1">
+              <a:shade val="50000"/>
+            </a:schemeClr>
+          </a:lnRef>
+          <a:fillRef idx="1">
+            <a:schemeClr val="accent1"/>
+          </a:fillRef>
+          <a:effectRef idx="0">
+            <a:schemeClr val="accent1"/>
+          </a:effectRef>
+          <a:fontRef idx="minor">
+            <a:schemeClr val="lt1"/>
+          </a:fontRef>
+        </p:style>
+        <p:txBody>
+          <a:bodyPr rtlCol="0" anchor="ctr"/>
+          <a:lstStyle/>
+          <a:p>
+            <a:pPr algn="ctr"/>
+            <a:r>
+              <a:rPr lang="zh-CN" altLang="en-US" b="1" smtClean="0">
+                <a:solidFill>
+                  <a:schemeClr val="tx1"/>
+                </a:solidFill>
+              </a:rPr>
+              <a:t>生成车道线</a:t>
+            </a:r>
+            <a:endParaRPr lang="zh-CN" altLang="en-US" b="1">
+              <a:solidFill>
+                <a:schemeClr val="tx1"/>
+              </a:solidFill>
+            </a:endParaRPr>
+          </a:p>
+        </p:txBody>
+      </p:sp>
+      <p:sp>
+        <p:nvSpPr>
+          <p:cNvPr id="66" name="圆角矩形 65"/>
+          <p:cNvSpPr/>
+          <p:nvPr/>
+        </p:nvSpPr>
+        <p:spPr>
+          <a:xfrm>
+            <a:off x="335556" y="1812675"/>
+            <a:ext cx="1208653" cy="567159"/>
+          </a:xfrm>
+          <a:prstGeom prst="roundRect">
+            <a:avLst/>
+          </a:prstGeom>
+          <a:solidFill>
+            <a:schemeClr val="accent4">
+              <a:lumMod val="60000"/>
+              <a:lumOff val="40000"/>
+            </a:schemeClr>
+          </a:solidFill>
+        </p:spPr>
+        <p:style>
+          <a:lnRef idx="2">
+            <a:schemeClr val="accent1">
+              <a:shade val="50000"/>
+            </a:schemeClr>
+          </a:lnRef>
+          <a:fillRef idx="1">
+            <a:schemeClr val="accent1"/>
+          </a:fillRef>
+          <a:effectRef idx="0">
+            <a:schemeClr val="accent1"/>
+          </a:effectRef>
+          <a:fontRef idx="minor">
+            <a:schemeClr val="lt1"/>
+          </a:fontRef>
+        </p:style>
+        <p:txBody>
+          <a:bodyPr rtlCol="0" anchor="ctr"/>
+          <a:lstStyle/>
+          <a:p>
+            <a:pPr algn="ctr"/>
+            <a:r>
+              <a:rPr lang="zh-CN" altLang="en-US" b="1" smtClean="0">
+                <a:solidFill>
+                  <a:schemeClr val="tx1"/>
+                </a:solidFill>
+              </a:rPr>
+              <a:t>生成路网</a:t>
+            </a:r>
+            <a:endParaRPr lang="zh-CN" altLang="en-US" b="1">
+              <a:solidFill>
+                <a:schemeClr val="tx1"/>
+              </a:solidFill>
+            </a:endParaRPr>
+          </a:p>
+        </p:txBody>
+      </p:sp>
+      <p:cxnSp>
+        <p:nvCxnSpPr>
+          <p:cNvPr id="42" name="直接箭头连接符 41"/>
+          <p:cNvCxnSpPr>
+            <a:stCxn id="64" idx="1"/>
+            <a:endCxn id="66" idx="3"/>
+          </p:cNvCxnSpPr>
+          <p:nvPr/>
+        </p:nvCxnSpPr>
+        <p:spPr>
+          <a:xfrm flipH="1" flipV="1">
+            <a:off x="1544209" y="2096255"/>
+            <a:ext cx="344606" cy="1887"/>
+          </a:xfrm>
+          <a:prstGeom prst="straightConnector1">
+            <a:avLst/>
+          </a:prstGeom>
+          <a:ln w="19050">
+            <a:headEnd type="triangle"/>
+            <a:tailEnd type="triangle"/>
+          </a:ln>
+        </p:spPr>
+        <p:style>
+          <a:lnRef idx="1">
+            <a:schemeClr val="accent1"/>
+          </a:lnRef>
+          <a:fillRef idx="0">
+            <a:schemeClr val="accent1"/>
+          </a:fillRef>
+          <a:effectRef idx="0">
+            <a:schemeClr val="accent1"/>
+          </a:effectRef>
+          <a:fontRef idx="minor">
+            <a:schemeClr val="tx1"/>
+          </a:fontRef>
+        </p:style>
+      </p:cxnSp>
+      <p:cxnSp>
+        <p:nvCxnSpPr>
+          <p:cNvPr id="39" name="直接箭头连接符 38"/>
+          <p:cNvCxnSpPr>
+            <a:stCxn id="62" idx="1"/>
+            <a:endCxn id="64" idx="3"/>
+          </p:cNvCxnSpPr>
+          <p:nvPr/>
+        </p:nvCxnSpPr>
+        <p:spPr>
+          <a:xfrm flipH="1">
+            <a:off x="3119645" y="2097987"/>
+            <a:ext cx="385330" cy="155"/>
+          </a:xfrm>
+          <a:prstGeom prst="straightConnector1">
+            <a:avLst/>
+          </a:prstGeom>
+          <a:ln w="19050">
+            <a:headEnd type="triangle"/>
+            <a:tailEnd type="triangle"/>
+          </a:ln>
+        </p:spPr>
+        <p:style>
+          <a:lnRef idx="1">
+            <a:schemeClr val="accent1"/>
+          </a:lnRef>
+          <a:fillRef idx="0">
+            <a:schemeClr val="accent1"/>
+          </a:fillRef>
+          <a:effectRef idx="0">
+            <a:schemeClr val="accent1"/>
+          </a:effectRef>
+          <a:fontRef idx="minor">
+            <a:schemeClr val="tx1"/>
+          </a:fontRef>
+        </p:style>
+      </p:cxnSp>
+      <p:sp>
+        <p:nvSpPr>
+          <p:cNvPr id="40" name="圆角矩形 39"/>
+          <p:cNvSpPr/>
+          <p:nvPr/>
+        </p:nvSpPr>
+        <p:spPr>
+          <a:xfrm>
+            <a:off x="5104752" y="1827100"/>
+            <a:ext cx="900967" cy="543209"/>
+          </a:xfrm>
+          <a:prstGeom prst="roundRect">
+            <a:avLst/>
+          </a:prstGeom>
+          <a:solidFill>
+            <a:schemeClr val="accent4">
+              <a:lumMod val="60000"/>
+              <a:lumOff val="40000"/>
+            </a:schemeClr>
+          </a:solidFill>
+        </p:spPr>
+        <p:style>
+          <a:lnRef idx="2">
+            <a:schemeClr val="accent1">
+              <a:shade val="50000"/>
+            </a:schemeClr>
+          </a:lnRef>
+          <a:fillRef idx="1">
+            <a:schemeClr val="accent1"/>
+          </a:fillRef>
+          <a:effectRef idx="0">
+            <a:schemeClr val="accent1"/>
+          </a:effectRef>
+          <a:fontRef idx="minor">
+            <a:schemeClr val="lt1"/>
+          </a:fontRef>
+        </p:style>
+        <p:txBody>
+          <a:bodyPr rtlCol="0" anchor="ctr"/>
+          <a:lstStyle/>
+          <a:p>
+            <a:pPr algn="ctr"/>
+            <a:r>
+              <a:rPr lang="zh-CN" altLang="en-US" b="1" smtClean="0">
+                <a:solidFill>
+                  <a:schemeClr val="tx1"/>
+                </a:solidFill>
+              </a:rPr>
+              <a:t>生成</a:t>
+            </a:r>
+            <a:endParaRPr lang="en-US" altLang="zh-CN" b="1" smtClean="0">
+              <a:solidFill>
+                <a:schemeClr val="tx1"/>
+              </a:solidFill>
+            </a:endParaRPr>
+          </a:p>
+          <a:p>
+            <a:pPr algn="ctr"/>
+            <a:r>
+              <a:rPr lang="zh-CN" altLang="en-US" b="1" smtClean="0">
+                <a:solidFill>
+                  <a:schemeClr val="tx1"/>
+                </a:solidFill>
+              </a:rPr>
+              <a:t>地形</a:t>
+            </a:r>
+            <a:endParaRPr lang="zh-CN" altLang="en-US" b="1">
+              <a:solidFill>
+                <a:schemeClr val="tx1"/>
+              </a:solidFill>
+            </a:endParaRPr>
+          </a:p>
+        </p:txBody>
+      </p:sp>
+      <p:cxnSp>
+        <p:nvCxnSpPr>
+          <p:cNvPr id="45" name="直接箭头连接符 44"/>
+          <p:cNvCxnSpPr>
+            <a:stCxn id="40" idx="1"/>
+            <a:endCxn id="62" idx="3"/>
+          </p:cNvCxnSpPr>
+          <p:nvPr/>
+        </p:nvCxnSpPr>
+        <p:spPr>
+          <a:xfrm flipH="1" flipV="1">
+            <a:off x="4426066" y="2097987"/>
+            <a:ext cx="678686" cy="718"/>
+          </a:xfrm>
+          <a:prstGeom prst="straightConnector1">
+            <a:avLst/>
+          </a:prstGeom>
+          <a:ln w="19050">
+            <a:headEnd type="triangle"/>
+            <a:tailEnd type="triangle"/>
+          </a:ln>
+        </p:spPr>
+        <p:style>
+          <a:lnRef idx="1">
+            <a:schemeClr val="accent1"/>
+          </a:lnRef>
+          <a:fillRef idx="0">
+            <a:schemeClr val="accent1"/>
+          </a:fillRef>
+          <a:effectRef idx="0">
+            <a:schemeClr val="accent1"/>
+          </a:effectRef>
+          <a:fontRef idx="minor">
+            <a:schemeClr val="tx1"/>
+          </a:fontRef>
+        </p:style>
+      </p:cxnSp>
+      <p:sp>
+        <p:nvSpPr>
+          <p:cNvPr id="48" name="圆角矩形 47"/>
+          <p:cNvSpPr/>
+          <p:nvPr/>
+        </p:nvSpPr>
+        <p:spPr>
+          <a:xfrm>
+            <a:off x="6477848" y="1827100"/>
+            <a:ext cx="900967" cy="543209"/>
+          </a:xfrm>
+          <a:prstGeom prst="roundRect">
+            <a:avLst/>
+          </a:prstGeom>
+          <a:solidFill>
+            <a:schemeClr val="accent4">
+              <a:lumMod val="60000"/>
+              <a:lumOff val="40000"/>
+            </a:schemeClr>
+          </a:solidFill>
+        </p:spPr>
+        <p:style>
+          <a:lnRef idx="2">
+            <a:schemeClr val="accent1">
+              <a:shade val="50000"/>
+            </a:schemeClr>
+          </a:lnRef>
+          <a:fillRef idx="1">
+            <a:schemeClr val="accent1"/>
+          </a:fillRef>
+          <a:effectRef idx="0">
+            <a:schemeClr val="accent1"/>
+          </a:effectRef>
+          <a:fontRef idx="minor">
+            <a:schemeClr val="lt1"/>
+          </a:fontRef>
+        </p:style>
+        <p:txBody>
+          <a:bodyPr rtlCol="0" anchor="ctr"/>
+          <a:lstStyle/>
+          <a:p>
+            <a:pPr algn="ctr"/>
+            <a:r>
+              <a:rPr lang="zh-CN" altLang="en-US" b="1" smtClean="0">
+                <a:solidFill>
+                  <a:schemeClr val="tx1"/>
+                </a:solidFill>
+              </a:rPr>
+              <a:t>生成树的位置</a:t>
+            </a:r>
+            <a:endParaRPr lang="zh-CN" altLang="en-US" b="1">
+              <a:solidFill>
+                <a:schemeClr val="tx1"/>
+              </a:solidFill>
+            </a:endParaRPr>
+          </a:p>
+        </p:txBody>
+      </p:sp>
+      <p:sp>
+        <p:nvSpPr>
+          <p:cNvPr id="49" name="圆角矩形 48"/>
+          <p:cNvSpPr/>
+          <p:nvPr/>
+        </p:nvSpPr>
+        <p:spPr>
+          <a:xfrm>
+            <a:off x="7933676" y="1827100"/>
+            <a:ext cx="900967" cy="543209"/>
+          </a:xfrm>
+          <a:prstGeom prst="roundRect">
+            <a:avLst/>
+          </a:prstGeom>
+          <a:solidFill>
+            <a:schemeClr val="accent4">
+              <a:lumMod val="60000"/>
+              <a:lumOff val="40000"/>
+            </a:schemeClr>
+          </a:solidFill>
+        </p:spPr>
+        <p:style>
+          <a:lnRef idx="2">
+            <a:schemeClr val="accent1">
+              <a:shade val="50000"/>
+            </a:schemeClr>
+          </a:lnRef>
+          <a:fillRef idx="1">
+            <a:schemeClr val="accent1"/>
+          </a:fillRef>
+          <a:effectRef idx="0">
+            <a:schemeClr val="accent1"/>
+          </a:effectRef>
+          <a:fontRef idx="minor">
+            <a:schemeClr val="lt1"/>
+          </a:fontRef>
+        </p:style>
+        <p:txBody>
+          <a:bodyPr rtlCol="0" anchor="ctr"/>
+          <a:lstStyle/>
+          <a:p>
+            <a:pPr algn="ctr"/>
+            <a:r>
+              <a:rPr lang="zh-CN" altLang="en-US" b="1" smtClean="0">
+                <a:solidFill>
+                  <a:schemeClr val="tx1"/>
+                </a:solidFill>
+              </a:rPr>
+              <a:t>完成</a:t>
+            </a:r>
+            <a:endParaRPr lang="en-US" altLang="zh-CN" b="1" smtClean="0">
+              <a:solidFill>
+                <a:schemeClr val="tx1"/>
+              </a:solidFill>
+            </a:endParaRPr>
+          </a:p>
+          <a:p>
+            <a:pPr algn="ctr"/>
+            <a:r>
+              <a:rPr lang="zh-CN" altLang="en-US" b="1" smtClean="0">
+                <a:solidFill>
+                  <a:schemeClr val="tx1"/>
+                </a:solidFill>
+              </a:rPr>
+              <a:t>生成</a:t>
+            </a:r>
+            <a:endParaRPr lang="zh-CN" altLang="en-US" b="1">
+              <a:solidFill>
+                <a:schemeClr val="tx1"/>
+              </a:solidFill>
+            </a:endParaRPr>
+          </a:p>
+        </p:txBody>
+      </p:sp>
+      <p:cxnSp>
+        <p:nvCxnSpPr>
+          <p:cNvPr id="52" name="直接箭头连接符 51"/>
+          <p:cNvCxnSpPr>
+            <a:stCxn id="48" idx="1"/>
+            <a:endCxn id="40" idx="3"/>
+          </p:cNvCxnSpPr>
+          <p:nvPr/>
+        </p:nvCxnSpPr>
+        <p:spPr>
+          <a:xfrm flipH="1">
+            <a:off x="6005719" y="2098705"/>
+            <a:ext cx="472129" cy="0"/>
+          </a:xfrm>
+          <a:prstGeom prst="straightConnector1">
+            <a:avLst/>
+          </a:prstGeom>
+          <a:ln w="19050">
+            <a:headEnd type="triangle"/>
+            <a:tailEnd type="triangle"/>
+          </a:ln>
+        </p:spPr>
+        <p:style>
+          <a:lnRef idx="1">
+            <a:schemeClr val="accent1"/>
+          </a:lnRef>
+          <a:fillRef idx="0">
+            <a:schemeClr val="accent1"/>
+          </a:fillRef>
+          <a:effectRef idx="0">
+            <a:schemeClr val="accent1"/>
+          </a:effectRef>
+          <a:fontRef idx="minor">
+            <a:schemeClr val="tx1"/>
+          </a:fontRef>
+        </p:style>
+      </p:cxnSp>
+      <p:cxnSp>
+        <p:nvCxnSpPr>
+          <p:cNvPr id="55" name="直接箭头连接符 54"/>
+          <p:cNvCxnSpPr>
+            <a:stCxn id="49" idx="1"/>
+            <a:endCxn id="48" idx="3"/>
+          </p:cNvCxnSpPr>
+          <p:nvPr/>
+        </p:nvCxnSpPr>
+        <p:spPr>
+          <a:xfrm flipH="1">
+            <a:off x="7378815" y="2098705"/>
+            <a:ext cx="554861" cy="0"/>
+          </a:xfrm>
+          <a:prstGeom prst="straightConnector1">
+            <a:avLst/>
+          </a:prstGeom>
+          <a:ln w="19050">
+            <a:headEnd type="triangle"/>
+            <a:tailEnd type="triangle"/>
+          </a:ln>
+        </p:spPr>
+        <p:style>
+          <a:lnRef idx="1">
+            <a:schemeClr val="accent1"/>
+          </a:lnRef>
+          <a:fillRef idx="0">
+            <a:schemeClr val="accent1"/>
+          </a:fillRef>
+          <a:effectRef idx="0">
+            <a:schemeClr val="accent1"/>
+          </a:effectRef>
+          <a:fontRef idx="minor">
+            <a:schemeClr val="tx1"/>
+          </a:fontRef>
+        </p:style>
+      </p:cxnSp>
+      <p:sp>
+        <p:nvSpPr>
+          <p:cNvPr id="23" name="文本框 22"/>
+          <p:cNvSpPr txBox="1"/>
+          <p:nvPr/>
+        </p:nvSpPr>
+        <p:spPr>
+          <a:xfrm>
+            <a:off x="2682220" y="2697644"/>
+            <a:ext cx="3649423" cy="307777"/>
+          </a:xfrm>
+          <a:prstGeom prst="rect">
+            <a:avLst/>
+          </a:prstGeom>
+          <a:noFill/>
+        </p:spPr>
+        <p:txBody>
+          <a:bodyPr wrap="square" rtlCol="0">
+            <a:spAutoFit/>
+          </a:bodyPr>
+          <a:lstStyle/>
+          <a:p>
+            <a:pPr algn="ctr"/>
+            <a:r>
+              <a:rPr lang="en-US" altLang="zh-CN">
+                <a:sym typeface="Wingdings 2" panose="05020102010507070707" pitchFamily="18" charset="2"/>
+              </a:rPr>
+              <a:t>UOpenDriveToMap</a:t>
+            </a:r>
+            <a:r>
+              <a:rPr lang="en-US" altLang="zh-CN" smtClean="0">
+                <a:sym typeface="Wingdings 2" panose="05020102010507070707" pitchFamily="18" charset="2"/>
+              </a:rPr>
+              <a:t>::GenerateAll</a:t>
+            </a:r>
+            <a:endParaRPr lang="zh-CN" altLang="en-US"/>
+          </a:p>
+        </p:txBody>
+      </p:sp>
+    </p:spTree>
+    <p:extLst>
+      <p:ext uri="{BB962C8B-B14F-4D97-AF65-F5344CB8AC3E}">
+        <p14:creationId xmlns:p14="http://schemas.microsoft.com/office/powerpoint/2010/main" val="1349487496"/>
+      </p:ext>
+    </p:extLst>
+  </p:cSld>
+  <p:clrMapOvr>
+    <a:masterClrMapping/>
+  </p:clrMapOvr>
+  <p:timing>
+    <p:tnLst>
+      <p:par>
+        <p:cTn id="1" dur="indefinite" restart="never" nodeType="tmRoot"/>
+      </p:par>
+    </p:tnLst>
+  </p:timing>
+</p:sld>
+</file>
+
+<file path=ppt/slides/slide6.xml><?xml version="1.0" encoding="utf-8"?>
+<p:sld xmlns:a="http://schemas.openxmlformats.org/drawingml/2006/main" xmlns:r="http://schemas.openxmlformats.org/officeDocument/2006/relationships" xmlns:p="http://schemas.openxmlformats.org/presentationml/2006/main">
+  <p:cSld>
+    <p:spTree>
+      <p:nvGrpSpPr>
+        <p:cNvPr id="1" name="Shape 91"/>
+        <p:cNvGrpSpPr/>
+        <p:nvPr/>
+      </p:nvGrpSpPr>
+      <p:grpSpPr>
+        <a:xfrm>
+          <a:off x="0" y="0"/>
+          <a:ext cx="0" cy="0"/>
+          <a:chOff x="0" y="0"/>
+          <a:chExt cx="0" cy="0"/>
+        </a:xfrm>
+      </p:grpSpPr>
+      <p:sp>
+        <p:nvSpPr>
           <p:cNvPr id="50" name="圆角矩形 49"/>
           <p:cNvSpPr/>
           <p:nvPr/>
@@ -16882,10 +18581,17 @@
   <p:clrMapOvr>
     <a:masterClrMapping/>
   </p:clrMapOvr>
+  <p:timing>
+    <p:tnLst>
+      <p:par>
+        <p:cTn id="1" dur="indefinite" restart="never" nodeType="tmRoot"/>
+      </p:par>
+    </p:tnLst>
+  </p:timing>
 </p:sld>
 </file>
 
-<file path=ppt/slides/slide5.xml><?xml version="1.0" encoding="utf-8"?>
+<file path=ppt/slides/slide7.xml><?xml version="1.0" encoding="utf-8"?>
 <p:sld xmlns:a="http://schemas.openxmlformats.org/drawingml/2006/main" xmlns:r="http://schemas.openxmlformats.org/officeDocument/2006/relationships" xmlns:p="http://schemas.openxmlformats.org/presentationml/2006/main">
   <p:cSld>
     <p:spTree>
@@ -19932,7 +21638,7 @@
 </p:sld>
 </file>
 
-<file path=ppt/slides/slide6.xml><?xml version="1.0" encoding="utf-8"?>
+<file path=ppt/slides/slide8.xml><?xml version="1.0" encoding="utf-8"?>
 <p:sld xmlns:a="http://schemas.openxmlformats.org/drawingml/2006/main" xmlns:r="http://schemas.openxmlformats.org/officeDocument/2006/relationships" xmlns:p="http://schemas.openxmlformats.org/presentationml/2006/main">
   <p:cSld>
     <p:spTree>

</xml_diff>

<commit_message>
Deployed cf9c13b7 with MkDocs version: 1.5.3
</commit_message>
<xml_diff>
--- a/img/Carla.pptx
+++ b/img/Carla.pptx
@@ -5,7 +5,7 @@
     <p:sldMasterId id="2147483648" r:id="rId1"/>
   </p:sldMasterIdLst>
   <p:notesMasterIdLst>
-    <p:notesMasterId r:id="rId10"/>
+    <p:notesMasterId r:id="rId11"/>
   </p:notesMasterIdLst>
   <p:sldIdLst>
     <p:sldId id="289" r:id="rId2"/>
@@ -13,48 +13,49 @@
     <p:sldId id="294" r:id="rId4"/>
     <p:sldId id="295" r:id="rId5"/>
     <p:sldId id="297" r:id="rId6"/>
-    <p:sldId id="291" r:id="rId7"/>
-    <p:sldId id="292" r:id="rId8"/>
-    <p:sldId id="293" r:id="rId9"/>
+    <p:sldId id="298" r:id="rId7"/>
+    <p:sldId id="291" r:id="rId8"/>
+    <p:sldId id="292" r:id="rId9"/>
+    <p:sldId id="293" r:id="rId10"/>
   </p:sldIdLst>
   <p:sldSz cx="9144000" cy="5143500" type="screen16x9"/>
   <p:notesSz cx="9144000" cy="5143500"/>
   <p:embeddedFontLst>
     <p:embeddedFont>
-      <p:font typeface="Open Sans" panose="020B0604020202020204" charset="0"/>
-      <p:regular r:id="rId11"/>
-      <p:bold r:id="rId12"/>
-      <p:italic r:id="rId13"/>
-      <p:boldItalic r:id="rId14"/>
+      <p:font typeface="Wingdings 2" panose="05020102010507070707" pitchFamily="18" charset="2"/>
+      <p:regular r:id="rId12"/>
     </p:embeddedFont>
     <p:embeddedFont>
-      <p:font typeface="Wingdings 2" panose="05020102010507070707" pitchFamily="18" charset="2"/>
-      <p:regular r:id="rId15"/>
+      <p:font typeface="Economica" panose="020B0604020202020204" charset="0"/>
+      <p:regular r:id="rId13"/>
+      <p:bold r:id="rId14"/>
+      <p:italic r:id="rId15"/>
+      <p:boldItalic r:id="rId16"/>
     </p:embeddedFont>
     <p:embeddedFont>
-      <p:font typeface="宋体" panose="02010600030101010101" pitchFamily="2" charset="-122"/>
-      <p:regular r:id="rId16"/>
-    </p:embeddedFont>
-    <p:embeddedFont>
-      <p:font typeface="Muli Regular" panose="020B0604020202020204" charset="0"/>
+      <p:font typeface="Muli" panose="020B0604020202020204" charset="0"/>
       <p:regular r:id="rId17"/>
       <p:bold r:id="rId18"/>
       <p:italic r:id="rId19"/>
       <p:boldItalic r:id="rId20"/>
     </p:embeddedFont>
     <p:embeddedFont>
-      <p:font typeface="Economica" panose="020B0604020202020204" charset="0"/>
+      <p:font typeface="宋体" panose="02010600030101010101" pitchFamily="2" charset="-122"/>
       <p:regular r:id="rId21"/>
-      <p:bold r:id="rId22"/>
-      <p:italic r:id="rId23"/>
-      <p:boldItalic r:id="rId24"/>
     </p:embeddedFont>
     <p:embeddedFont>
-      <p:font typeface="Muli" panose="020B0604020202020204" charset="0"/>
-      <p:regular r:id="rId25"/>
-      <p:bold r:id="rId26"/>
-      <p:italic r:id="rId27"/>
-      <p:boldItalic r:id="rId28"/>
+      <p:font typeface="Open Sans" panose="020B0604020202020204" charset="0"/>
+      <p:regular r:id="rId22"/>
+      <p:bold r:id="rId23"/>
+      <p:italic r:id="rId24"/>
+      <p:boldItalic r:id="rId25"/>
+    </p:embeddedFont>
+    <p:embeddedFont>
+      <p:font typeface="Muli Regular" panose="020B0604020202020204" charset="0"/>
+      <p:regular r:id="rId26"/>
+      <p:bold r:id="rId27"/>
+      <p:italic r:id="rId28"/>
+      <p:boldItalic r:id="rId29"/>
     </p:embeddedFont>
   </p:embeddedFontLst>
   <p:defaultTextStyle>
@@ -1695,14 +1696,56 @@
               <a:buNone/>
             </a:pPr>
             <a:r>
-              <a:rPr lang="en-US" dirty="0" err="1">
+              <a:rPr lang="en-US" smtClean="0">
                 <a:solidFill>
                   <a:srgbClr val="39373D"/>
                 </a:solidFill>
               </a:rPr>
-              <a:t>adv_multigpu</a:t>
+              <a:t>file_specification_build_tools</a:t>
             </a:r>
-            <a:endParaRPr dirty="0"/>
+            <a:endParaRPr lang="en-US" smtClean="0">
+              <a:solidFill>
+                <a:srgbClr val="39373D"/>
+              </a:solidFill>
+            </a:endParaRPr>
+          </a:p>
+          <a:p>
+            <a:pPr marL="0" lvl="0" indent="0" algn="l" rtl="0">
+              <a:spcBef>
+                <a:spcPts val="0"/>
+              </a:spcBef>
+              <a:spcAft>
+                <a:spcPts val="0"/>
+              </a:spcAft>
+              <a:buClr>
+                <a:schemeClr val="dk1"/>
+              </a:buClr>
+              <a:buSzPts val="1100"/>
+              <a:buFont typeface="Arial"/>
+              <a:buNone/>
+            </a:pPr>
+            <a:endParaRPr lang="en-US" smtClean="0">
+              <a:solidFill>
+                <a:srgbClr val="39373D"/>
+              </a:solidFill>
+            </a:endParaRPr>
+          </a:p>
+          <a:p>
+            <a:pPr marL="0" lvl="0" indent="0" algn="l" rtl="0">
+              <a:spcBef>
+                <a:spcPts val="0"/>
+              </a:spcBef>
+              <a:spcAft>
+                <a:spcPts val="0"/>
+              </a:spcAft>
+              <a:buClr>
+                <a:schemeClr val="dk1"/>
+              </a:buClr>
+              <a:buSzPts val="1100"/>
+              <a:buFont typeface="Arial"/>
+              <a:buNone/>
+            </a:pPr>
+            <a:endParaRPr/>
           </a:p>
         </p:txBody>
       </p:sp>
@@ -1760,7 +1803,7 @@
     </p:spTree>
     <p:extLst>
       <p:ext uri="{BB962C8B-B14F-4D97-AF65-F5344CB8AC3E}">
-        <p14:creationId xmlns:p14="http://schemas.microsoft.com/office/powerpoint/2010/main" val="1240623699"/>
+        <p14:creationId xmlns:p14="http://schemas.microsoft.com/office/powerpoint/2010/main" val="3014583633"/>
       </p:ext>
     </p:extLst>
   </p:cSld>
@@ -1831,20 +1874,12 @@
               <a:buNone/>
             </a:pPr>
             <a:r>
-              <a:rPr lang="en-US" smtClean="0">
+              <a:rPr lang="en-US" dirty="0" err="1">
                 <a:solidFill>
                   <a:srgbClr val="39373D"/>
                 </a:solidFill>
               </a:rPr>
-              <a:t>adv_</a:t>
-            </a:r>
-            <a:r>
-              <a:rPr lang="en-US" altLang="zh-CN" smtClean="0">
-                <a:solidFill>
-                  <a:srgbClr val="39373D"/>
-                </a:solidFill>
-              </a:rPr>
-              <a:t>rss</a:t>
+              <a:t>adv_multigpu</a:t>
             </a:r>
             <a:endParaRPr dirty="0"/>
           </a:p>
@@ -1904,6 +1939,150 @@
     </p:spTree>
     <p:extLst>
       <p:ext uri="{BB962C8B-B14F-4D97-AF65-F5344CB8AC3E}">
+        <p14:creationId xmlns:p14="http://schemas.microsoft.com/office/powerpoint/2010/main" val="1240623699"/>
+      </p:ext>
+    </p:extLst>
+  </p:cSld>
+  <p:clrMapOvr>
+    <a:masterClrMapping/>
+  </p:clrMapOvr>
+</p:notes>
+</file>
+
+<file path=ppt/notesSlides/notesSlide8.xml><?xml version="1.0" encoding="utf-8"?>
+<p:notes xmlns:a="http://schemas.openxmlformats.org/drawingml/2006/main" xmlns:r="http://schemas.openxmlformats.org/officeDocument/2006/relationships" xmlns:p="http://schemas.openxmlformats.org/presentationml/2006/main" showMasterSp="0" showMasterPhAnim="0">
+  <p:cSld>
+    <p:spTree>
+      <p:nvGrpSpPr>
+        <p:cNvPr id="1" name="Shape 88"/>
+        <p:cNvGrpSpPr/>
+        <p:nvPr/>
+      </p:nvGrpSpPr>
+      <p:grpSpPr>
+        <a:xfrm>
+          <a:off x="0" y="0"/>
+          <a:ext cx="0" cy="0"/>
+          <a:chOff x="0" y="0"/>
+          <a:chExt cx="0" cy="0"/>
+        </a:xfrm>
+      </p:grpSpPr>
+      <p:sp>
+        <p:nvSpPr>
+          <p:cNvPr id="89" name="Google Shape;89;g80294dfa11_0_4:notes"/>
+          <p:cNvSpPr txBox="1">
+            <a:spLocks noGrp="1"/>
+          </p:cNvSpPr>
+          <p:nvPr>
+            <p:ph type="body" idx="1"/>
+          </p:nvPr>
+        </p:nvSpPr>
+        <p:spPr>
+          <a:xfrm>
+            <a:off x="914400" y="2443150"/>
+            <a:ext cx="7315200" cy="2314500"/>
+          </a:xfrm>
+          <a:prstGeom prst="rect">
+            <a:avLst/>
+          </a:prstGeom>
+          <a:noFill/>
+          <a:ln>
+            <a:noFill/>
+          </a:ln>
+        </p:spPr>
+        <p:txBody>
+          <a:bodyPr spcFirstLastPara="1" wrap="square" lIns="91425" tIns="91425" rIns="91425" bIns="91425" anchor="t" anchorCtr="0">
+            <a:noAutofit/>
+          </a:bodyPr>
+          <a:lstStyle/>
+          <a:p>
+            <a:pPr marL="0" lvl="0" indent="0" algn="l" rtl="0">
+              <a:spcBef>
+                <a:spcPts val="0"/>
+              </a:spcBef>
+              <a:spcAft>
+                <a:spcPts val="0"/>
+              </a:spcAft>
+              <a:buClr>
+                <a:schemeClr val="dk1"/>
+              </a:buClr>
+              <a:buSzPts val="1100"/>
+              <a:buFont typeface="Arial"/>
+              <a:buNone/>
+            </a:pPr>
+            <a:r>
+              <a:rPr lang="en-US" smtClean="0">
+                <a:solidFill>
+                  <a:srgbClr val="39373D"/>
+                </a:solidFill>
+              </a:rPr>
+              <a:t>adv_</a:t>
+            </a:r>
+            <a:r>
+              <a:rPr lang="en-US" altLang="zh-CN" smtClean="0">
+                <a:solidFill>
+                  <a:srgbClr val="39373D"/>
+                </a:solidFill>
+              </a:rPr>
+              <a:t>rss</a:t>
+            </a:r>
+            <a:endParaRPr dirty="0"/>
+          </a:p>
+        </p:txBody>
+      </p:sp>
+      <p:sp>
+        <p:nvSpPr>
+          <p:cNvPr id="90" name="Google Shape;90;g80294dfa11_0_4:notes"/>
+          <p:cNvSpPr>
+            <a:spLocks noGrp="1" noRot="1" noChangeAspect="1"/>
+          </p:cNvSpPr>
+          <p:nvPr>
+            <p:ph type="sldImg" idx="2"/>
+          </p:nvPr>
+        </p:nvSpPr>
+        <p:spPr>
+          <a:xfrm>
+            <a:off x="2857500" y="385763"/>
+            <a:ext cx="3429000" cy="1928812"/>
+          </a:xfrm>
+          <a:custGeom>
+            <a:avLst/>
+            <a:gdLst/>
+            <a:ahLst/>
+            <a:cxnLst/>
+            <a:rect l="l" t="t" r="r" b="b"/>
+            <a:pathLst>
+              <a:path w="120000" h="120000" extrusionOk="0">
+                <a:moveTo>
+                  <a:pt x="0" y="0"/>
+                </a:moveTo>
+                <a:lnTo>
+                  <a:pt x="120000" y="0"/>
+                </a:lnTo>
+                <a:lnTo>
+                  <a:pt x="120000" y="120000"/>
+                </a:lnTo>
+                <a:lnTo>
+                  <a:pt x="0" y="120000"/>
+                </a:lnTo>
+                <a:close/>
+              </a:path>
+            </a:pathLst>
+          </a:custGeom>
+          <a:noFill/>
+          <a:ln w="9525" cap="flat" cmpd="sng">
+            <a:solidFill>
+              <a:srgbClr val="000000"/>
+            </a:solidFill>
+            <a:prstDash val="solid"/>
+            <a:round/>
+            <a:headEnd type="none" w="sm" len="sm"/>
+            <a:tailEnd type="none" w="sm" len="sm"/>
+          </a:ln>
+        </p:spPr>
+      </p:sp>
+    </p:spTree>
+    <p:extLst>
+      <p:ext uri="{BB962C8B-B14F-4D97-AF65-F5344CB8AC3E}">
         <p14:creationId xmlns:p14="http://schemas.microsoft.com/office/powerpoint/2010/main" val="1768176120"/>
       </p:ext>
     </p:extLst>
@@ -1914,7 +2093,7 @@
 </p:notes>
 </file>
 
-<file path=ppt/notesSlides/notesSlide8.xml><?xml version="1.0" encoding="utf-8"?>
+<file path=ppt/notesSlides/notesSlide9.xml><?xml version="1.0" encoding="utf-8"?>
 <p:notes xmlns:a="http://schemas.openxmlformats.org/drawingml/2006/main" xmlns:r="http://schemas.openxmlformats.org/officeDocument/2006/relationships" xmlns:p="http://schemas.openxmlformats.org/presentationml/2006/main" showMasterSp="0" showMasterPhAnim="0">
   <p:cSld>
     <p:spTree>
@@ -12762,7 +12941,7 @@
         </p:nvSpPr>
         <p:spPr>
           <a:xfrm>
-            <a:off x="358713" y="584200"/>
+            <a:off x="358713" y="843280"/>
             <a:ext cx="4294208" cy="3935955"/>
           </a:xfrm>
           <a:prstGeom prst="rect">
@@ -12806,7 +12985,7 @@
         </p:nvSpPr>
         <p:spPr>
           <a:xfrm>
-            <a:off x="486035" y="1128774"/>
+            <a:off x="486035" y="1387854"/>
             <a:ext cx="1388962" cy="567159"/>
           </a:xfrm>
           <a:prstGeom prst="roundRect">
@@ -12864,7 +13043,7 @@
         </p:nvSpPr>
         <p:spPr>
           <a:xfrm>
-            <a:off x="2826050" y="1128774"/>
+            <a:off x="2826050" y="1387854"/>
             <a:ext cx="1388962" cy="567159"/>
           </a:xfrm>
           <a:prstGeom prst="roundRect">
@@ -12922,7 +13101,7 @@
         </p:nvCxnSpPr>
         <p:spPr>
           <a:xfrm>
-            <a:off x="1874997" y="1412354"/>
+            <a:off x="1874997" y="1671434"/>
             <a:ext cx="951053" cy="0"/>
           </a:xfrm>
           <a:prstGeom prst="straightConnector1">
@@ -12956,7 +13135,7 @@
         </p:nvSpPr>
         <p:spPr>
           <a:xfrm>
-            <a:off x="1943327" y="1180385"/>
+            <a:off x="1943327" y="1439465"/>
             <a:ext cx="814392" cy="156735"/>
           </a:xfrm>
           <a:prstGeom prst="rect">
@@ -13009,7 +13188,7 @@
         </p:nvSpPr>
         <p:spPr>
           <a:xfrm>
-            <a:off x="2746144" y="2083688"/>
+            <a:off x="2746144" y="2342768"/>
             <a:ext cx="1560653" cy="434047"/>
           </a:xfrm>
           <a:prstGeom prst="roundRect">
@@ -13067,7 +13246,7 @@
         </p:nvSpPr>
         <p:spPr>
           <a:xfrm>
-            <a:off x="2751779" y="2905490"/>
+            <a:off x="2751779" y="3164570"/>
             <a:ext cx="1560653" cy="434047"/>
           </a:xfrm>
           <a:prstGeom prst="roundRect">
@@ -13079,6 +13258,11 @@
               <a:lumOff val="40000"/>
             </a:schemeClr>
           </a:solidFill>
+          <a:ln>
+            <a:solidFill>
+              <a:srgbClr val="00B050"/>
+            </a:solidFill>
+          </a:ln>
         </p:spPr>
         <p:style>
           <a:lnRef idx="2">
@@ -13102,12 +13286,20 @@
           <a:p>
             <a:pPr algn="ctr"/>
             <a:r>
-              <a:rPr lang="en-US" altLang="zh-CN" b="1">
+              <a:rPr lang="en-US" altLang="zh-CN" b="1" smtClean="0">
                 <a:solidFill>
                   <a:schemeClr val="tx1"/>
                 </a:solidFill>
               </a:rPr>
-              <a:t>libcarla </a:t>
+              <a:t>L</a:t>
+            </a:r>
+            <a:r>
+              <a:rPr lang="en-US" altLang="zh-CN" b="1" smtClean="0">
+                <a:solidFill>
+                  <a:schemeClr val="tx1"/>
+                </a:solidFill>
+              </a:rPr>
+              <a:t>ibCarla </a:t>
             </a:r>
             <a:r>
               <a:rPr lang="zh-CN" altLang="en-US" b="1">
@@ -13128,7 +13320,7 @@
         </p:nvSpPr>
         <p:spPr>
           <a:xfrm>
-            <a:off x="2746144" y="3727292"/>
+            <a:off x="2746144" y="3986372"/>
             <a:ext cx="1560653" cy="434047"/>
           </a:xfrm>
           <a:prstGeom prst="roundRect">
@@ -13140,6 +13332,11 @@
               <a:lumOff val="40000"/>
             </a:schemeClr>
           </a:solidFill>
+          <a:ln>
+            <a:solidFill>
+              <a:srgbClr val="00B050"/>
+            </a:solidFill>
+          </a:ln>
         </p:spPr>
         <p:style>
           <a:lnRef idx="2">
@@ -13186,7 +13383,7 @@
         </p:nvSpPr>
         <p:spPr>
           <a:xfrm>
-            <a:off x="5607020" y="3727291"/>
+            <a:off x="5607020" y="3986371"/>
             <a:ext cx="1560653" cy="434047"/>
           </a:xfrm>
           <a:prstGeom prst="roundRect">
@@ -13198,6 +13395,11 @@
               <a:lumOff val="40000"/>
             </a:schemeClr>
           </a:solidFill>
+          <a:ln>
+            <a:solidFill>
+              <a:srgbClr val="00B050"/>
+            </a:solidFill>
+          </a:ln>
         </p:spPr>
         <p:style>
           <a:lnRef idx="2">
@@ -13244,7 +13446,7 @@
         </p:nvSpPr>
         <p:spPr>
           <a:xfrm>
-            <a:off x="5607019" y="2905490"/>
+            <a:off x="5607019" y="3164570"/>
             <a:ext cx="1560653" cy="434047"/>
           </a:xfrm>
           <a:prstGeom prst="roundRect">
@@ -13256,6 +13458,11 @@
               <a:lumOff val="40000"/>
             </a:schemeClr>
           </a:solidFill>
+          <a:ln>
+            <a:solidFill>
+              <a:srgbClr val="00B050"/>
+            </a:solidFill>
+          </a:ln>
         </p:spPr>
         <p:style>
           <a:lnRef idx="2">
@@ -13279,12 +13486,20 @@
           <a:p>
             <a:pPr algn="ctr"/>
             <a:r>
-              <a:rPr lang="en-US" altLang="zh-CN" b="1">
+              <a:rPr lang="en-US" altLang="zh-CN" b="1" smtClean="0">
                 <a:solidFill>
                   <a:schemeClr val="tx1"/>
                 </a:solidFill>
               </a:rPr>
-              <a:t>libcarla </a:t>
+              <a:t>L</a:t>
+            </a:r>
+            <a:r>
+              <a:rPr lang="en-US" altLang="zh-CN" b="1" smtClean="0">
+                <a:solidFill>
+                  <a:schemeClr val="tx1"/>
+                </a:solidFill>
+              </a:rPr>
+              <a:t>ibCarla </a:t>
             </a:r>
             <a:r>
               <a:rPr lang="zh-CN" altLang="en-US" b="1">
@@ -13305,7 +13520,7 @@
         </p:nvSpPr>
         <p:spPr>
           <a:xfrm>
-            <a:off x="5607019" y="2083688"/>
+            <a:off x="5607019" y="2342768"/>
             <a:ext cx="1560653" cy="434047"/>
           </a:xfrm>
           <a:prstGeom prst="roundRect">
@@ -13317,6 +13532,11 @@
               <a:lumOff val="40000"/>
             </a:schemeClr>
           </a:solidFill>
+          <a:ln>
+            <a:solidFill>
+              <a:srgbClr val="00B0F0"/>
+            </a:solidFill>
+          </a:ln>
         </p:spPr>
         <p:style>
           <a:lnRef idx="2">
@@ -13371,7 +13591,7 @@
         </p:nvSpPr>
         <p:spPr>
           <a:xfrm>
-            <a:off x="5607019" y="1128774"/>
+            <a:off x="5607019" y="1387854"/>
             <a:ext cx="1560653" cy="567159"/>
           </a:xfrm>
           <a:prstGeom prst="roundRect">
@@ -13383,6 +13603,11 @@
               <a:lumOff val="40000"/>
             </a:schemeClr>
           </a:solidFill>
+          <a:ln>
+            <a:solidFill>
+              <a:srgbClr val="00B0F0"/>
+            </a:solidFill>
+          </a:ln>
         </p:spPr>
         <p:style>
           <a:lnRef idx="2">
@@ -13429,7 +13654,7 @@
         </p:nvSpPr>
         <p:spPr>
           <a:xfrm>
-            <a:off x="5207540" y="816257"/>
+            <a:off x="5207540" y="1075337"/>
             <a:ext cx="2292753" cy="3703898"/>
           </a:xfrm>
           <a:prstGeom prst="rect">
@@ -13476,7 +13701,7 @@
         </p:nvCxnSpPr>
         <p:spPr>
           <a:xfrm>
-            <a:off x="3520531" y="1695933"/>
+            <a:off x="3520531" y="1955013"/>
             <a:ext cx="5940" cy="387755"/>
           </a:xfrm>
           <a:prstGeom prst="straightConnector1">
@@ -13513,7 +13738,7 @@
         </p:nvCxnSpPr>
         <p:spPr>
           <a:xfrm>
-            <a:off x="3526471" y="2517735"/>
+            <a:off x="3526471" y="2776815"/>
             <a:ext cx="5635" cy="387755"/>
           </a:xfrm>
           <a:prstGeom prst="straightConnector1">
@@ -13550,7 +13775,7 @@
         </p:nvCxnSpPr>
         <p:spPr>
           <a:xfrm flipH="1">
-            <a:off x="3526471" y="3339537"/>
+            <a:off x="3526471" y="3598617"/>
             <a:ext cx="5635" cy="387755"/>
           </a:xfrm>
           <a:prstGeom prst="straightConnector1">
@@ -13587,7 +13812,7 @@
         </p:nvCxnSpPr>
         <p:spPr>
           <a:xfrm flipV="1">
-            <a:off x="4306797" y="3944315"/>
+            <a:off x="4306797" y="4203395"/>
             <a:ext cx="1300223" cy="1"/>
           </a:xfrm>
           <a:prstGeom prst="straightConnector1">
@@ -13625,7 +13850,7 @@
         </p:nvCxnSpPr>
         <p:spPr>
           <a:xfrm flipH="1" flipV="1">
-            <a:off x="6387346" y="3339537"/>
+            <a:off x="6387346" y="3598617"/>
             <a:ext cx="1" cy="387754"/>
           </a:xfrm>
           <a:prstGeom prst="straightConnector1">
@@ -13662,7 +13887,7 @@
         </p:nvCxnSpPr>
         <p:spPr>
           <a:xfrm flipV="1">
-            <a:off x="6387346" y="2517735"/>
+            <a:off x="6387346" y="2776815"/>
             <a:ext cx="0" cy="387755"/>
           </a:xfrm>
           <a:prstGeom prst="straightConnector1">
@@ -13699,7 +13924,7 @@
         </p:nvCxnSpPr>
         <p:spPr>
           <a:xfrm flipV="1">
-            <a:off x="6387346" y="1695933"/>
+            <a:off x="6387346" y="1955013"/>
             <a:ext cx="0" cy="387755"/>
           </a:xfrm>
           <a:prstGeom prst="straightConnector1">
@@ -13733,7 +13958,7 @@
         </p:nvSpPr>
         <p:spPr>
           <a:xfrm>
-            <a:off x="7912121" y="595220"/>
+            <a:off x="7912121" y="854300"/>
             <a:ext cx="219919" cy="243066"/>
           </a:xfrm>
           <a:prstGeom prst="ellipse">
@@ -13779,7 +14004,7 @@
         </p:nvSpPr>
         <p:spPr>
           <a:xfrm>
-            <a:off x="8420770" y="637101"/>
+            <a:off x="8420770" y="896181"/>
             <a:ext cx="713451" cy="156735"/>
           </a:xfrm>
           <a:prstGeom prst="rect">
@@ -13840,7 +14065,7 @@
         </p:nvCxnSpPr>
         <p:spPr>
           <a:xfrm flipV="1">
-            <a:off x="8132040" y="715469"/>
+            <a:off x="8132040" y="974549"/>
             <a:ext cx="288730" cy="1284"/>
           </a:xfrm>
           <a:prstGeom prst="straightConnector1">
@@ -13874,7 +14099,7 @@
         </p:nvSpPr>
         <p:spPr>
           <a:xfrm>
-            <a:off x="7912121" y="934589"/>
+            <a:off x="7912121" y="1193669"/>
             <a:ext cx="219919" cy="243066"/>
           </a:xfrm>
           <a:prstGeom prst="ellipse">
@@ -13923,7 +14148,7 @@
         </p:nvSpPr>
         <p:spPr>
           <a:xfrm>
-            <a:off x="8420770" y="976470"/>
+            <a:off x="8420770" y="1235550"/>
             <a:ext cx="713451" cy="156735"/>
           </a:xfrm>
           <a:prstGeom prst="rect">
@@ -13984,7 +14209,7 @@
         </p:nvCxnSpPr>
         <p:spPr>
           <a:xfrm flipV="1">
-            <a:off x="8132040" y="1054838"/>
+            <a:off x="8132040" y="1313918"/>
             <a:ext cx="288730" cy="1284"/>
           </a:xfrm>
           <a:prstGeom prst="straightConnector1">
@@ -14018,7 +14243,7 @@
         </p:nvSpPr>
         <p:spPr>
           <a:xfrm>
-            <a:off x="529457" y="2119118"/>
+            <a:off x="529457" y="2378198"/>
             <a:ext cx="1976360" cy="305652"/>
           </a:xfrm>
           <a:prstGeom prst="rect">
@@ -14080,7 +14305,7 @@
         </p:nvSpPr>
         <p:spPr>
           <a:xfrm>
-            <a:off x="2505817" y="891846"/>
+            <a:off x="2505817" y="1150926"/>
             <a:ext cx="2019804" cy="181594"/>
           </a:xfrm>
           <a:prstGeom prst="rect">
@@ -14142,7 +14367,7 @@
         </p:nvSpPr>
         <p:spPr>
           <a:xfrm>
-            <a:off x="1147439" y="659259"/>
+            <a:off x="1147439" y="918339"/>
             <a:ext cx="3357221" cy="181594"/>
           </a:xfrm>
           <a:prstGeom prst="rect">
@@ -14204,7 +14429,7 @@
         </p:nvSpPr>
         <p:spPr>
           <a:xfrm>
-            <a:off x="7605722" y="2938110"/>
+            <a:off x="7605722" y="3197190"/>
             <a:ext cx="1349794" cy="398617"/>
           </a:xfrm>
           <a:prstGeom prst="rect">
@@ -14266,7 +14491,7 @@
         </p:nvSpPr>
         <p:spPr>
           <a:xfrm>
-            <a:off x="7570766" y="2119118"/>
+            <a:off x="7570766" y="2378198"/>
             <a:ext cx="1411278" cy="398617"/>
           </a:xfrm>
           <a:prstGeom prst="rect">
@@ -14328,7 +14553,7 @@
         </p:nvSpPr>
         <p:spPr>
           <a:xfrm>
-            <a:off x="7544238" y="1259599"/>
+            <a:off x="7544238" y="1518679"/>
             <a:ext cx="1411278" cy="398617"/>
           </a:xfrm>
           <a:prstGeom prst="rect">
@@ -14390,7 +14615,7 @@
         </p:nvSpPr>
         <p:spPr>
           <a:xfrm>
-            <a:off x="612101" y="2903550"/>
+            <a:off x="612101" y="3162630"/>
             <a:ext cx="1835610" cy="305652"/>
           </a:xfrm>
           <a:prstGeom prst="rect">
@@ -14450,6 +14675,328 @@
                   <a:lumMod val="50000"/>
                 </a:schemeClr>
               </a:solidFill>
+            </a:endParaRPr>
+          </a:p>
+        </p:txBody>
+      </p:sp>
+      <p:sp>
+        <p:nvSpPr>
+          <p:cNvPr id="40" name="Google Shape;92;g80294dfa11_0_4"/>
+          <p:cNvSpPr txBox="1">
+            <a:spLocks/>
+          </p:cNvSpPr>
+          <p:nvPr/>
+        </p:nvSpPr>
+        <p:spPr>
+          <a:xfrm>
+            <a:off x="3707849" y="234659"/>
+            <a:ext cx="1890144" cy="320700"/>
+          </a:xfrm>
+          <a:prstGeom prst="rect">
+            <a:avLst/>
+          </a:prstGeom>
+          <a:noFill/>
+          <a:ln>
+            <a:noFill/>
+          </a:ln>
+        </p:spPr>
+        <p:txBody>
+          <a:bodyPr spcFirstLastPara="1" wrap="square" lIns="0" tIns="12700" rIns="0" bIns="0" anchor="t" anchorCtr="0">
+            <a:noAutofit/>
+          </a:bodyPr>
+          <a:lstStyle>
+            <a:defPPr marR="0" lvl="0" algn="l" rtl="0">
+              <a:lnSpc>
+                <a:spcPct val="100000"/>
+              </a:lnSpc>
+              <a:spcBef>
+                <a:spcPts val="0"/>
+              </a:spcBef>
+              <a:spcAft>
+                <a:spcPts val="0"/>
+              </a:spcAft>
+            </a:defPPr>
+            <a:lvl1pPr marR="0" lvl="0" algn="l" rtl="0">
+              <a:lnSpc>
+                <a:spcPct val="100000"/>
+              </a:lnSpc>
+              <a:spcBef>
+                <a:spcPts val="0"/>
+              </a:spcBef>
+              <a:spcAft>
+                <a:spcPts val="0"/>
+              </a:spcAft>
+              <a:buClr>
+                <a:schemeClr val="dk1"/>
+              </a:buClr>
+              <a:buSzPts val="4200"/>
+              <a:buFont typeface="Economica"/>
+              <a:buNone/>
+              <a:defRPr sz="4200" b="0" i="0" u="none" strike="noStrike" cap="none">
+                <a:solidFill>
+                  <a:schemeClr val="dk1"/>
+                </a:solidFill>
+                <a:latin typeface="Economica"/>
+                <a:ea typeface="Economica"/>
+                <a:cs typeface="Economica"/>
+                <a:sym typeface="Economica"/>
+              </a:defRPr>
+            </a:lvl1pPr>
+            <a:lvl2pPr marR="0" lvl="1" algn="l" rtl="0">
+              <a:lnSpc>
+                <a:spcPct val="100000"/>
+              </a:lnSpc>
+              <a:spcBef>
+                <a:spcPts val="0"/>
+              </a:spcBef>
+              <a:spcAft>
+                <a:spcPts val="0"/>
+              </a:spcAft>
+              <a:buClr>
+                <a:schemeClr val="dk1"/>
+              </a:buClr>
+              <a:buSzPts val="4200"/>
+              <a:buFont typeface="Economica"/>
+              <a:buNone/>
+              <a:defRPr sz="4200" b="0" i="0" u="none" strike="noStrike" cap="none">
+                <a:solidFill>
+                  <a:schemeClr val="dk1"/>
+                </a:solidFill>
+                <a:latin typeface="Economica"/>
+                <a:ea typeface="Economica"/>
+                <a:cs typeface="Economica"/>
+                <a:sym typeface="Economica"/>
+              </a:defRPr>
+            </a:lvl2pPr>
+            <a:lvl3pPr marR="0" lvl="2" algn="l" rtl="0">
+              <a:lnSpc>
+                <a:spcPct val="100000"/>
+              </a:lnSpc>
+              <a:spcBef>
+                <a:spcPts val="0"/>
+              </a:spcBef>
+              <a:spcAft>
+                <a:spcPts val="0"/>
+              </a:spcAft>
+              <a:buClr>
+                <a:schemeClr val="dk1"/>
+              </a:buClr>
+              <a:buSzPts val="4200"/>
+              <a:buFont typeface="Economica"/>
+              <a:buNone/>
+              <a:defRPr sz="4200" b="0" i="0" u="none" strike="noStrike" cap="none">
+                <a:solidFill>
+                  <a:schemeClr val="dk1"/>
+                </a:solidFill>
+                <a:latin typeface="Economica"/>
+                <a:ea typeface="Economica"/>
+                <a:cs typeface="Economica"/>
+                <a:sym typeface="Economica"/>
+              </a:defRPr>
+            </a:lvl3pPr>
+            <a:lvl4pPr marR="0" lvl="3" algn="l" rtl="0">
+              <a:lnSpc>
+                <a:spcPct val="100000"/>
+              </a:lnSpc>
+              <a:spcBef>
+                <a:spcPts val="0"/>
+              </a:spcBef>
+              <a:spcAft>
+                <a:spcPts val="0"/>
+              </a:spcAft>
+              <a:buClr>
+                <a:schemeClr val="dk1"/>
+              </a:buClr>
+              <a:buSzPts val="4200"/>
+              <a:buFont typeface="Economica"/>
+              <a:buNone/>
+              <a:defRPr sz="4200" b="0" i="0" u="none" strike="noStrike" cap="none">
+                <a:solidFill>
+                  <a:schemeClr val="dk1"/>
+                </a:solidFill>
+                <a:latin typeface="Economica"/>
+                <a:ea typeface="Economica"/>
+                <a:cs typeface="Economica"/>
+                <a:sym typeface="Economica"/>
+              </a:defRPr>
+            </a:lvl4pPr>
+            <a:lvl5pPr marR="0" lvl="4" algn="l" rtl="0">
+              <a:lnSpc>
+                <a:spcPct val="100000"/>
+              </a:lnSpc>
+              <a:spcBef>
+                <a:spcPts val="0"/>
+              </a:spcBef>
+              <a:spcAft>
+                <a:spcPts val="0"/>
+              </a:spcAft>
+              <a:buClr>
+                <a:schemeClr val="dk1"/>
+              </a:buClr>
+              <a:buSzPts val="4200"/>
+              <a:buFont typeface="Economica"/>
+              <a:buNone/>
+              <a:defRPr sz="4200" b="0" i="0" u="none" strike="noStrike" cap="none">
+                <a:solidFill>
+                  <a:schemeClr val="dk1"/>
+                </a:solidFill>
+                <a:latin typeface="Economica"/>
+                <a:ea typeface="Economica"/>
+                <a:cs typeface="Economica"/>
+                <a:sym typeface="Economica"/>
+              </a:defRPr>
+            </a:lvl5pPr>
+            <a:lvl6pPr marR="0" lvl="5" algn="l" rtl="0">
+              <a:lnSpc>
+                <a:spcPct val="100000"/>
+              </a:lnSpc>
+              <a:spcBef>
+                <a:spcPts val="0"/>
+              </a:spcBef>
+              <a:spcAft>
+                <a:spcPts val="0"/>
+              </a:spcAft>
+              <a:buClr>
+                <a:schemeClr val="dk1"/>
+              </a:buClr>
+              <a:buSzPts val="4200"/>
+              <a:buFont typeface="Economica"/>
+              <a:buNone/>
+              <a:defRPr sz="4200" b="0" i="0" u="none" strike="noStrike" cap="none">
+                <a:solidFill>
+                  <a:schemeClr val="dk1"/>
+                </a:solidFill>
+                <a:latin typeface="Economica"/>
+                <a:ea typeface="Economica"/>
+                <a:cs typeface="Economica"/>
+                <a:sym typeface="Economica"/>
+              </a:defRPr>
+            </a:lvl6pPr>
+            <a:lvl7pPr marR="0" lvl="6" algn="l" rtl="0">
+              <a:lnSpc>
+                <a:spcPct val="100000"/>
+              </a:lnSpc>
+              <a:spcBef>
+                <a:spcPts val="0"/>
+              </a:spcBef>
+              <a:spcAft>
+                <a:spcPts val="0"/>
+              </a:spcAft>
+              <a:buClr>
+                <a:schemeClr val="dk1"/>
+              </a:buClr>
+              <a:buSzPts val="4200"/>
+              <a:buFont typeface="Economica"/>
+              <a:buNone/>
+              <a:defRPr sz="4200" b="0" i="0" u="none" strike="noStrike" cap="none">
+                <a:solidFill>
+                  <a:schemeClr val="dk1"/>
+                </a:solidFill>
+                <a:latin typeface="Economica"/>
+                <a:ea typeface="Economica"/>
+                <a:cs typeface="Economica"/>
+                <a:sym typeface="Economica"/>
+              </a:defRPr>
+            </a:lvl7pPr>
+            <a:lvl8pPr marR="0" lvl="7" algn="l" rtl="0">
+              <a:lnSpc>
+                <a:spcPct val="100000"/>
+              </a:lnSpc>
+              <a:spcBef>
+                <a:spcPts val="0"/>
+              </a:spcBef>
+              <a:spcAft>
+                <a:spcPts val="0"/>
+              </a:spcAft>
+              <a:buClr>
+                <a:schemeClr val="dk1"/>
+              </a:buClr>
+              <a:buSzPts val="4200"/>
+              <a:buFont typeface="Economica"/>
+              <a:buNone/>
+              <a:defRPr sz="4200" b="0" i="0" u="none" strike="noStrike" cap="none">
+                <a:solidFill>
+                  <a:schemeClr val="dk1"/>
+                </a:solidFill>
+                <a:latin typeface="Economica"/>
+                <a:ea typeface="Economica"/>
+                <a:cs typeface="Economica"/>
+                <a:sym typeface="Economica"/>
+              </a:defRPr>
+            </a:lvl8pPr>
+            <a:lvl9pPr marR="0" lvl="8" algn="l" rtl="0">
+              <a:lnSpc>
+                <a:spcPct val="100000"/>
+              </a:lnSpc>
+              <a:spcBef>
+                <a:spcPts val="0"/>
+              </a:spcBef>
+              <a:spcAft>
+                <a:spcPts val="0"/>
+              </a:spcAft>
+              <a:buClr>
+                <a:schemeClr val="dk1"/>
+              </a:buClr>
+              <a:buSzPts val="4200"/>
+              <a:buFont typeface="Economica"/>
+              <a:buNone/>
+              <a:defRPr sz="4200" b="0" i="0" u="none" strike="noStrike" cap="none">
+                <a:solidFill>
+                  <a:schemeClr val="dk1"/>
+                </a:solidFill>
+                <a:latin typeface="Economica"/>
+                <a:ea typeface="Economica"/>
+                <a:cs typeface="Economica"/>
+                <a:sym typeface="Economica"/>
+              </a:defRPr>
+            </a:lvl9pPr>
+          </a:lstStyle>
+          <a:p>
+            <a:pPr marL="12700"/>
+            <a:r>
+              <a:rPr lang="zh-CN" altLang="en-US" sz="2400" b="1">
+                <a:solidFill>
+                  <a:srgbClr val="39373D"/>
+                </a:solidFill>
+                <a:latin typeface="Muli"/>
+                <a:ea typeface="Muli"/>
+                <a:cs typeface="Muli"/>
+                <a:sym typeface="Muli"/>
+              </a:rPr>
+              <a:t>程序</a:t>
+            </a:r>
+            <a:r>
+              <a:rPr lang="zh-CN" altLang="en-US" sz="2400" b="1">
+                <a:solidFill>
+                  <a:srgbClr val="39373D"/>
+                </a:solidFill>
+                <a:latin typeface="Muli"/>
+                <a:ea typeface="Muli"/>
+                <a:cs typeface="Muli"/>
+                <a:sym typeface="Muli"/>
+              </a:rPr>
+              <a:t>调用</a:t>
+            </a:r>
+            <a:r>
+              <a:rPr lang="zh-CN" altLang="en-US" sz="2400" b="1" smtClean="0">
+                <a:solidFill>
+                  <a:srgbClr val="39373D"/>
+                </a:solidFill>
+                <a:latin typeface="Muli"/>
+                <a:ea typeface="Muli"/>
+                <a:cs typeface="Muli"/>
+                <a:sym typeface="Muli"/>
+              </a:rPr>
+              <a:t>流程</a:t>
+            </a:r>
+            <a:endParaRPr lang="zh-CN" altLang="en-US" sz="2400" b="1">
+              <a:solidFill>
+                <a:srgbClr val="39373D"/>
+              </a:solidFill>
+              <a:latin typeface="Muli"/>
+              <a:ea typeface="Muli"/>
+              <a:cs typeface="Muli"/>
+              <a:sym typeface="Muli"/>
             </a:endParaRPr>
           </a:p>
         </p:txBody>
@@ -15665,15 +16212,7 @@
                   <a:schemeClr val="tx1"/>
                 </a:solidFill>
               </a:rPr>
-              <a:t>区域</a:t>
-            </a:r>
-            <a:r>
-              <a:rPr lang="zh-CN" altLang="en-US" b="1" smtClean="0">
-                <a:solidFill>
-                  <a:schemeClr val="tx1"/>
-                </a:solidFill>
-              </a:rPr>
-              <a:t>（</a:t>
+              <a:t>区域（</a:t>
             </a:r>
             <a:r>
               <a:rPr lang="en-US" altLang="zh-CN" b="1" smtClean="0">
@@ -16879,24 +17418,31 @@
       </p:grpSpPr>
       <p:sp>
         <p:nvSpPr>
-          <p:cNvPr id="50" name="圆角矩形 49"/>
+          <p:cNvPr id="46" name="圆角矩形 45"/>
           <p:cNvSpPr/>
           <p:nvPr/>
         </p:nvSpPr>
         <p:spPr>
           <a:xfrm>
-            <a:off x="1274846" y="1535656"/>
-            <a:ext cx="1388962" cy="567159"/>
+            <a:off x="2322074" y="901312"/>
+            <a:ext cx="4490206" cy="2195354"/>
           </a:xfrm>
           <a:prstGeom prst="roundRect">
-            <a:avLst/>
+            <a:avLst>
+              <a:gd name="adj" fmla="val 8967"/>
+            </a:avLst>
           </a:prstGeom>
           <a:solidFill>
-            <a:schemeClr val="bg2">
-              <a:lumMod val="60000"/>
-              <a:lumOff val="40000"/>
+            <a:schemeClr val="accent6">
+              <a:lumMod val="40000"/>
+              <a:lumOff val="60000"/>
             </a:schemeClr>
           </a:solidFill>
+          <a:ln>
+            <a:solidFill>
+              <a:schemeClr val="bg1"/>
+            </a:solidFill>
+          </a:ln>
         </p:spPr>
         <p:style>
           <a:lnRef idx="2">
@@ -16919,44 +17465,30 @@
           <a:lstStyle/>
           <a:p>
             <a:pPr algn="ctr"/>
-            <a:r>
-              <a:rPr lang="en-US" altLang="zh-CN" b="1" dirty="0">
-                <a:solidFill>
-                  <a:schemeClr val="tx1"/>
-                </a:solidFill>
-              </a:rPr>
-              <a:t>Carla </a:t>
-            </a:r>
-          </a:p>
-          <a:p>
-            <a:pPr algn="ctr"/>
-            <a:r>
-              <a:rPr lang="zh-CN" altLang="en-US" b="1" dirty="0">
-                <a:solidFill>
-                  <a:schemeClr val="tx1"/>
-                </a:solidFill>
-              </a:rPr>
-              <a:t>主服务器</a:t>
-            </a:r>
+            <a:endParaRPr lang="zh-CN" altLang="en-US" b="1">
+              <a:solidFill>
+                <a:schemeClr val="tx1"/>
+              </a:solidFill>
+            </a:endParaRPr>
           </a:p>
         </p:txBody>
       </p:sp>
       <p:sp>
         <p:nvSpPr>
-          <p:cNvPr id="54" name="圆角矩形 53"/>
+          <p:cNvPr id="62" name="圆角矩形 61"/>
           <p:cNvSpPr/>
           <p:nvPr/>
         </p:nvSpPr>
         <p:spPr>
           <a:xfrm>
-            <a:off x="1449718" y="2490570"/>
-            <a:ext cx="1048492" cy="434047"/>
+            <a:off x="353540" y="2888979"/>
+            <a:ext cx="1475407" cy="417356"/>
           </a:xfrm>
           <a:prstGeom prst="roundRect">
             <a:avLst/>
           </a:prstGeom>
           <a:solidFill>
-            <a:schemeClr val="accent5">
+            <a:schemeClr val="accent4">
               <a:lumMod val="60000"/>
               <a:lumOff val="40000"/>
             </a:schemeClr>
@@ -16984,22 +17516,14 @@
           <a:p>
             <a:pPr algn="ctr"/>
             <a:r>
-              <a:rPr lang="zh-CN" altLang="en-US" b="1" dirty="0">
+              <a:rPr lang="en-US" altLang="zh-CN" b="1" smtClean="0">
                 <a:solidFill>
                   <a:schemeClr val="tx1"/>
                 </a:solidFill>
               </a:rPr>
-              <a:t>客户端 </a:t>
+              <a:t>Windows.mk</a:t>
             </a:r>
-            <a:r>
-              <a:rPr lang="en-US" altLang="zh-CN" b="1" dirty="0">
-                <a:solidFill>
-                  <a:schemeClr val="tx1"/>
-                </a:solidFill>
-              </a:rPr>
-              <a:t>1</a:t>
-            </a:r>
-            <a:endParaRPr lang="zh-CN" altLang="en-US" b="1" dirty="0">
+            <a:endParaRPr lang="zh-CN" altLang="en-US" b="1">
               <a:solidFill>
                 <a:schemeClr val="tx1"/>
               </a:solidFill>
@@ -17007,26 +17531,108 @@
           </a:p>
         </p:txBody>
       </p:sp>
+      <p:sp>
+        <p:nvSpPr>
+          <p:cNvPr id="64" name="圆角矩形 63"/>
+          <p:cNvSpPr/>
+          <p:nvPr/>
+        </p:nvSpPr>
+        <p:spPr>
+          <a:xfrm>
+            <a:off x="475829" y="2236435"/>
+            <a:ext cx="1230830" cy="381657"/>
+          </a:xfrm>
+          <a:prstGeom prst="roundRect">
+            <a:avLst/>
+          </a:prstGeom>
+          <a:solidFill>
+            <a:schemeClr val="accent4">
+              <a:lumMod val="60000"/>
+              <a:lumOff val="40000"/>
+            </a:schemeClr>
+          </a:solidFill>
+        </p:spPr>
+        <p:style>
+          <a:lnRef idx="2">
+            <a:schemeClr val="accent1">
+              <a:shade val="50000"/>
+            </a:schemeClr>
+          </a:lnRef>
+          <a:fillRef idx="1">
+            <a:schemeClr val="accent1"/>
+          </a:fillRef>
+          <a:effectRef idx="0">
+            <a:schemeClr val="accent1"/>
+          </a:effectRef>
+          <a:fontRef idx="minor">
+            <a:schemeClr val="lt1"/>
+          </a:fontRef>
+        </p:style>
+        <p:txBody>
+          <a:bodyPr rtlCol="0" anchor="ctr"/>
+          <a:lstStyle/>
+          <a:p>
+            <a:pPr algn="ctr"/>
+            <a:r>
+              <a:rPr lang="en-US" altLang="zh-CN" b="1" smtClean="0">
+                <a:solidFill>
+                  <a:schemeClr val="tx1"/>
+                </a:solidFill>
+              </a:rPr>
+              <a:t>Makefile</a:t>
+            </a:r>
+            <a:endParaRPr lang="zh-CN" altLang="en-US" b="1">
+              <a:solidFill>
+                <a:schemeClr val="tx1"/>
+              </a:solidFill>
+            </a:endParaRPr>
+          </a:p>
+        </p:txBody>
+      </p:sp>
+      <p:sp>
+        <p:nvSpPr>
+          <p:cNvPr id="23" name="文本框 22"/>
+          <p:cNvSpPr txBox="1"/>
+          <p:nvPr/>
+        </p:nvSpPr>
+        <p:spPr>
+          <a:xfrm>
+            <a:off x="2504230" y="4403499"/>
+            <a:ext cx="3649423" cy="307777"/>
+          </a:xfrm>
+          <a:prstGeom prst="rect">
+            <a:avLst/>
+          </a:prstGeom>
+          <a:noFill/>
+        </p:spPr>
+        <p:txBody>
+          <a:bodyPr wrap="square" rtlCol="0">
+            <a:spAutoFit/>
+          </a:bodyPr>
+          <a:lstStyle/>
+          <a:p>
+            <a:pPr algn="ctr"/>
+            <a:r>
+              <a:rPr lang="en-US" altLang="zh-CN" smtClean="0"/>
+              <a:t>Util/BuildTools/*</a:t>
+            </a:r>
+            <a:endParaRPr lang="zh-CN" altLang="en-US"/>
+          </a:p>
+        </p:txBody>
+      </p:sp>
       <p:cxnSp>
         <p:nvCxnSpPr>
-          <p:cNvPr id="4" name="直接箭头连接符 3">
-            <a:extLst>
-              <a:ext uri="{FF2B5EF4-FFF2-40B4-BE49-F238E27FC236}">
-                <a16:creationId xmlns:a16="http://schemas.microsoft.com/office/drawing/2014/main" id="{1DDE7D57-06CB-1739-D94B-0F246FD36E71}"/>
-              </a:ext>
-            </a:extLst>
-          </p:cNvPr>
+          <p:cNvPr id="3" name="直接箭头连接符 2"/>
           <p:cNvCxnSpPr>
-            <a:cxnSpLocks/>
-            <a:stCxn id="50" idx="2"/>
-            <a:endCxn id="54" idx="0"/>
+            <a:stCxn id="64" idx="2"/>
+            <a:endCxn id="62" idx="0"/>
           </p:cNvCxnSpPr>
           <p:nvPr/>
         </p:nvCxnSpPr>
         <p:spPr>
           <a:xfrm>
-            <a:off x="1969327" y="2102815"/>
-            <a:ext cx="4637" cy="387755"/>
+            <a:off x="1091244" y="2618092"/>
+            <a:ext cx="0" cy="270887"/>
           </a:xfrm>
           <a:prstGeom prst="straightConnector1">
             <a:avLst/>
@@ -17052,26 +17658,23 @@
       </p:cxnSp>
       <p:sp>
         <p:nvSpPr>
-          <p:cNvPr id="15" name="圆角矩形 59">
-            <a:extLst>
-              <a:ext uri="{FF2B5EF4-FFF2-40B4-BE49-F238E27FC236}">
-                <a16:creationId xmlns:a16="http://schemas.microsoft.com/office/drawing/2014/main" id="{9BD324B6-B80D-605B-22DF-7789E01BA5F7}"/>
-              </a:ext>
-            </a:extLst>
-          </p:cNvPr>
+          <p:cNvPr id="17" name="圆角矩形 16"/>
           <p:cNvSpPr/>
           <p:nvPr/>
         </p:nvSpPr>
         <p:spPr>
           <a:xfrm>
-            <a:off x="424323" y="3614760"/>
-            <a:ext cx="1287518" cy="434047"/>
+            <a:off x="2335182" y="3777465"/>
+            <a:ext cx="2015165" cy="364229"/>
           </a:xfrm>
           <a:prstGeom prst="roundRect">
             <a:avLst/>
           </a:prstGeom>
           <a:solidFill>
-            <a:schemeClr val="bg1"/>
+            <a:schemeClr val="accent4">
+              <a:lumMod val="60000"/>
+              <a:lumOff val="40000"/>
+            </a:schemeClr>
           </a:solidFill>
         </p:spPr>
         <p:style>
@@ -17096,22 +17699,14 @@
           <a:p>
             <a:pPr algn="ctr"/>
             <a:r>
-              <a:rPr lang="zh-CN" altLang="en-US" b="1" dirty="0">
+              <a:rPr lang="en-US" altLang="zh-CN" b="1" smtClean="0">
                 <a:solidFill>
                   <a:schemeClr val="tx1"/>
                 </a:solidFill>
               </a:rPr>
-              <a:t>传感器</a:t>
+              <a:t>BuildUE4Plugins.bat</a:t>
             </a:r>
-            <a:r>
-              <a:rPr lang="en-US" altLang="zh-CN" b="1" dirty="0">
-                <a:solidFill>
-                  <a:schemeClr val="tx1"/>
-                </a:solidFill>
-              </a:rPr>
-              <a:t> 1</a:t>
-            </a:r>
-            <a:endParaRPr lang="zh-CN" altLang="en-US" b="1" dirty="0">
+            <a:endParaRPr lang="zh-CN" altLang="en-US" b="1">
               <a:solidFill>
                 <a:schemeClr val="tx1"/>
               </a:solidFill>
@@ -17121,26 +17716,23 @@
       </p:sp>
       <p:sp>
         <p:nvSpPr>
-          <p:cNvPr id="16" name="圆角矩形 59">
-            <a:extLst>
-              <a:ext uri="{FF2B5EF4-FFF2-40B4-BE49-F238E27FC236}">
-                <a16:creationId xmlns:a16="http://schemas.microsoft.com/office/drawing/2014/main" id="{D7893EC6-6F41-F5C0-EAAA-B82B0718C5BC}"/>
-              </a:ext>
-            </a:extLst>
-          </p:cNvPr>
+          <p:cNvPr id="18" name="圆角矩形 17"/>
           <p:cNvSpPr/>
           <p:nvPr/>
         </p:nvSpPr>
         <p:spPr>
           <a:xfrm>
-            <a:off x="2232412" y="3614760"/>
-            <a:ext cx="1287518" cy="434047"/>
+            <a:off x="2812232" y="3213454"/>
+            <a:ext cx="1061063" cy="354431"/>
           </a:xfrm>
           <a:prstGeom prst="roundRect">
             <a:avLst/>
           </a:prstGeom>
           <a:solidFill>
-            <a:schemeClr val="bg1"/>
+            <a:schemeClr val="accent4">
+              <a:lumMod val="60000"/>
+              <a:lumOff val="40000"/>
+            </a:schemeClr>
           </a:solidFill>
         </p:spPr>
         <p:style>
@@ -17165,22 +17757,14 @@
           <a:p>
             <a:pPr algn="ctr"/>
             <a:r>
-              <a:rPr lang="zh-CN" altLang="en-US" b="1" dirty="0">
+              <a:rPr lang="en-US" altLang="zh-CN" b="1" smtClean="0">
                 <a:solidFill>
                   <a:schemeClr val="tx1"/>
                 </a:solidFill>
               </a:rPr>
-              <a:t>传感器</a:t>
+              <a:t>Setup.bat</a:t>
             </a:r>
-            <a:r>
-              <a:rPr lang="en-US" altLang="zh-CN" b="1" dirty="0">
-                <a:solidFill>
-                  <a:schemeClr val="tx1"/>
-                </a:solidFill>
-              </a:rPr>
-              <a:t> 2</a:t>
-            </a:r>
-            <a:endParaRPr lang="zh-CN" altLang="en-US" b="1" dirty="0">
+            <a:endParaRPr lang="zh-CN" altLang="en-US" b="1">
               <a:solidFill>
                 <a:schemeClr val="tx1"/>
               </a:solidFill>
@@ -17190,23 +17774,169 @@
       </p:sp>
       <p:cxnSp>
         <p:nvCxnSpPr>
-          <p:cNvPr id="18" name="直接箭头连接符 17">
-            <a:extLst>
-              <a:ext uri="{FF2B5EF4-FFF2-40B4-BE49-F238E27FC236}">
-                <a16:creationId xmlns:a16="http://schemas.microsoft.com/office/drawing/2014/main" id="{D1683E4A-D9A6-736B-7F44-01022149A5D6}"/>
-              </a:ext>
-            </a:extLst>
-          </p:cNvPr>
+          <p:cNvPr id="8" name="直接箭头连接符 7"/>
           <p:cNvCxnSpPr>
-            <a:stCxn id="54" idx="2"/>
-            <a:endCxn id="15" idx="0"/>
+            <a:stCxn id="17" idx="0"/>
+            <a:endCxn id="18" idx="2"/>
           </p:cNvCxnSpPr>
           <p:nvPr/>
         </p:nvCxnSpPr>
         <p:spPr>
-          <a:xfrm flipH="1">
-            <a:off x="1068082" y="2924617"/>
-            <a:ext cx="905882" cy="690143"/>
+          <a:xfrm flipH="1" flipV="1">
+            <a:off x="3342764" y="3567885"/>
+            <a:ext cx="1" cy="209580"/>
+          </a:xfrm>
+          <a:prstGeom prst="straightConnector1">
+            <a:avLst/>
+          </a:prstGeom>
+          <a:ln w="19050">
+            <a:tailEnd type="triangle"/>
+          </a:ln>
+        </p:spPr>
+        <p:style>
+          <a:lnRef idx="1">
+            <a:schemeClr val="accent1"/>
+          </a:lnRef>
+          <a:fillRef idx="0">
+            <a:schemeClr val="accent1"/>
+          </a:fillRef>
+          <a:effectRef idx="0">
+            <a:schemeClr val="accent1"/>
+          </a:effectRef>
+          <a:fontRef idx="minor">
+            <a:schemeClr val="tx1"/>
+          </a:fontRef>
+        </p:style>
+      </p:cxnSp>
+      <p:sp>
+        <p:nvSpPr>
+          <p:cNvPr id="29" name="圆角矩形 28"/>
+          <p:cNvSpPr/>
+          <p:nvPr/>
+        </p:nvSpPr>
+        <p:spPr>
+          <a:xfrm>
+            <a:off x="2440169" y="2618093"/>
+            <a:ext cx="1805153" cy="354431"/>
+          </a:xfrm>
+          <a:prstGeom prst="roundRect">
+            <a:avLst/>
+          </a:prstGeom>
+          <a:solidFill>
+            <a:schemeClr val="accent4">
+              <a:lumMod val="60000"/>
+              <a:lumOff val="40000"/>
+            </a:schemeClr>
+          </a:solidFill>
+        </p:spPr>
+        <p:style>
+          <a:lnRef idx="2">
+            <a:schemeClr val="accent1">
+              <a:shade val="50000"/>
+            </a:schemeClr>
+          </a:lnRef>
+          <a:fillRef idx="1">
+            <a:schemeClr val="accent1"/>
+          </a:fillRef>
+          <a:effectRef idx="0">
+            <a:schemeClr val="accent1"/>
+          </a:effectRef>
+          <a:fontRef idx="minor">
+            <a:schemeClr val="lt1"/>
+          </a:fontRef>
+        </p:style>
+        <p:txBody>
+          <a:bodyPr rtlCol="0" anchor="ctr"/>
+          <a:lstStyle/>
+          <a:p>
+            <a:pPr algn="ctr"/>
+            <a:r>
+              <a:rPr lang="en-US" altLang="zh-CN" b="1" smtClean="0">
+                <a:solidFill>
+                  <a:schemeClr val="tx1"/>
+                </a:solidFill>
+              </a:rPr>
+              <a:t>BuildLibCarla.bat</a:t>
+            </a:r>
+            <a:endParaRPr lang="zh-CN" altLang="en-US" b="1">
+              <a:solidFill>
+                <a:schemeClr val="tx1"/>
+              </a:solidFill>
+            </a:endParaRPr>
+          </a:p>
+        </p:txBody>
+      </p:sp>
+      <p:sp>
+        <p:nvSpPr>
+          <p:cNvPr id="30" name="圆角矩形 29"/>
+          <p:cNvSpPr/>
+          <p:nvPr/>
+        </p:nvSpPr>
+        <p:spPr>
+          <a:xfrm>
+            <a:off x="2504230" y="1817225"/>
+            <a:ext cx="1921836" cy="354431"/>
+          </a:xfrm>
+          <a:prstGeom prst="roundRect">
+            <a:avLst/>
+          </a:prstGeom>
+          <a:solidFill>
+            <a:schemeClr val="accent4">
+              <a:lumMod val="60000"/>
+              <a:lumOff val="40000"/>
+            </a:schemeClr>
+          </a:solidFill>
+        </p:spPr>
+        <p:style>
+          <a:lnRef idx="2">
+            <a:schemeClr val="accent1">
+              <a:shade val="50000"/>
+            </a:schemeClr>
+          </a:lnRef>
+          <a:fillRef idx="1">
+            <a:schemeClr val="accent1"/>
+          </a:fillRef>
+          <a:effectRef idx="0">
+            <a:schemeClr val="accent1"/>
+          </a:effectRef>
+          <a:fontRef idx="minor">
+            <a:schemeClr val="lt1"/>
+          </a:fontRef>
+        </p:style>
+        <p:txBody>
+          <a:bodyPr rtlCol="0" anchor="ctr"/>
+          <a:lstStyle/>
+          <a:p>
+            <a:pPr algn="ctr"/>
+            <a:r>
+              <a:rPr lang="en-US" altLang="zh-CN" b="1" smtClean="0">
+                <a:solidFill>
+                  <a:schemeClr val="tx1"/>
+                </a:solidFill>
+              </a:rPr>
+              <a:t>BuildPythonAPI.bat</a:t>
+            </a:r>
+            <a:endParaRPr lang="zh-CN" altLang="en-US" b="1">
+              <a:solidFill>
+                <a:schemeClr val="tx1"/>
+              </a:solidFill>
+            </a:endParaRPr>
+          </a:p>
+        </p:txBody>
+      </p:sp>
+      <p:cxnSp>
+        <p:nvCxnSpPr>
+          <p:cNvPr id="16" name="直接箭头连接符 15"/>
+          <p:cNvCxnSpPr>
+            <a:stCxn id="29" idx="0"/>
+            <a:endCxn id="30" idx="2"/>
+          </p:cNvCxnSpPr>
+          <p:nvPr/>
+        </p:nvCxnSpPr>
+        <p:spPr>
+          <a:xfrm flipV="1">
+            <a:off x="3342746" y="2171656"/>
+            <a:ext cx="122402" cy="446437"/>
           </a:xfrm>
           <a:prstGeom prst="straightConnector1">
             <a:avLst/>
@@ -17232,23 +17962,17 @@
       </p:cxnSp>
       <p:cxnSp>
         <p:nvCxnSpPr>
-          <p:cNvPr id="20" name="直接箭头连接符 19">
-            <a:extLst>
-              <a:ext uri="{FF2B5EF4-FFF2-40B4-BE49-F238E27FC236}">
-                <a16:creationId xmlns:a16="http://schemas.microsoft.com/office/drawing/2014/main" id="{A8C86916-C1E0-295C-67AF-63E1D851EB59}"/>
-              </a:ext>
-            </a:extLst>
-          </p:cNvPr>
+          <p:cNvPr id="20" name="直接箭头连接符 19"/>
           <p:cNvCxnSpPr>
-            <a:stCxn id="54" idx="2"/>
-            <a:endCxn id="16" idx="0"/>
+            <a:stCxn id="18" idx="0"/>
+            <a:endCxn id="29" idx="2"/>
           </p:cNvCxnSpPr>
           <p:nvPr/>
         </p:nvCxnSpPr>
         <p:spPr>
-          <a:xfrm>
-            <a:off x="1973964" y="2924617"/>
-            <a:ext cx="902207" cy="690143"/>
+          <a:xfrm flipH="1" flipV="1">
+            <a:off x="3342746" y="2972524"/>
+            <a:ext cx="18" cy="240930"/>
           </a:xfrm>
           <a:prstGeom prst="straightConnector1">
             <a:avLst/>
@@ -17274,26 +17998,23 @@
       </p:cxnSp>
       <p:sp>
         <p:nvSpPr>
-          <p:cNvPr id="24" name="圆角矩形 59">
-            <a:extLst>
-              <a:ext uri="{FF2B5EF4-FFF2-40B4-BE49-F238E27FC236}">
-                <a16:creationId xmlns:a16="http://schemas.microsoft.com/office/drawing/2014/main" id="{BAD14FD1-FE2B-5C84-E1AD-262A6A98E436}"/>
-              </a:ext>
-            </a:extLst>
-          </p:cNvPr>
+          <p:cNvPr id="37" name="圆角矩形 36"/>
           <p:cNvSpPr/>
           <p:nvPr/>
         </p:nvSpPr>
         <p:spPr>
           <a:xfrm>
-            <a:off x="3281398" y="1544670"/>
-            <a:ext cx="1132036" cy="567158"/>
+            <a:off x="4528945" y="2618092"/>
+            <a:ext cx="1948696" cy="354431"/>
           </a:xfrm>
           <a:prstGeom prst="roundRect">
             <a:avLst/>
           </a:prstGeom>
           <a:solidFill>
-            <a:schemeClr val="bg1"/>
+            <a:schemeClr val="accent4">
+              <a:lumMod val="60000"/>
+              <a:lumOff val="40000"/>
+            </a:schemeClr>
           </a:solidFill>
         </p:spPr>
         <p:style>
@@ -17318,57 +18039,76 @@
           <a:p>
             <a:pPr algn="ctr"/>
             <a:r>
-              <a:rPr lang="zh-CN" altLang="en-US" b="1" dirty="0">
+              <a:rPr lang="en-US" altLang="zh-CN" b="1" smtClean="0">
                 <a:solidFill>
                   <a:schemeClr val="tx1"/>
                 </a:solidFill>
               </a:rPr>
-              <a:t>多 </a:t>
+              <a:t>BuildOSM2ODR.bat</a:t>
             </a:r>
-            <a:r>
-              <a:rPr lang="en-US" altLang="zh-CN" b="1" dirty="0">
-                <a:solidFill>
-                  <a:schemeClr val="tx1"/>
-                </a:solidFill>
-              </a:rPr>
-              <a:t>GPU </a:t>
-            </a:r>
-          </a:p>
-          <a:p>
-            <a:pPr algn="ctr"/>
-            <a:r>
-              <a:rPr lang="zh-CN" altLang="en-US" b="1" dirty="0">
-                <a:solidFill>
-                  <a:schemeClr val="tx1"/>
-                </a:solidFill>
-              </a:rPr>
-              <a:t>服务器</a:t>
-            </a:r>
+            <a:endParaRPr lang="zh-CN" altLang="en-US" b="1">
+              <a:solidFill>
+                <a:schemeClr val="tx1"/>
+              </a:solidFill>
+            </a:endParaRPr>
           </a:p>
         </p:txBody>
       </p:sp>
+      <p:cxnSp>
+        <p:nvCxnSpPr>
+          <p:cNvPr id="26" name="直接箭头连接符 25"/>
+          <p:cNvCxnSpPr>
+            <a:stCxn id="37" idx="0"/>
+            <a:endCxn id="30" idx="2"/>
+          </p:cNvCxnSpPr>
+          <p:nvPr/>
+        </p:nvCxnSpPr>
+        <p:spPr>
+          <a:xfrm flipH="1" flipV="1">
+            <a:off x="3465148" y="2171656"/>
+            <a:ext cx="2038145" cy="446436"/>
+          </a:xfrm>
+          <a:prstGeom prst="straightConnector1">
+            <a:avLst/>
+          </a:prstGeom>
+          <a:ln w="19050">
+            <a:tailEnd type="triangle"/>
+          </a:ln>
+        </p:spPr>
+        <p:style>
+          <a:lnRef idx="1">
+            <a:schemeClr val="accent1"/>
+          </a:lnRef>
+          <a:fillRef idx="0">
+            <a:schemeClr val="accent1"/>
+          </a:fillRef>
+          <a:effectRef idx="0">
+            <a:schemeClr val="accent1"/>
+          </a:effectRef>
+          <a:fontRef idx="minor">
+            <a:schemeClr val="tx1"/>
+          </a:fontRef>
+        </p:style>
+      </p:cxnSp>
       <p:sp>
         <p:nvSpPr>
-          <p:cNvPr id="25" name="圆角矩形 59">
-            <a:extLst>
-              <a:ext uri="{FF2B5EF4-FFF2-40B4-BE49-F238E27FC236}">
-                <a16:creationId xmlns:a16="http://schemas.microsoft.com/office/drawing/2014/main" id="{7AEB8E71-31F4-6740-5F8C-74151E85BAB5}"/>
-              </a:ext>
-            </a:extLst>
-          </p:cNvPr>
+          <p:cNvPr id="41" name="圆角矩形 40"/>
           <p:cNvSpPr/>
           <p:nvPr/>
         </p:nvSpPr>
         <p:spPr>
           <a:xfrm>
-            <a:off x="5031526" y="1068251"/>
-            <a:ext cx="1132036" cy="567158"/>
+            <a:off x="4695977" y="1801795"/>
+            <a:ext cx="1921836" cy="354431"/>
           </a:xfrm>
           <a:prstGeom prst="roundRect">
             <a:avLst/>
           </a:prstGeom>
           <a:solidFill>
-            <a:schemeClr val="bg1"/>
+            <a:schemeClr val="accent4">
+              <a:lumMod val="60000"/>
+              <a:lumOff val="40000"/>
+            </a:schemeClr>
           </a:solidFill>
         </p:spPr>
         <p:style>
@@ -17393,57 +18133,40 @@
           <a:p>
             <a:pPr algn="ctr"/>
             <a:r>
-              <a:rPr lang="zh-CN" altLang="en-US" b="1" dirty="0">
+              <a:rPr lang="en-US" altLang="zh-CN" b="1" smtClean="0">
                 <a:solidFill>
                   <a:schemeClr val="tx1"/>
                 </a:solidFill>
               </a:rPr>
-              <a:t>多 </a:t>
+              <a:t>BuildCarlaUE4.bat</a:t>
             </a:r>
-            <a:r>
-              <a:rPr lang="en-US" altLang="zh-CN" b="1" dirty="0">
-                <a:solidFill>
-                  <a:schemeClr val="tx1"/>
-                </a:solidFill>
-              </a:rPr>
-              <a:t>GPU </a:t>
-            </a:r>
-          </a:p>
-          <a:p>
-            <a:pPr algn="ctr"/>
-            <a:r>
-              <a:rPr lang="zh-CN" altLang="en-US" b="1" dirty="0">
-                <a:solidFill>
-                  <a:schemeClr val="tx1"/>
-                </a:solidFill>
-              </a:rPr>
-              <a:t>客户端</a:t>
-            </a:r>
+            <a:endParaRPr lang="zh-CN" altLang="en-US" b="1">
+              <a:solidFill>
+                <a:schemeClr val="tx1"/>
+              </a:solidFill>
+            </a:endParaRPr>
           </a:p>
         </p:txBody>
       </p:sp>
       <p:sp>
         <p:nvSpPr>
-          <p:cNvPr id="27" name="圆角矩形 59">
-            <a:extLst>
-              <a:ext uri="{FF2B5EF4-FFF2-40B4-BE49-F238E27FC236}">
-                <a16:creationId xmlns:a16="http://schemas.microsoft.com/office/drawing/2014/main" id="{99088F38-BF36-5E89-7E9E-0A0688B4FC44}"/>
-              </a:ext>
-            </a:extLst>
-          </p:cNvPr>
+          <p:cNvPr id="47" name="圆角矩形 46"/>
           <p:cNvSpPr/>
           <p:nvPr/>
         </p:nvSpPr>
         <p:spPr>
           <a:xfrm>
-            <a:off x="5031526" y="2110905"/>
-            <a:ext cx="1132036" cy="567158"/>
+            <a:off x="4004524" y="1200989"/>
+            <a:ext cx="1275963" cy="354431"/>
           </a:xfrm>
           <a:prstGeom prst="roundRect">
             <a:avLst/>
           </a:prstGeom>
           <a:solidFill>
-            <a:schemeClr val="bg1"/>
+            <a:schemeClr val="accent4">
+              <a:lumMod val="60000"/>
+              <a:lumOff val="40000"/>
+            </a:schemeClr>
           </a:solidFill>
         </p:spPr>
         <p:style>
@@ -17468,57 +18191,39 @@
           <a:p>
             <a:pPr algn="ctr"/>
             <a:r>
-              <a:rPr lang="zh-CN" altLang="en-US" b="1" dirty="0">
+              <a:rPr lang="en-US" altLang="zh-CN" b="1" smtClean="0">
                 <a:solidFill>
                   <a:schemeClr val="tx1"/>
                 </a:solidFill>
               </a:rPr>
-              <a:t>多 </a:t>
+              <a:t>Package.bat</a:t>
             </a:r>
-            <a:r>
-              <a:rPr lang="en-US" altLang="zh-CN" b="1" dirty="0">
-                <a:solidFill>
-                  <a:schemeClr val="tx1"/>
-                </a:solidFill>
-              </a:rPr>
-              <a:t>GPU </a:t>
-            </a:r>
-          </a:p>
-          <a:p>
-            <a:pPr algn="ctr"/>
-            <a:r>
-              <a:rPr lang="zh-CN" altLang="en-US" b="1" dirty="0">
-                <a:solidFill>
-                  <a:schemeClr val="tx1"/>
-                </a:solidFill>
-              </a:rPr>
-              <a:t>客户端</a:t>
-            </a:r>
+            <a:endParaRPr lang="zh-CN" altLang="en-US" b="1">
+              <a:solidFill>
+                <a:schemeClr val="tx1"/>
+              </a:solidFill>
+            </a:endParaRPr>
           </a:p>
         </p:txBody>
       </p:sp>
       <p:cxnSp>
         <p:nvCxnSpPr>
-          <p:cNvPr id="30" name="直接箭头连接符 29">
-            <a:extLst>
-              <a:ext uri="{FF2B5EF4-FFF2-40B4-BE49-F238E27FC236}">
-                <a16:creationId xmlns:a16="http://schemas.microsoft.com/office/drawing/2014/main" id="{FAC9668D-D812-05D1-6491-A3864397BA79}"/>
-              </a:ext>
-            </a:extLst>
-          </p:cNvPr>
+          <p:cNvPr id="33" name="肘形连接符 32"/>
           <p:cNvCxnSpPr>
-            <a:stCxn id="50" idx="3"/>
-            <a:endCxn id="24" idx="1"/>
+            <a:stCxn id="62" idx="2"/>
+            <a:endCxn id="17" idx="2"/>
           </p:cNvCxnSpPr>
           <p:nvPr/>
         </p:nvCxnSpPr>
         <p:spPr>
-          <a:xfrm>
-            <a:off x="2663808" y="1819236"/>
-            <a:ext cx="617590" cy="9013"/>
-          </a:xfrm>
-          <a:prstGeom prst="straightConnector1">
-            <a:avLst/>
+          <a:xfrm rot="16200000" flipH="1">
+            <a:off x="1799325" y="2598253"/>
+            <a:ext cx="835359" cy="2251521"/>
+          </a:xfrm>
+          <a:prstGeom prst="bentConnector3">
+            <a:avLst>
+              <a:gd name="adj1" fmla="val 127365"/>
+            </a:avLst>
           </a:prstGeom>
           <a:ln w="19050">
             <a:tailEnd type="triangle"/>
@@ -17541,23 +18246,14 @@
       </p:cxnSp>
       <p:cxnSp>
         <p:nvCxnSpPr>
-          <p:cNvPr id="33" name="直接箭头连接符 32">
-            <a:extLst>
-              <a:ext uri="{FF2B5EF4-FFF2-40B4-BE49-F238E27FC236}">
-                <a16:creationId xmlns:a16="http://schemas.microsoft.com/office/drawing/2014/main" id="{E6C7F557-CFB0-9F0F-3578-FC291CEA4D6B}"/>
-              </a:ext>
-            </a:extLst>
-          </p:cNvPr>
-          <p:cNvCxnSpPr>
-            <a:cxnSpLocks/>
-            <a:stCxn id="25" idx="1"/>
-          </p:cNvCxnSpPr>
+          <p:cNvPr id="6" name="直接箭头连接符 5"/>
+          <p:cNvCxnSpPr/>
           <p:nvPr/>
         </p:nvCxnSpPr>
         <p:spPr>
-          <a:xfrm flipH="1">
-            <a:off x="4445000" y="1351830"/>
-            <a:ext cx="586526" cy="232318"/>
+          <a:xfrm flipV="1">
+            <a:off x="3342745" y="2171655"/>
+            <a:ext cx="2314150" cy="446437"/>
           </a:xfrm>
           <a:prstGeom prst="straightConnector1">
             <a:avLst/>
@@ -17583,206 +18279,17 @@
       </p:cxnSp>
       <p:cxnSp>
         <p:nvCxnSpPr>
-          <p:cNvPr id="36" name="直接箭头连接符 35">
-            <a:extLst>
-              <a:ext uri="{FF2B5EF4-FFF2-40B4-BE49-F238E27FC236}">
-                <a16:creationId xmlns:a16="http://schemas.microsoft.com/office/drawing/2014/main" id="{908B7187-88C2-F710-3789-46C16D7D2848}"/>
-              </a:ext>
-            </a:extLst>
-          </p:cNvPr>
+          <p:cNvPr id="9" name="直接箭头连接符 8"/>
           <p:cNvCxnSpPr>
-            <a:cxnSpLocks/>
-            <a:stCxn id="27" idx="1"/>
+            <a:stCxn id="37" idx="0"/>
+            <a:endCxn id="41" idx="2"/>
           </p:cNvCxnSpPr>
           <p:nvPr/>
         </p:nvCxnSpPr>
         <p:spPr>
-          <a:xfrm flipH="1" flipV="1">
-            <a:off x="4445000" y="2060105"/>
-            <a:ext cx="586526" cy="334379"/>
-          </a:xfrm>
-          <a:prstGeom prst="straightConnector1">
-            <a:avLst/>
-          </a:prstGeom>
-          <a:ln w="19050">
-            <a:tailEnd type="triangle"/>
-          </a:ln>
-        </p:spPr>
-        <p:style>
-          <a:lnRef idx="1">
-            <a:schemeClr val="accent1"/>
-          </a:lnRef>
-          <a:fillRef idx="0">
-            <a:schemeClr val="accent1"/>
-          </a:fillRef>
-          <a:effectRef idx="0">
-            <a:schemeClr val="accent1"/>
-          </a:effectRef>
-          <a:fontRef idx="minor">
-            <a:schemeClr val="tx1"/>
-          </a:fontRef>
-        </p:style>
-      </p:cxnSp>
-      <p:sp>
-        <p:nvSpPr>
-          <p:cNvPr id="43" name="圆角矩形 49">
-            <a:extLst>
-              <a:ext uri="{FF2B5EF4-FFF2-40B4-BE49-F238E27FC236}">
-                <a16:creationId xmlns:a16="http://schemas.microsoft.com/office/drawing/2014/main" id="{54DD6FD4-9EC9-EF72-917F-E15A257AB0B6}"/>
-              </a:ext>
-            </a:extLst>
-          </p:cNvPr>
-          <p:cNvSpPr/>
-          <p:nvPr/>
-        </p:nvSpPr>
-        <p:spPr>
-          <a:xfrm>
-            <a:off x="6589268" y="1068251"/>
-            <a:ext cx="1168845" cy="567159"/>
-          </a:xfrm>
-          <a:prstGeom prst="roundRect">
-            <a:avLst/>
-          </a:prstGeom>
-          <a:solidFill>
-            <a:schemeClr val="bg2">
-              <a:lumMod val="60000"/>
-              <a:lumOff val="40000"/>
-            </a:schemeClr>
-          </a:solidFill>
-        </p:spPr>
-        <p:style>
-          <a:lnRef idx="2">
-            <a:schemeClr val="accent1">
-              <a:shade val="50000"/>
-            </a:schemeClr>
-          </a:lnRef>
-          <a:fillRef idx="1">
-            <a:schemeClr val="accent1"/>
-          </a:fillRef>
-          <a:effectRef idx="0">
-            <a:schemeClr val="accent1"/>
-          </a:effectRef>
-          <a:fontRef idx="minor">
-            <a:schemeClr val="lt1"/>
-          </a:fontRef>
-        </p:style>
-        <p:txBody>
-          <a:bodyPr rtlCol="0" anchor="ctr"/>
-          <a:lstStyle/>
-          <a:p>
-            <a:pPr algn="ctr"/>
-            <a:r>
-              <a:rPr lang="en-US" altLang="zh-CN" b="1" dirty="0">
-                <a:solidFill>
-                  <a:schemeClr val="tx1"/>
-                </a:solidFill>
-              </a:rPr>
-              <a:t>Carla </a:t>
-            </a:r>
-          </a:p>
-          <a:p>
-            <a:pPr algn="ctr"/>
-            <a:r>
-              <a:rPr lang="zh-CN" altLang="en-US" b="1" dirty="0">
-                <a:solidFill>
-                  <a:schemeClr val="tx1"/>
-                </a:solidFill>
-              </a:rPr>
-              <a:t>辅助服务器</a:t>
-            </a:r>
-          </a:p>
-        </p:txBody>
-      </p:sp>
-      <p:sp>
-        <p:nvSpPr>
-          <p:cNvPr id="45" name="圆角矩形 49">
-            <a:extLst>
-              <a:ext uri="{FF2B5EF4-FFF2-40B4-BE49-F238E27FC236}">
-                <a16:creationId xmlns:a16="http://schemas.microsoft.com/office/drawing/2014/main" id="{2AF9A63E-4095-B1A8-7D32-B4986175F268}"/>
-              </a:ext>
-            </a:extLst>
-          </p:cNvPr>
-          <p:cNvSpPr/>
-          <p:nvPr/>
-        </p:nvSpPr>
-        <p:spPr>
-          <a:xfrm>
-            <a:off x="6589268" y="2102815"/>
-            <a:ext cx="1168845" cy="567159"/>
-          </a:xfrm>
-          <a:prstGeom prst="roundRect">
-            <a:avLst/>
-          </a:prstGeom>
-          <a:solidFill>
-            <a:schemeClr val="bg2">
-              <a:lumMod val="60000"/>
-              <a:lumOff val="40000"/>
-            </a:schemeClr>
-          </a:solidFill>
-        </p:spPr>
-        <p:style>
-          <a:lnRef idx="2">
-            <a:schemeClr val="accent1">
-              <a:shade val="50000"/>
-            </a:schemeClr>
-          </a:lnRef>
-          <a:fillRef idx="1">
-            <a:schemeClr val="accent1"/>
-          </a:fillRef>
-          <a:effectRef idx="0">
-            <a:schemeClr val="accent1"/>
-          </a:effectRef>
-          <a:fontRef idx="minor">
-            <a:schemeClr val="lt1"/>
-          </a:fontRef>
-        </p:style>
-        <p:txBody>
-          <a:bodyPr rtlCol="0" anchor="ctr"/>
-          <a:lstStyle/>
-          <a:p>
-            <a:pPr algn="ctr"/>
-            <a:r>
-              <a:rPr lang="en-US" altLang="zh-CN" b="1" dirty="0">
-                <a:solidFill>
-                  <a:schemeClr val="tx1"/>
-                </a:solidFill>
-              </a:rPr>
-              <a:t>Carla </a:t>
-            </a:r>
-          </a:p>
-          <a:p>
-            <a:pPr algn="ctr"/>
-            <a:r>
-              <a:rPr lang="zh-CN" altLang="en-US" b="1" dirty="0">
-                <a:solidFill>
-                  <a:schemeClr val="tx1"/>
-                </a:solidFill>
-              </a:rPr>
-              <a:t>辅助服务器</a:t>
-            </a:r>
-          </a:p>
-        </p:txBody>
-      </p:sp>
-      <p:cxnSp>
-        <p:nvCxnSpPr>
-          <p:cNvPr id="47" name="直接箭头连接符 46">
-            <a:extLst>
-              <a:ext uri="{FF2B5EF4-FFF2-40B4-BE49-F238E27FC236}">
-                <a16:creationId xmlns:a16="http://schemas.microsoft.com/office/drawing/2014/main" id="{B79575A2-919A-D395-0031-2F127DEF7CA9}"/>
-              </a:ext>
-            </a:extLst>
-          </p:cNvPr>
-          <p:cNvCxnSpPr>
-            <a:cxnSpLocks/>
-            <a:stCxn id="43" idx="1"/>
-            <a:endCxn id="25" idx="3"/>
-          </p:cNvCxnSpPr>
-          <p:nvPr/>
-        </p:nvCxnSpPr>
-        <p:spPr>
-          <a:xfrm flipH="1" flipV="1">
-            <a:off x="6163562" y="1351830"/>
-            <a:ext cx="425706" cy="1"/>
+          <a:xfrm flipV="1">
+            <a:off x="5503293" y="2156226"/>
+            <a:ext cx="153602" cy="461866"/>
           </a:xfrm>
           <a:prstGeom prst="straightConnector1">
             <a:avLst/>
@@ -17808,211 +18315,17 @@
       </p:cxnSp>
       <p:cxnSp>
         <p:nvCxnSpPr>
-          <p:cNvPr id="49" name="直接箭头连接符 48">
-            <a:extLst>
-              <a:ext uri="{FF2B5EF4-FFF2-40B4-BE49-F238E27FC236}">
-                <a16:creationId xmlns:a16="http://schemas.microsoft.com/office/drawing/2014/main" id="{33090BFD-C09A-84A8-B1E4-B55E6258D34C}"/>
-              </a:ext>
-            </a:extLst>
-          </p:cNvPr>
+          <p:cNvPr id="12" name="直接箭头连接符 11"/>
           <p:cNvCxnSpPr>
-            <a:cxnSpLocks/>
-            <a:stCxn id="45" idx="1"/>
-            <a:endCxn id="27" idx="3"/>
+            <a:stCxn id="30" idx="0"/>
+            <a:endCxn id="47" idx="2"/>
           </p:cNvCxnSpPr>
           <p:nvPr/>
         </p:nvCxnSpPr>
         <p:spPr>
-          <a:xfrm flipH="1">
-            <a:off x="6163562" y="2386395"/>
-            <a:ext cx="425706" cy="8089"/>
-          </a:xfrm>
-          <a:prstGeom prst="straightConnector1">
-            <a:avLst/>
-          </a:prstGeom>
-          <a:ln w="19050">
-            <a:tailEnd type="triangle"/>
-          </a:ln>
-        </p:spPr>
-        <p:style>
-          <a:lnRef idx="1">
-            <a:schemeClr val="accent1"/>
-          </a:lnRef>
-          <a:fillRef idx="0">
-            <a:schemeClr val="accent1"/>
-          </a:fillRef>
-          <a:effectRef idx="0">
-            <a:schemeClr val="accent1"/>
-          </a:effectRef>
-          <a:fontRef idx="minor">
-            <a:schemeClr val="tx1"/>
-          </a:fontRef>
-        </p:style>
-      </p:cxnSp>
-      <p:sp>
-        <p:nvSpPr>
-          <p:cNvPr id="52" name="圆角矩形 59">
-            <a:extLst>
-              <a:ext uri="{FF2B5EF4-FFF2-40B4-BE49-F238E27FC236}">
-                <a16:creationId xmlns:a16="http://schemas.microsoft.com/office/drawing/2014/main" id="{C7FA86F8-ACCF-493B-9601-7FDEBB6A6BBE}"/>
-              </a:ext>
-            </a:extLst>
-          </p:cNvPr>
-          <p:cNvSpPr/>
-          <p:nvPr/>
-        </p:nvSpPr>
-        <p:spPr>
-          <a:xfrm>
-            <a:off x="6717731" y="140391"/>
-            <a:ext cx="902269" cy="567158"/>
-          </a:xfrm>
-          <a:prstGeom prst="roundRect">
-            <a:avLst/>
-          </a:prstGeom>
-          <a:solidFill>
-            <a:schemeClr val="bg1"/>
-          </a:solidFill>
-        </p:spPr>
-        <p:style>
-          <a:lnRef idx="2">
-            <a:schemeClr val="accent1">
-              <a:shade val="50000"/>
-            </a:schemeClr>
-          </a:lnRef>
-          <a:fillRef idx="1">
-            <a:schemeClr val="accent1"/>
-          </a:fillRef>
-          <a:effectRef idx="0">
-            <a:schemeClr val="accent1"/>
-          </a:effectRef>
-          <a:fontRef idx="minor">
-            <a:schemeClr val="lt1"/>
-          </a:fontRef>
-        </p:style>
-        <p:txBody>
-          <a:bodyPr rtlCol="0" anchor="ctr"/>
-          <a:lstStyle/>
-          <a:p>
-            <a:pPr algn="ctr"/>
-            <a:r>
-              <a:rPr lang="zh-CN" altLang="en-US" b="1" dirty="0">
-                <a:solidFill>
-                  <a:schemeClr val="tx1"/>
-                </a:solidFill>
-              </a:rPr>
-              <a:t>流</a:t>
-            </a:r>
-            <a:endParaRPr lang="en-US" altLang="zh-CN" b="1" dirty="0">
-              <a:solidFill>
-                <a:schemeClr val="tx1"/>
-              </a:solidFill>
-            </a:endParaRPr>
-          </a:p>
-          <a:p>
-            <a:pPr algn="ctr"/>
-            <a:r>
-              <a:rPr lang="zh-CN" altLang="en-US" b="1" dirty="0">
-                <a:solidFill>
-                  <a:schemeClr val="tx1"/>
-                </a:solidFill>
-              </a:rPr>
-              <a:t>服务器</a:t>
-            </a:r>
-          </a:p>
-        </p:txBody>
-      </p:sp>
-      <p:sp>
-        <p:nvSpPr>
-          <p:cNvPr id="55" name="圆角矩形 59">
-            <a:extLst>
-              <a:ext uri="{FF2B5EF4-FFF2-40B4-BE49-F238E27FC236}">
-                <a16:creationId xmlns:a16="http://schemas.microsoft.com/office/drawing/2014/main" id="{77041457-51AB-3C82-CB93-CF8ACAE64B3A}"/>
-              </a:ext>
-            </a:extLst>
-          </p:cNvPr>
-          <p:cNvSpPr/>
-          <p:nvPr/>
-        </p:nvSpPr>
-        <p:spPr>
-          <a:xfrm>
-            <a:off x="6717731" y="3047602"/>
-            <a:ext cx="949894" cy="567158"/>
-          </a:xfrm>
-          <a:prstGeom prst="roundRect">
-            <a:avLst/>
-          </a:prstGeom>
-          <a:solidFill>
-            <a:schemeClr val="bg1"/>
-          </a:solidFill>
-        </p:spPr>
-        <p:style>
-          <a:lnRef idx="2">
-            <a:schemeClr val="accent1">
-              <a:shade val="50000"/>
-            </a:schemeClr>
-          </a:lnRef>
-          <a:fillRef idx="1">
-            <a:schemeClr val="accent1"/>
-          </a:fillRef>
-          <a:effectRef idx="0">
-            <a:schemeClr val="accent1"/>
-          </a:effectRef>
-          <a:fontRef idx="minor">
-            <a:schemeClr val="lt1"/>
-          </a:fontRef>
-        </p:style>
-        <p:txBody>
-          <a:bodyPr rtlCol="0" anchor="ctr"/>
-          <a:lstStyle/>
-          <a:p>
-            <a:pPr algn="ctr"/>
-            <a:r>
-              <a:rPr lang="zh-CN" altLang="en-US" b="1" dirty="0">
-                <a:solidFill>
-                  <a:schemeClr val="tx1"/>
-                </a:solidFill>
-              </a:rPr>
-              <a:t>流</a:t>
-            </a:r>
-            <a:endParaRPr lang="en-US" altLang="zh-CN" b="1" dirty="0">
-              <a:solidFill>
-                <a:schemeClr val="tx1"/>
-              </a:solidFill>
-            </a:endParaRPr>
-          </a:p>
-          <a:p>
-            <a:pPr algn="ctr"/>
-            <a:r>
-              <a:rPr lang="zh-CN" altLang="en-US" b="1" dirty="0">
-                <a:solidFill>
-                  <a:schemeClr val="tx1"/>
-                </a:solidFill>
-              </a:rPr>
-              <a:t>服务器</a:t>
-            </a:r>
-          </a:p>
-        </p:txBody>
-      </p:sp>
-      <p:cxnSp>
-        <p:nvCxnSpPr>
-          <p:cNvPr id="59" name="直接箭头连接符 58">
-            <a:extLst>
-              <a:ext uri="{FF2B5EF4-FFF2-40B4-BE49-F238E27FC236}">
-                <a16:creationId xmlns:a16="http://schemas.microsoft.com/office/drawing/2014/main" id="{22A60533-DE06-5B1D-51CB-5318F2733053}"/>
-              </a:ext>
-            </a:extLst>
-          </p:cNvPr>
-          <p:cNvCxnSpPr>
-            <a:cxnSpLocks/>
-            <a:stCxn id="43" idx="0"/>
-            <a:endCxn id="52" idx="2"/>
-          </p:cNvCxnSpPr>
-          <p:nvPr/>
-        </p:nvCxnSpPr>
-        <p:spPr>
-          <a:xfrm flipH="1" flipV="1">
-            <a:off x="7168866" y="707549"/>
-            <a:ext cx="4825" cy="360702"/>
+          <a:xfrm flipV="1">
+            <a:off x="3465148" y="1555420"/>
+            <a:ext cx="1177358" cy="261805"/>
           </a:xfrm>
           <a:prstGeom prst="straightConnector1">
             <a:avLst/>
@@ -18038,522 +18351,23 @@
       </p:cxnSp>
       <p:cxnSp>
         <p:nvCxnSpPr>
-          <p:cNvPr id="65" name="直接箭头连接符 64">
-            <a:extLst>
-              <a:ext uri="{FF2B5EF4-FFF2-40B4-BE49-F238E27FC236}">
-                <a16:creationId xmlns:a16="http://schemas.microsoft.com/office/drawing/2014/main" id="{3A44C18E-A907-0841-2D45-5A2BE99BC773}"/>
-              </a:ext>
-            </a:extLst>
-          </p:cNvPr>
+          <p:cNvPr id="14" name="直接箭头连接符 13"/>
           <p:cNvCxnSpPr>
-            <a:cxnSpLocks/>
-            <a:stCxn id="45" idx="2"/>
-            <a:endCxn id="55" idx="0"/>
+            <a:stCxn id="41" idx="0"/>
+            <a:endCxn id="47" idx="2"/>
           </p:cNvCxnSpPr>
           <p:nvPr/>
         </p:nvCxnSpPr>
         <p:spPr>
-          <a:xfrm>
-            <a:off x="7173691" y="2669974"/>
-            <a:ext cx="18987" cy="377628"/>
+          <a:xfrm flipH="1" flipV="1">
+            <a:off x="4642506" y="1555420"/>
+            <a:ext cx="1014389" cy="246375"/>
           </a:xfrm>
           <a:prstGeom prst="straightConnector1">
             <a:avLst/>
           </a:prstGeom>
           <a:ln w="19050">
             <a:tailEnd type="triangle"/>
-          </a:ln>
-        </p:spPr>
-        <p:style>
-          <a:lnRef idx="1">
-            <a:schemeClr val="accent1"/>
-          </a:lnRef>
-          <a:fillRef idx="0">
-            <a:schemeClr val="accent1"/>
-          </a:fillRef>
-          <a:effectRef idx="0">
-            <a:schemeClr val="accent1"/>
-          </a:effectRef>
-          <a:fontRef idx="minor">
-            <a:schemeClr val="tx1"/>
-          </a:fontRef>
-        </p:style>
-      </p:cxnSp>
-      <p:sp>
-        <p:nvSpPr>
-          <p:cNvPr id="67" name="平行四边形 66">
-            <a:extLst>
-              <a:ext uri="{FF2B5EF4-FFF2-40B4-BE49-F238E27FC236}">
-                <a16:creationId xmlns:a16="http://schemas.microsoft.com/office/drawing/2014/main" id="{32327F82-9444-A20B-A795-1A755FD0899E}"/>
-              </a:ext>
-            </a:extLst>
-          </p:cNvPr>
-          <p:cNvSpPr/>
-          <p:nvPr/>
-        </p:nvSpPr>
-        <p:spPr>
-          <a:xfrm>
-            <a:off x="39518" y="1584609"/>
-            <a:ext cx="896610" cy="475496"/>
-          </a:xfrm>
-          <a:prstGeom prst="parallelogram">
-            <a:avLst/>
-          </a:prstGeom>
-          <a:solidFill>
-            <a:schemeClr val="bg1"/>
-          </a:solidFill>
-          <a:ln>
-            <a:solidFill>
-              <a:schemeClr val="bg1">
-                <a:lumMod val="50000"/>
-              </a:schemeClr>
-            </a:solidFill>
-          </a:ln>
-        </p:spPr>
-        <p:style>
-          <a:lnRef idx="2">
-            <a:schemeClr val="accent1">
-              <a:shade val="15000"/>
-            </a:schemeClr>
-          </a:lnRef>
-          <a:fillRef idx="1">
-            <a:schemeClr val="accent1"/>
-          </a:fillRef>
-          <a:effectRef idx="0">
-            <a:schemeClr val="accent1"/>
-          </a:effectRef>
-          <a:fontRef idx="minor">
-            <a:schemeClr val="lt1"/>
-          </a:fontRef>
-        </p:style>
-        <p:txBody>
-          <a:bodyPr rtlCol="0" anchor="ctr"/>
-          <a:lstStyle/>
-          <a:p>
-            <a:pPr algn="ctr"/>
-            <a:r>
-              <a:rPr lang="zh-CN" altLang="en-US" b="1" dirty="0">
-                <a:solidFill>
-                  <a:schemeClr val="bg1">
-                    <a:lumMod val="50000"/>
-                  </a:schemeClr>
-                </a:solidFill>
-              </a:rPr>
-              <a:t>无</a:t>
-            </a:r>
-            <a:r>
-              <a:rPr lang="en-US" altLang="zh-CN" b="1" dirty="0">
-                <a:solidFill>
-                  <a:schemeClr val="bg1">
-                    <a:lumMod val="50000"/>
-                  </a:schemeClr>
-                </a:solidFill>
-              </a:rPr>
-              <a:t>GPU</a:t>
-            </a:r>
-            <a:endParaRPr lang="zh-CN" altLang="en-US" b="1" dirty="0">
-              <a:solidFill>
-                <a:schemeClr val="bg1">
-                  <a:lumMod val="50000"/>
-                </a:schemeClr>
-              </a:solidFill>
-            </a:endParaRPr>
-          </a:p>
-        </p:txBody>
-      </p:sp>
-      <p:sp>
-        <p:nvSpPr>
-          <p:cNvPr id="71" name="平行四边形 70">
-            <a:extLst>
-              <a:ext uri="{FF2B5EF4-FFF2-40B4-BE49-F238E27FC236}">
-                <a16:creationId xmlns:a16="http://schemas.microsoft.com/office/drawing/2014/main" id="{8CEE5094-F810-0007-4C50-E8BAB6C6AB34}"/>
-              </a:ext>
-            </a:extLst>
-          </p:cNvPr>
-          <p:cNvSpPr/>
-          <p:nvPr/>
-        </p:nvSpPr>
-        <p:spPr>
-          <a:xfrm>
-            <a:off x="8292165" y="2150174"/>
-            <a:ext cx="806251" cy="475496"/>
-          </a:xfrm>
-          <a:prstGeom prst="parallelogram">
-            <a:avLst/>
-          </a:prstGeom>
-          <a:solidFill>
-            <a:schemeClr val="bg1"/>
-          </a:solidFill>
-          <a:ln>
-            <a:solidFill>
-              <a:schemeClr val="bg1">
-                <a:lumMod val="50000"/>
-              </a:schemeClr>
-            </a:solidFill>
-          </a:ln>
-        </p:spPr>
-        <p:style>
-          <a:lnRef idx="2">
-            <a:schemeClr val="accent1">
-              <a:shade val="15000"/>
-            </a:schemeClr>
-          </a:lnRef>
-          <a:fillRef idx="1">
-            <a:schemeClr val="accent1"/>
-          </a:fillRef>
-          <a:effectRef idx="0">
-            <a:schemeClr val="accent1"/>
-          </a:effectRef>
-          <a:fontRef idx="minor">
-            <a:schemeClr val="lt1"/>
-          </a:fontRef>
-        </p:style>
-        <p:txBody>
-          <a:bodyPr rtlCol="0" anchor="ctr"/>
-          <a:lstStyle/>
-          <a:p>
-            <a:pPr algn="ctr"/>
-            <a:r>
-              <a:rPr lang="zh-CN" altLang="en-US" b="1" dirty="0">
-                <a:solidFill>
-                  <a:schemeClr val="bg1">
-                    <a:lumMod val="50000"/>
-                  </a:schemeClr>
-                </a:solidFill>
-              </a:rPr>
-              <a:t>无</a:t>
-            </a:r>
-            <a:r>
-              <a:rPr lang="en-US" altLang="zh-CN" b="1" dirty="0">
-                <a:solidFill>
-                  <a:schemeClr val="bg1">
-                    <a:lumMod val="50000"/>
-                  </a:schemeClr>
-                </a:solidFill>
-              </a:rPr>
-              <a:t>GPU</a:t>
-            </a:r>
-            <a:endParaRPr lang="zh-CN" altLang="en-US" b="1" dirty="0">
-              <a:solidFill>
-                <a:schemeClr val="bg1">
-                  <a:lumMod val="50000"/>
-                </a:schemeClr>
-              </a:solidFill>
-            </a:endParaRPr>
-          </a:p>
-        </p:txBody>
-      </p:sp>
-      <p:sp>
-        <p:nvSpPr>
-          <p:cNvPr id="74" name="平行四边形 73">
-            <a:extLst>
-              <a:ext uri="{FF2B5EF4-FFF2-40B4-BE49-F238E27FC236}">
-                <a16:creationId xmlns:a16="http://schemas.microsoft.com/office/drawing/2014/main" id="{D17426C8-3F6A-4D34-AF0A-05CBCDD42F5F}"/>
-              </a:ext>
-            </a:extLst>
-          </p:cNvPr>
-          <p:cNvSpPr/>
-          <p:nvPr/>
-        </p:nvSpPr>
-        <p:spPr>
-          <a:xfrm>
-            <a:off x="8232482" y="1113415"/>
-            <a:ext cx="844223" cy="475496"/>
-          </a:xfrm>
-          <a:prstGeom prst="parallelogram">
-            <a:avLst/>
-          </a:prstGeom>
-          <a:solidFill>
-            <a:schemeClr val="bg1"/>
-          </a:solidFill>
-          <a:ln>
-            <a:solidFill>
-              <a:schemeClr val="bg1">
-                <a:lumMod val="50000"/>
-              </a:schemeClr>
-            </a:solidFill>
-          </a:ln>
-        </p:spPr>
-        <p:style>
-          <a:lnRef idx="2">
-            <a:schemeClr val="accent1">
-              <a:shade val="15000"/>
-            </a:schemeClr>
-          </a:lnRef>
-          <a:fillRef idx="1">
-            <a:schemeClr val="accent1"/>
-          </a:fillRef>
-          <a:effectRef idx="0">
-            <a:schemeClr val="accent1"/>
-          </a:effectRef>
-          <a:fontRef idx="minor">
-            <a:schemeClr val="lt1"/>
-          </a:fontRef>
-        </p:style>
-        <p:txBody>
-          <a:bodyPr rtlCol="0" anchor="ctr"/>
-          <a:lstStyle/>
-          <a:p>
-            <a:pPr algn="ctr"/>
-            <a:r>
-              <a:rPr lang="zh-CN" altLang="en-US" b="1" dirty="0">
-                <a:solidFill>
-                  <a:schemeClr val="bg1">
-                    <a:lumMod val="50000"/>
-                  </a:schemeClr>
-                </a:solidFill>
-              </a:rPr>
-              <a:t>无</a:t>
-            </a:r>
-            <a:r>
-              <a:rPr lang="en-US" altLang="zh-CN" b="1" dirty="0">
-                <a:solidFill>
-                  <a:schemeClr val="bg1">
-                    <a:lumMod val="50000"/>
-                  </a:schemeClr>
-                </a:solidFill>
-              </a:rPr>
-              <a:t>GPU</a:t>
-            </a:r>
-            <a:endParaRPr lang="zh-CN" altLang="en-US" b="1" dirty="0">
-              <a:solidFill>
-                <a:schemeClr val="bg1">
-                  <a:lumMod val="50000"/>
-                </a:schemeClr>
-              </a:solidFill>
-            </a:endParaRPr>
-          </a:p>
-        </p:txBody>
-      </p:sp>
-      <p:cxnSp>
-        <p:nvCxnSpPr>
-          <p:cNvPr id="91" name="连接符: 肘形 90">
-            <a:extLst>
-              <a:ext uri="{FF2B5EF4-FFF2-40B4-BE49-F238E27FC236}">
-                <a16:creationId xmlns:a16="http://schemas.microsoft.com/office/drawing/2014/main" id="{177B08B0-1DB6-1C95-0955-53881A4CB73A}"/>
-              </a:ext>
-            </a:extLst>
-          </p:cNvPr>
-          <p:cNvCxnSpPr>
-            <a:stCxn id="52" idx="3"/>
-            <a:endCxn id="16" idx="3"/>
-          </p:cNvCxnSpPr>
-          <p:nvPr/>
-        </p:nvCxnSpPr>
-        <p:spPr>
-          <a:xfrm flipH="1">
-            <a:off x="3519930" y="423970"/>
-            <a:ext cx="4100070" cy="3407814"/>
-          </a:xfrm>
-          <a:prstGeom prst="bentConnector3">
-            <a:avLst>
-              <a:gd name="adj1" fmla="val -8480"/>
-            </a:avLst>
-          </a:prstGeom>
-          <a:ln w="19050">
-            <a:solidFill>
-              <a:schemeClr val="bg1">
-                <a:lumMod val="50000"/>
-              </a:schemeClr>
-            </a:solidFill>
-            <a:prstDash val="sysDash"/>
-            <a:tailEnd type="triangle"/>
-          </a:ln>
-        </p:spPr>
-        <p:style>
-          <a:lnRef idx="1">
-            <a:schemeClr val="accent1"/>
-          </a:lnRef>
-          <a:fillRef idx="0">
-            <a:schemeClr val="accent1"/>
-          </a:fillRef>
-          <a:effectRef idx="0">
-            <a:schemeClr val="accent1"/>
-          </a:effectRef>
-          <a:fontRef idx="minor">
-            <a:schemeClr val="tx1"/>
-          </a:fontRef>
-        </p:style>
-      </p:cxnSp>
-      <p:cxnSp>
-        <p:nvCxnSpPr>
-          <p:cNvPr id="94" name="连接符: 肘形 93">
-            <a:extLst>
-              <a:ext uri="{FF2B5EF4-FFF2-40B4-BE49-F238E27FC236}">
-                <a16:creationId xmlns:a16="http://schemas.microsoft.com/office/drawing/2014/main" id="{36B26831-178D-A9D9-7834-FCE0271D49C7}"/>
-              </a:ext>
-            </a:extLst>
-          </p:cNvPr>
-          <p:cNvCxnSpPr>
-            <a:stCxn id="55" idx="2"/>
-            <a:endCxn id="15" idx="2"/>
-          </p:cNvCxnSpPr>
-          <p:nvPr/>
-        </p:nvCxnSpPr>
-        <p:spPr>
-          <a:xfrm rot="5400000">
-            <a:off x="3913357" y="769485"/>
-            <a:ext cx="434047" cy="6124596"/>
-          </a:xfrm>
-          <a:prstGeom prst="bentConnector3">
-            <a:avLst>
-              <a:gd name="adj1" fmla="val 152667"/>
-            </a:avLst>
-          </a:prstGeom>
-          <a:ln w="19050">
-            <a:solidFill>
-              <a:schemeClr val="bg1">
-                <a:lumMod val="50000"/>
-              </a:schemeClr>
-            </a:solidFill>
-            <a:prstDash val="sysDash"/>
-            <a:tailEnd type="triangle"/>
-          </a:ln>
-        </p:spPr>
-        <p:style>
-          <a:lnRef idx="1">
-            <a:schemeClr val="accent1"/>
-          </a:lnRef>
-          <a:fillRef idx="0">
-            <a:schemeClr val="accent1"/>
-          </a:fillRef>
-          <a:effectRef idx="0">
-            <a:schemeClr val="accent1"/>
-          </a:effectRef>
-          <a:fontRef idx="minor">
-            <a:schemeClr val="tx1"/>
-          </a:fontRef>
-        </p:style>
-      </p:cxnSp>
-      <p:cxnSp>
-        <p:nvCxnSpPr>
-          <p:cNvPr id="98" name="直接连接符 97">
-            <a:extLst>
-              <a:ext uri="{FF2B5EF4-FFF2-40B4-BE49-F238E27FC236}">
-                <a16:creationId xmlns:a16="http://schemas.microsoft.com/office/drawing/2014/main" id="{1088C590-5975-EAF9-5112-2D0145D40965}"/>
-              </a:ext>
-            </a:extLst>
-          </p:cNvPr>
-          <p:cNvCxnSpPr>
-            <a:stCxn id="67" idx="2"/>
-            <a:endCxn id="50" idx="1"/>
-          </p:cNvCxnSpPr>
-          <p:nvPr/>
-        </p:nvCxnSpPr>
-        <p:spPr>
-          <a:xfrm flipV="1">
-            <a:off x="876691" y="1819236"/>
-            <a:ext cx="398155" cy="3121"/>
-          </a:xfrm>
-          <a:prstGeom prst="line">
-            <a:avLst/>
-          </a:prstGeom>
-          <a:ln w="19050">
-            <a:solidFill>
-              <a:schemeClr val="bg1">
-                <a:lumMod val="50000"/>
-              </a:schemeClr>
-            </a:solidFill>
-            <a:prstDash val="sysDash"/>
-            <a:tailEnd type="none"/>
-          </a:ln>
-        </p:spPr>
-        <p:style>
-          <a:lnRef idx="1">
-            <a:schemeClr val="accent1"/>
-          </a:lnRef>
-          <a:fillRef idx="0">
-            <a:schemeClr val="accent1"/>
-          </a:fillRef>
-          <a:effectRef idx="0">
-            <a:schemeClr val="accent1"/>
-          </a:effectRef>
-          <a:fontRef idx="minor">
-            <a:schemeClr val="tx1"/>
-          </a:fontRef>
-        </p:style>
-      </p:cxnSp>
-      <p:cxnSp>
-        <p:nvCxnSpPr>
-          <p:cNvPr id="99" name="直接连接符 98">
-            <a:extLst>
-              <a:ext uri="{FF2B5EF4-FFF2-40B4-BE49-F238E27FC236}">
-                <a16:creationId xmlns:a16="http://schemas.microsoft.com/office/drawing/2014/main" id="{788B5B0D-8905-A20C-5931-43675C4BBB9B}"/>
-              </a:ext>
-            </a:extLst>
-          </p:cNvPr>
-          <p:cNvCxnSpPr>
-            <a:cxnSpLocks/>
-            <a:stCxn id="43" idx="3"/>
-            <a:endCxn id="74" idx="5"/>
-          </p:cNvCxnSpPr>
-          <p:nvPr/>
-        </p:nvCxnSpPr>
-        <p:spPr>
-          <a:xfrm flipV="1">
-            <a:off x="7758113" y="1351163"/>
-            <a:ext cx="533806" cy="668"/>
-          </a:xfrm>
-          <a:prstGeom prst="line">
-            <a:avLst/>
-          </a:prstGeom>
-          <a:ln w="19050">
-            <a:solidFill>
-              <a:schemeClr val="bg1">
-                <a:lumMod val="50000"/>
-              </a:schemeClr>
-            </a:solidFill>
-            <a:prstDash val="sysDash"/>
-            <a:tailEnd type="none"/>
-          </a:ln>
-        </p:spPr>
-        <p:style>
-          <a:lnRef idx="1">
-            <a:schemeClr val="accent1"/>
-          </a:lnRef>
-          <a:fillRef idx="0">
-            <a:schemeClr val="accent1"/>
-          </a:fillRef>
-          <a:effectRef idx="0">
-            <a:schemeClr val="accent1"/>
-          </a:effectRef>
-          <a:fontRef idx="minor">
-            <a:schemeClr val="tx1"/>
-          </a:fontRef>
-        </p:style>
-      </p:cxnSp>
-      <p:cxnSp>
-        <p:nvCxnSpPr>
-          <p:cNvPr id="102" name="直接连接符 101">
-            <a:extLst>
-              <a:ext uri="{FF2B5EF4-FFF2-40B4-BE49-F238E27FC236}">
-                <a16:creationId xmlns:a16="http://schemas.microsoft.com/office/drawing/2014/main" id="{3CD55DDA-1F41-831E-FE34-CC885F32FB9D}"/>
-              </a:ext>
-            </a:extLst>
-          </p:cNvPr>
-          <p:cNvCxnSpPr>
-            <a:cxnSpLocks/>
-            <a:stCxn id="45" idx="3"/>
-            <a:endCxn id="71" idx="5"/>
-          </p:cNvCxnSpPr>
-          <p:nvPr/>
-        </p:nvCxnSpPr>
-        <p:spPr>
-          <a:xfrm>
-            <a:off x="7758113" y="2386395"/>
-            <a:ext cx="593489" cy="1527"/>
-          </a:xfrm>
-          <a:prstGeom prst="line">
-            <a:avLst/>
-          </a:prstGeom>
-          <a:ln w="19050">
-            <a:solidFill>
-              <a:schemeClr val="bg1">
-                <a:lumMod val="50000"/>
-              </a:schemeClr>
-            </a:solidFill>
-            <a:prstDash val="sysDash"/>
-            <a:tailEnd type="none"/>
           </a:ln>
         </p:spPr>
         <p:style>
@@ -18574,7 +18388,7 @@
     </p:spTree>
     <p:extLst>
       <p:ext uri="{BB962C8B-B14F-4D97-AF65-F5344CB8AC3E}">
-        <p14:creationId xmlns:p14="http://schemas.microsoft.com/office/powerpoint/2010/main" val="1182252067"/>
+        <p14:creationId xmlns:p14="http://schemas.microsoft.com/office/powerpoint/2010/main" val="167398418"/>
       </p:ext>
     </p:extLst>
   </p:cSld>
@@ -18610,6 +18424,1737 @@
       </p:grpSpPr>
       <p:sp>
         <p:nvSpPr>
+          <p:cNvPr id="50" name="圆角矩形 49"/>
+          <p:cNvSpPr/>
+          <p:nvPr/>
+        </p:nvSpPr>
+        <p:spPr>
+          <a:xfrm>
+            <a:off x="1274846" y="1535656"/>
+            <a:ext cx="1388962" cy="567159"/>
+          </a:xfrm>
+          <a:prstGeom prst="roundRect">
+            <a:avLst/>
+          </a:prstGeom>
+          <a:solidFill>
+            <a:schemeClr val="bg2">
+              <a:lumMod val="60000"/>
+              <a:lumOff val="40000"/>
+            </a:schemeClr>
+          </a:solidFill>
+        </p:spPr>
+        <p:style>
+          <a:lnRef idx="2">
+            <a:schemeClr val="accent1">
+              <a:shade val="50000"/>
+            </a:schemeClr>
+          </a:lnRef>
+          <a:fillRef idx="1">
+            <a:schemeClr val="accent1"/>
+          </a:fillRef>
+          <a:effectRef idx="0">
+            <a:schemeClr val="accent1"/>
+          </a:effectRef>
+          <a:fontRef idx="minor">
+            <a:schemeClr val="lt1"/>
+          </a:fontRef>
+        </p:style>
+        <p:txBody>
+          <a:bodyPr rtlCol="0" anchor="ctr"/>
+          <a:lstStyle/>
+          <a:p>
+            <a:pPr algn="ctr"/>
+            <a:r>
+              <a:rPr lang="en-US" altLang="zh-CN" b="1" dirty="0">
+                <a:solidFill>
+                  <a:schemeClr val="tx1"/>
+                </a:solidFill>
+              </a:rPr>
+              <a:t>Carla </a:t>
+            </a:r>
+          </a:p>
+          <a:p>
+            <a:pPr algn="ctr"/>
+            <a:r>
+              <a:rPr lang="zh-CN" altLang="en-US" b="1" dirty="0">
+                <a:solidFill>
+                  <a:schemeClr val="tx1"/>
+                </a:solidFill>
+              </a:rPr>
+              <a:t>主服务器</a:t>
+            </a:r>
+          </a:p>
+        </p:txBody>
+      </p:sp>
+      <p:sp>
+        <p:nvSpPr>
+          <p:cNvPr id="54" name="圆角矩形 53"/>
+          <p:cNvSpPr/>
+          <p:nvPr/>
+        </p:nvSpPr>
+        <p:spPr>
+          <a:xfrm>
+            <a:off x="1449718" y="2490570"/>
+            <a:ext cx="1048492" cy="434047"/>
+          </a:xfrm>
+          <a:prstGeom prst="roundRect">
+            <a:avLst/>
+          </a:prstGeom>
+          <a:solidFill>
+            <a:schemeClr val="accent5">
+              <a:lumMod val="60000"/>
+              <a:lumOff val="40000"/>
+            </a:schemeClr>
+          </a:solidFill>
+        </p:spPr>
+        <p:style>
+          <a:lnRef idx="2">
+            <a:schemeClr val="accent1">
+              <a:shade val="50000"/>
+            </a:schemeClr>
+          </a:lnRef>
+          <a:fillRef idx="1">
+            <a:schemeClr val="accent1"/>
+          </a:fillRef>
+          <a:effectRef idx="0">
+            <a:schemeClr val="accent1"/>
+          </a:effectRef>
+          <a:fontRef idx="minor">
+            <a:schemeClr val="lt1"/>
+          </a:fontRef>
+        </p:style>
+        <p:txBody>
+          <a:bodyPr rtlCol="0" anchor="ctr"/>
+          <a:lstStyle/>
+          <a:p>
+            <a:pPr algn="ctr"/>
+            <a:r>
+              <a:rPr lang="zh-CN" altLang="en-US" b="1" dirty="0">
+                <a:solidFill>
+                  <a:schemeClr val="tx1"/>
+                </a:solidFill>
+              </a:rPr>
+              <a:t>客户端 </a:t>
+            </a:r>
+            <a:r>
+              <a:rPr lang="en-US" altLang="zh-CN" b="1" dirty="0">
+                <a:solidFill>
+                  <a:schemeClr val="tx1"/>
+                </a:solidFill>
+              </a:rPr>
+              <a:t>1</a:t>
+            </a:r>
+            <a:endParaRPr lang="zh-CN" altLang="en-US" b="1" dirty="0">
+              <a:solidFill>
+                <a:schemeClr val="tx1"/>
+              </a:solidFill>
+            </a:endParaRPr>
+          </a:p>
+        </p:txBody>
+      </p:sp>
+      <p:cxnSp>
+        <p:nvCxnSpPr>
+          <p:cNvPr id="4" name="直接箭头连接符 3">
+            <a:extLst>
+              <a:ext uri="{FF2B5EF4-FFF2-40B4-BE49-F238E27FC236}">
+                <a16:creationId xmlns:a16="http://schemas.microsoft.com/office/drawing/2014/main" id="{1DDE7D57-06CB-1739-D94B-0F246FD36E71}"/>
+              </a:ext>
+            </a:extLst>
+          </p:cNvPr>
+          <p:cNvCxnSpPr>
+            <a:cxnSpLocks/>
+            <a:stCxn id="50" idx="2"/>
+            <a:endCxn id="54" idx="0"/>
+          </p:cNvCxnSpPr>
+          <p:nvPr/>
+        </p:nvCxnSpPr>
+        <p:spPr>
+          <a:xfrm>
+            <a:off x="1969327" y="2102815"/>
+            <a:ext cx="4637" cy="387755"/>
+          </a:xfrm>
+          <a:prstGeom prst="straightConnector1">
+            <a:avLst/>
+          </a:prstGeom>
+          <a:ln w="19050">
+            <a:tailEnd type="triangle"/>
+          </a:ln>
+        </p:spPr>
+        <p:style>
+          <a:lnRef idx="1">
+            <a:schemeClr val="accent1"/>
+          </a:lnRef>
+          <a:fillRef idx="0">
+            <a:schemeClr val="accent1"/>
+          </a:fillRef>
+          <a:effectRef idx="0">
+            <a:schemeClr val="accent1"/>
+          </a:effectRef>
+          <a:fontRef idx="minor">
+            <a:schemeClr val="tx1"/>
+          </a:fontRef>
+        </p:style>
+      </p:cxnSp>
+      <p:sp>
+        <p:nvSpPr>
+          <p:cNvPr id="15" name="圆角矩形 59">
+            <a:extLst>
+              <a:ext uri="{FF2B5EF4-FFF2-40B4-BE49-F238E27FC236}">
+                <a16:creationId xmlns:a16="http://schemas.microsoft.com/office/drawing/2014/main" id="{9BD324B6-B80D-605B-22DF-7789E01BA5F7}"/>
+              </a:ext>
+            </a:extLst>
+          </p:cNvPr>
+          <p:cNvSpPr/>
+          <p:nvPr/>
+        </p:nvSpPr>
+        <p:spPr>
+          <a:xfrm>
+            <a:off x="424323" y="3614760"/>
+            <a:ext cx="1287518" cy="434047"/>
+          </a:xfrm>
+          <a:prstGeom prst="roundRect">
+            <a:avLst/>
+          </a:prstGeom>
+          <a:solidFill>
+            <a:schemeClr val="bg1"/>
+          </a:solidFill>
+        </p:spPr>
+        <p:style>
+          <a:lnRef idx="2">
+            <a:schemeClr val="accent1">
+              <a:shade val="50000"/>
+            </a:schemeClr>
+          </a:lnRef>
+          <a:fillRef idx="1">
+            <a:schemeClr val="accent1"/>
+          </a:fillRef>
+          <a:effectRef idx="0">
+            <a:schemeClr val="accent1"/>
+          </a:effectRef>
+          <a:fontRef idx="minor">
+            <a:schemeClr val="lt1"/>
+          </a:fontRef>
+        </p:style>
+        <p:txBody>
+          <a:bodyPr rtlCol="0" anchor="ctr"/>
+          <a:lstStyle/>
+          <a:p>
+            <a:pPr algn="ctr"/>
+            <a:r>
+              <a:rPr lang="zh-CN" altLang="en-US" b="1" dirty="0">
+                <a:solidFill>
+                  <a:schemeClr val="tx1"/>
+                </a:solidFill>
+              </a:rPr>
+              <a:t>传感器</a:t>
+            </a:r>
+            <a:r>
+              <a:rPr lang="en-US" altLang="zh-CN" b="1" dirty="0">
+                <a:solidFill>
+                  <a:schemeClr val="tx1"/>
+                </a:solidFill>
+              </a:rPr>
+              <a:t> 1</a:t>
+            </a:r>
+            <a:endParaRPr lang="zh-CN" altLang="en-US" b="1" dirty="0">
+              <a:solidFill>
+                <a:schemeClr val="tx1"/>
+              </a:solidFill>
+            </a:endParaRPr>
+          </a:p>
+        </p:txBody>
+      </p:sp>
+      <p:sp>
+        <p:nvSpPr>
+          <p:cNvPr id="16" name="圆角矩形 59">
+            <a:extLst>
+              <a:ext uri="{FF2B5EF4-FFF2-40B4-BE49-F238E27FC236}">
+                <a16:creationId xmlns:a16="http://schemas.microsoft.com/office/drawing/2014/main" id="{D7893EC6-6F41-F5C0-EAAA-B82B0718C5BC}"/>
+              </a:ext>
+            </a:extLst>
+          </p:cNvPr>
+          <p:cNvSpPr/>
+          <p:nvPr/>
+        </p:nvSpPr>
+        <p:spPr>
+          <a:xfrm>
+            <a:off x="2232412" y="3614760"/>
+            <a:ext cx="1287518" cy="434047"/>
+          </a:xfrm>
+          <a:prstGeom prst="roundRect">
+            <a:avLst/>
+          </a:prstGeom>
+          <a:solidFill>
+            <a:schemeClr val="bg1"/>
+          </a:solidFill>
+        </p:spPr>
+        <p:style>
+          <a:lnRef idx="2">
+            <a:schemeClr val="accent1">
+              <a:shade val="50000"/>
+            </a:schemeClr>
+          </a:lnRef>
+          <a:fillRef idx="1">
+            <a:schemeClr val="accent1"/>
+          </a:fillRef>
+          <a:effectRef idx="0">
+            <a:schemeClr val="accent1"/>
+          </a:effectRef>
+          <a:fontRef idx="minor">
+            <a:schemeClr val="lt1"/>
+          </a:fontRef>
+        </p:style>
+        <p:txBody>
+          <a:bodyPr rtlCol="0" anchor="ctr"/>
+          <a:lstStyle/>
+          <a:p>
+            <a:pPr algn="ctr"/>
+            <a:r>
+              <a:rPr lang="zh-CN" altLang="en-US" b="1" dirty="0">
+                <a:solidFill>
+                  <a:schemeClr val="tx1"/>
+                </a:solidFill>
+              </a:rPr>
+              <a:t>传感器</a:t>
+            </a:r>
+            <a:r>
+              <a:rPr lang="en-US" altLang="zh-CN" b="1" dirty="0">
+                <a:solidFill>
+                  <a:schemeClr val="tx1"/>
+                </a:solidFill>
+              </a:rPr>
+              <a:t> 2</a:t>
+            </a:r>
+            <a:endParaRPr lang="zh-CN" altLang="en-US" b="1" dirty="0">
+              <a:solidFill>
+                <a:schemeClr val="tx1"/>
+              </a:solidFill>
+            </a:endParaRPr>
+          </a:p>
+        </p:txBody>
+      </p:sp>
+      <p:cxnSp>
+        <p:nvCxnSpPr>
+          <p:cNvPr id="18" name="直接箭头连接符 17">
+            <a:extLst>
+              <a:ext uri="{FF2B5EF4-FFF2-40B4-BE49-F238E27FC236}">
+                <a16:creationId xmlns:a16="http://schemas.microsoft.com/office/drawing/2014/main" id="{D1683E4A-D9A6-736B-7F44-01022149A5D6}"/>
+              </a:ext>
+            </a:extLst>
+          </p:cNvPr>
+          <p:cNvCxnSpPr>
+            <a:stCxn id="54" idx="2"/>
+            <a:endCxn id="15" idx="0"/>
+          </p:cNvCxnSpPr>
+          <p:nvPr/>
+        </p:nvCxnSpPr>
+        <p:spPr>
+          <a:xfrm flipH="1">
+            <a:off x="1068082" y="2924617"/>
+            <a:ext cx="905882" cy="690143"/>
+          </a:xfrm>
+          <a:prstGeom prst="straightConnector1">
+            <a:avLst/>
+          </a:prstGeom>
+          <a:ln w="19050">
+            <a:tailEnd type="triangle"/>
+          </a:ln>
+        </p:spPr>
+        <p:style>
+          <a:lnRef idx="1">
+            <a:schemeClr val="accent1"/>
+          </a:lnRef>
+          <a:fillRef idx="0">
+            <a:schemeClr val="accent1"/>
+          </a:fillRef>
+          <a:effectRef idx="0">
+            <a:schemeClr val="accent1"/>
+          </a:effectRef>
+          <a:fontRef idx="minor">
+            <a:schemeClr val="tx1"/>
+          </a:fontRef>
+        </p:style>
+      </p:cxnSp>
+      <p:cxnSp>
+        <p:nvCxnSpPr>
+          <p:cNvPr id="20" name="直接箭头连接符 19">
+            <a:extLst>
+              <a:ext uri="{FF2B5EF4-FFF2-40B4-BE49-F238E27FC236}">
+                <a16:creationId xmlns:a16="http://schemas.microsoft.com/office/drawing/2014/main" id="{A8C86916-C1E0-295C-67AF-63E1D851EB59}"/>
+              </a:ext>
+            </a:extLst>
+          </p:cNvPr>
+          <p:cNvCxnSpPr>
+            <a:stCxn id="54" idx="2"/>
+            <a:endCxn id="16" idx="0"/>
+          </p:cNvCxnSpPr>
+          <p:nvPr/>
+        </p:nvCxnSpPr>
+        <p:spPr>
+          <a:xfrm>
+            <a:off x="1973964" y="2924617"/>
+            <a:ext cx="902207" cy="690143"/>
+          </a:xfrm>
+          <a:prstGeom prst="straightConnector1">
+            <a:avLst/>
+          </a:prstGeom>
+          <a:ln w="19050">
+            <a:tailEnd type="triangle"/>
+          </a:ln>
+        </p:spPr>
+        <p:style>
+          <a:lnRef idx="1">
+            <a:schemeClr val="accent1"/>
+          </a:lnRef>
+          <a:fillRef idx="0">
+            <a:schemeClr val="accent1"/>
+          </a:fillRef>
+          <a:effectRef idx="0">
+            <a:schemeClr val="accent1"/>
+          </a:effectRef>
+          <a:fontRef idx="minor">
+            <a:schemeClr val="tx1"/>
+          </a:fontRef>
+        </p:style>
+      </p:cxnSp>
+      <p:sp>
+        <p:nvSpPr>
+          <p:cNvPr id="24" name="圆角矩形 59">
+            <a:extLst>
+              <a:ext uri="{FF2B5EF4-FFF2-40B4-BE49-F238E27FC236}">
+                <a16:creationId xmlns:a16="http://schemas.microsoft.com/office/drawing/2014/main" id="{BAD14FD1-FE2B-5C84-E1AD-262A6A98E436}"/>
+              </a:ext>
+            </a:extLst>
+          </p:cNvPr>
+          <p:cNvSpPr/>
+          <p:nvPr/>
+        </p:nvSpPr>
+        <p:spPr>
+          <a:xfrm>
+            <a:off x="3281398" y="1544670"/>
+            <a:ext cx="1132036" cy="567158"/>
+          </a:xfrm>
+          <a:prstGeom prst="roundRect">
+            <a:avLst/>
+          </a:prstGeom>
+          <a:solidFill>
+            <a:schemeClr val="bg1"/>
+          </a:solidFill>
+        </p:spPr>
+        <p:style>
+          <a:lnRef idx="2">
+            <a:schemeClr val="accent1">
+              <a:shade val="50000"/>
+            </a:schemeClr>
+          </a:lnRef>
+          <a:fillRef idx="1">
+            <a:schemeClr val="accent1"/>
+          </a:fillRef>
+          <a:effectRef idx="0">
+            <a:schemeClr val="accent1"/>
+          </a:effectRef>
+          <a:fontRef idx="minor">
+            <a:schemeClr val="lt1"/>
+          </a:fontRef>
+        </p:style>
+        <p:txBody>
+          <a:bodyPr rtlCol="0" anchor="ctr"/>
+          <a:lstStyle/>
+          <a:p>
+            <a:pPr algn="ctr"/>
+            <a:r>
+              <a:rPr lang="zh-CN" altLang="en-US" b="1" dirty="0">
+                <a:solidFill>
+                  <a:schemeClr val="tx1"/>
+                </a:solidFill>
+              </a:rPr>
+              <a:t>多 </a:t>
+            </a:r>
+            <a:r>
+              <a:rPr lang="en-US" altLang="zh-CN" b="1" dirty="0">
+                <a:solidFill>
+                  <a:schemeClr val="tx1"/>
+                </a:solidFill>
+              </a:rPr>
+              <a:t>GPU </a:t>
+            </a:r>
+          </a:p>
+          <a:p>
+            <a:pPr algn="ctr"/>
+            <a:r>
+              <a:rPr lang="zh-CN" altLang="en-US" b="1" dirty="0">
+                <a:solidFill>
+                  <a:schemeClr val="tx1"/>
+                </a:solidFill>
+              </a:rPr>
+              <a:t>服务器</a:t>
+            </a:r>
+          </a:p>
+        </p:txBody>
+      </p:sp>
+      <p:sp>
+        <p:nvSpPr>
+          <p:cNvPr id="25" name="圆角矩形 59">
+            <a:extLst>
+              <a:ext uri="{FF2B5EF4-FFF2-40B4-BE49-F238E27FC236}">
+                <a16:creationId xmlns:a16="http://schemas.microsoft.com/office/drawing/2014/main" id="{7AEB8E71-31F4-6740-5F8C-74151E85BAB5}"/>
+              </a:ext>
+            </a:extLst>
+          </p:cNvPr>
+          <p:cNvSpPr/>
+          <p:nvPr/>
+        </p:nvSpPr>
+        <p:spPr>
+          <a:xfrm>
+            <a:off x="5031526" y="1068251"/>
+            <a:ext cx="1132036" cy="567158"/>
+          </a:xfrm>
+          <a:prstGeom prst="roundRect">
+            <a:avLst/>
+          </a:prstGeom>
+          <a:solidFill>
+            <a:schemeClr val="bg1"/>
+          </a:solidFill>
+        </p:spPr>
+        <p:style>
+          <a:lnRef idx="2">
+            <a:schemeClr val="accent1">
+              <a:shade val="50000"/>
+            </a:schemeClr>
+          </a:lnRef>
+          <a:fillRef idx="1">
+            <a:schemeClr val="accent1"/>
+          </a:fillRef>
+          <a:effectRef idx="0">
+            <a:schemeClr val="accent1"/>
+          </a:effectRef>
+          <a:fontRef idx="minor">
+            <a:schemeClr val="lt1"/>
+          </a:fontRef>
+        </p:style>
+        <p:txBody>
+          <a:bodyPr rtlCol="0" anchor="ctr"/>
+          <a:lstStyle/>
+          <a:p>
+            <a:pPr algn="ctr"/>
+            <a:r>
+              <a:rPr lang="zh-CN" altLang="en-US" b="1" dirty="0">
+                <a:solidFill>
+                  <a:schemeClr val="tx1"/>
+                </a:solidFill>
+              </a:rPr>
+              <a:t>多 </a:t>
+            </a:r>
+            <a:r>
+              <a:rPr lang="en-US" altLang="zh-CN" b="1" dirty="0">
+                <a:solidFill>
+                  <a:schemeClr val="tx1"/>
+                </a:solidFill>
+              </a:rPr>
+              <a:t>GPU </a:t>
+            </a:r>
+          </a:p>
+          <a:p>
+            <a:pPr algn="ctr"/>
+            <a:r>
+              <a:rPr lang="zh-CN" altLang="en-US" b="1" dirty="0">
+                <a:solidFill>
+                  <a:schemeClr val="tx1"/>
+                </a:solidFill>
+              </a:rPr>
+              <a:t>客户端</a:t>
+            </a:r>
+          </a:p>
+        </p:txBody>
+      </p:sp>
+      <p:sp>
+        <p:nvSpPr>
+          <p:cNvPr id="27" name="圆角矩形 59">
+            <a:extLst>
+              <a:ext uri="{FF2B5EF4-FFF2-40B4-BE49-F238E27FC236}">
+                <a16:creationId xmlns:a16="http://schemas.microsoft.com/office/drawing/2014/main" id="{99088F38-BF36-5E89-7E9E-0A0688B4FC44}"/>
+              </a:ext>
+            </a:extLst>
+          </p:cNvPr>
+          <p:cNvSpPr/>
+          <p:nvPr/>
+        </p:nvSpPr>
+        <p:spPr>
+          <a:xfrm>
+            <a:off x="5031526" y="2110905"/>
+            <a:ext cx="1132036" cy="567158"/>
+          </a:xfrm>
+          <a:prstGeom prst="roundRect">
+            <a:avLst/>
+          </a:prstGeom>
+          <a:solidFill>
+            <a:schemeClr val="bg1"/>
+          </a:solidFill>
+        </p:spPr>
+        <p:style>
+          <a:lnRef idx="2">
+            <a:schemeClr val="accent1">
+              <a:shade val="50000"/>
+            </a:schemeClr>
+          </a:lnRef>
+          <a:fillRef idx="1">
+            <a:schemeClr val="accent1"/>
+          </a:fillRef>
+          <a:effectRef idx="0">
+            <a:schemeClr val="accent1"/>
+          </a:effectRef>
+          <a:fontRef idx="minor">
+            <a:schemeClr val="lt1"/>
+          </a:fontRef>
+        </p:style>
+        <p:txBody>
+          <a:bodyPr rtlCol="0" anchor="ctr"/>
+          <a:lstStyle/>
+          <a:p>
+            <a:pPr algn="ctr"/>
+            <a:r>
+              <a:rPr lang="zh-CN" altLang="en-US" b="1" dirty="0">
+                <a:solidFill>
+                  <a:schemeClr val="tx1"/>
+                </a:solidFill>
+              </a:rPr>
+              <a:t>多 </a:t>
+            </a:r>
+            <a:r>
+              <a:rPr lang="en-US" altLang="zh-CN" b="1" dirty="0">
+                <a:solidFill>
+                  <a:schemeClr val="tx1"/>
+                </a:solidFill>
+              </a:rPr>
+              <a:t>GPU </a:t>
+            </a:r>
+          </a:p>
+          <a:p>
+            <a:pPr algn="ctr"/>
+            <a:r>
+              <a:rPr lang="zh-CN" altLang="en-US" b="1" dirty="0">
+                <a:solidFill>
+                  <a:schemeClr val="tx1"/>
+                </a:solidFill>
+              </a:rPr>
+              <a:t>客户端</a:t>
+            </a:r>
+          </a:p>
+        </p:txBody>
+      </p:sp>
+      <p:cxnSp>
+        <p:nvCxnSpPr>
+          <p:cNvPr id="30" name="直接箭头连接符 29">
+            <a:extLst>
+              <a:ext uri="{FF2B5EF4-FFF2-40B4-BE49-F238E27FC236}">
+                <a16:creationId xmlns:a16="http://schemas.microsoft.com/office/drawing/2014/main" id="{FAC9668D-D812-05D1-6491-A3864397BA79}"/>
+              </a:ext>
+            </a:extLst>
+          </p:cNvPr>
+          <p:cNvCxnSpPr>
+            <a:stCxn id="50" idx="3"/>
+            <a:endCxn id="24" idx="1"/>
+          </p:cNvCxnSpPr>
+          <p:nvPr/>
+        </p:nvCxnSpPr>
+        <p:spPr>
+          <a:xfrm>
+            <a:off x="2663808" y="1819236"/>
+            <a:ext cx="617590" cy="9013"/>
+          </a:xfrm>
+          <a:prstGeom prst="straightConnector1">
+            <a:avLst/>
+          </a:prstGeom>
+          <a:ln w="19050">
+            <a:tailEnd type="triangle"/>
+          </a:ln>
+        </p:spPr>
+        <p:style>
+          <a:lnRef idx="1">
+            <a:schemeClr val="accent1"/>
+          </a:lnRef>
+          <a:fillRef idx="0">
+            <a:schemeClr val="accent1"/>
+          </a:fillRef>
+          <a:effectRef idx="0">
+            <a:schemeClr val="accent1"/>
+          </a:effectRef>
+          <a:fontRef idx="minor">
+            <a:schemeClr val="tx1"/>
+          </a:fontRef>
+        </p:style>
+      </p:cxnSp>
+      <p:cxnSp>
+        <p:nvCxnSpPr>
+          <p:cNvPr id="33" name="直接箭头连接符 32">
+            <a:extLst>
+              <a:ext uri="{FF2B5EF4-FFF2-40B4-BE49-F238E27FC236}">
+                <a16:creationId xmlns:a16="http://schemas.microsoft.com/office/drawing/2014/main" id="{E6C7F557-CFB0-9F0F-3578-FC291CEA4D6B}"/>
+              </a:ext>
+            </a:extLst>
+          </p:cNvPr>
+          <p:cNvCxnSpPr>
+            <a:cxnSpLocks/>
+            <a:stCxn id="25" idx="1"/>
+          </p:cNvCxnSpPr>
+          <p:nvPr/>
+        </p:nvCxnSpPr>
+        <p:spPr>
+          <a:xfrm flipH="1">
+            <a:off x="4445000" y="1351830"/>
+            <a:ext cx="586526" cy="232318"/>
+          </a:xfrm>
+          <a:prstGeom prst="straightConnector1">
+            <a:avLst/>
+          </a:prstGeom>
+          <a:ln w="19050">
+            <a:tailEnd type="triangle"/>
+          </a:ln>
+        </p:spPr>
+        <p:style>
+          <a:lnRef idx="1">
+            <a:schemeClr val="accent1"/>
+          </a:lnRef>
+          <a:fillRef idx="0">
+            <a:schemeClr val="accent1"/>
+          </a:fillRef>
+          <a:effectRef idx="0">
+            <a:schemeClr val="accent1"/>
+          </a:effectRef>
+          <a:fontRef idx="minor">
+            <a:schemeClr val="tx1"/>
+          </a:fontRef>
+        </p:style>
+      </p:cxnSp>
+      <p:cxnSp>
+        <p:nvCxnSpPr>
+          <p:cNvPr id="36" name="直接箭头连接符 35">
+            <a:extLst>
+              <a:ext uri="{FF2B5EF4-FFF2-40B4-BE49-F238E27FC236}">
+                <a16:creationId xmlns:a16="http://schemas.microsoft.com/office/drawing/2014/main" id="{908B7187-88C2-F710-3789-46C16D7D2848}"/>
+              </a:ext>
+            </a:extLst>
+          </p:cNvPr>
+          <p:cNvCxnSpPr>
+            <a:cxnSpLocks/>
+            <a:stCxn id="27" idx="1"/>
+          </p:cNvCxnSpPr>
+          <p:nvPr/>
+        </p:nvCxnSpPr>
+        <p:spPr>
+          <a:xfrm flipH="1" flipV="1">
+            <a:off x="4445000" y="2060105"/>
+            <a:ext cx="586526" cy="334379"/>
+          </a:xfrm>
+          <a:prstGeom prst="straightConnector1">
+            <a:avLst/>
+          </a:prstGeom>
+          <a:ln w="19050">
+            <a:tailEnd type="triangle"/>
+          </a:ln>
+        </p:spPr>
+        <p:style>
+          <a:lnRef idx="1">
+            <a:schemeClr val="accent1"/>
+          </a:lnRef>
+          <a:fillRef idx="0">
+            <a:schemeClr val="accent1"/>
+          </a:fillRef>
+          <a:effectRef idx="0">
+            <a:schemeClr val="accent1"/>
+          </a:effectRef>
+          <a:fontRef idx="minor">
+            <a:schemeClr val="tx1"/>
+          </a:fontRef>
+        </p:style>
+      </p:cxnSp>
+      <p:sp>
+        <p:nvSpPr>
+          <p:cNvPr id="43" name="圆角矩形 49">
+            <a:extLst>
+              <a:ext uri="{FF2B5EF4-FFF2-40B4-BE49-F238E27FC236}">
+                <a16:creationId xmlns:a16="http://schemas.microsoft.com/office/drawing/2014/main" id="{54DD6FD4-9EC9-EF72-917F-E15A257AB0B6}"/>
+              </a:ext>
+            </a:extLst>
+          </p:cNvPr>
+          <p:cNvSpPr/>
+          <p:nvPr/>
+        </p:nvSpPr>
+        <p:spPr>
+          <a:xfrm>
+            <a:off x="6589268" y="1068251"/>
+            <a:ext cx="1168845" cy="567159"/>
+          </a:xfrm>
+          <a:prstGeom prst="roundRect">
+            <a:avLst/>
+          </a:prstGeom>
+          <a:solidFill>
+            <a:schemeClr val="bg2">
+              <a:lumMod val="60000"/>
+              <a:lumOff val="40000"/>
+            </a:schemeClr>
+          </a:solidFill>
+        </p:spPr>
+        <p:style>
+          <a:lnRef idx="2">
+            <a:schemeClr val="accent1">
+              <a:shade val="50000"/>
+            </a:schemeClr>
+          </a:lnRef>
+          <a:fillRef idx="1">
+            <a:schemeClr val="accent1"/>
+          </a:fillRef>
+          <a:effectRef idx="0">
+            <a:schemeClr val="accent1"/>
+          </a:effectRef>
+          <a:fontRef idx="minor">
+            <a:schemeClr val="lt1"/>
+          </a:fontRef>
+        </p:style>
+        <p:txBody>
+          <a:bodyPr rtlCol="0" anchor="ctr"/>
+          <a:lstStyle/>
+          <a:p>
+            <a:pPr algn="ctr"/>
+            <a:r>
+              <a:rPr lang="en-US" altLang="zh-CN" b="1" dirty="0">
+                <a:solidFill>
+                  <a:schemeClr val="tx1"/>
+                </a:solidFill>
+              </a:rPr>
+              <a:t>Carla </a:t>
+            </a:r>
+          </a:p>
+          <a:p>
+            <a:pPr algn="ctr"/>
+            <a:r>
+              <a:rPr lang="zh-CN" altLang="en-US" b="1" dirty="0">
+                <a:solidFill>
+                  <a:schemeClr val="tx1"/>
+                </a:solidFill>
+              </a:rPr>
+              <a:t>辅助服务器</a:t>
+            </a:r>
+          </a:p>
+        </p:txBody>
+      </p:sp>
+      <p:sp>
+        <p:nvSpPr>
+          <p:cNvPr id="45" name="圆角矩形 49">
+            <a:extLst>
+              <a:ext uri="{FF2B5EF4-FFF2-40B4-BE49-F238E27FC236}">
+                <a16:creationId xmlns:a16="http://schemas.microsoft.com/office/drawing/2014/main" id="{2AF9A63E-4095-B1A8-7D32-B4986175F268}"/>
+              </a:ext>
+            </a:extLst>
+          </p:cNvPr>
+          <p:cNvSpPr/>
+          <p:nvPr/>
+        </p:nvSpPr>
+        <p:spPr>
+          <a:xfrm>
+            <a:off x="6589268" y="2102815"/>
+            <a:ext cx="1168845" cy="567159"/>
+          </a:xfrm>
+          <a:prstGeom prst="roundRect">
+            <a:avLst/>
+          </a:prstGeom>
+          <a:solidFill>
+            <a:schemeClr val="bg2">
+              <a:lumMod val="60000"/>
+              <a:lumOff val="40000"/>
+            </a:schemeClr>
+          </a:solidFill>
+        </p:spPr>
+        <p:style>
+          <a:lnRef idx="2">
+            <a:schemeClr val="accent1">
+              <a:shade val="50000"/>
+            </a:schemeClr>
+          </a:lnRef>
+          <a:fillRef idx="1">
+            <a:schemeClr val="accent1"/>
+          </a:fillRef>
+          <a:effectRef idx="0">
+            <a:schemeClr val="accent1"/>
+          </a:effectRef>
+          <a:fontRef idx="minor">
+            <a:schemeClr val="lt1"/>
+          </a:fontRef>
+        </p:style>
+        <p:txBody>
+          <a:bodyPr rtlCol="0" anchor="ctr"/>
+          <a:lstStyle/>
+          <a:p>
+            <a:pPr algn="ctr"/>
+            <a:r>
+              <a:rPr lang="en-US" altLang="zh-CN" b="1" dirty="0">
+                <a:solidFill>
+                  <a:schemeClr val="tx1"/>
+                </a:solidFill>
+              </a:rPr>
+              <a:t>Carla </a:t>
+            </a:r>
+          </a:p>
+          <a:p>
+            <a:pPr algn="ctr"/>
+            <a:r>
+              <a:rPr lang="zh-CN" altLang="en-US" b="1" dirty="0">
+                <a:solidFill>
+                  <a:schemeClr val="tx1"/>
+                </a:solidFill>
+              </a:rPr>
+              <a:t>辅助服务器</a:t>
+            </a:r>
+          </a:p>
+        </p:txBody>
+      </p:sp>
+      <p:cxnSp>
+        <p:nvCxnSpPr>
+          <p:cNvPr id="47" name="直接箭头连接符 46">
+            <a:extLst>
+              <a:ext uri="{FF2B5EF4-FFF2-40B4-BE49-F238E27FC236}">
+                <a16:creationId xmlns:a16="http://schemas.microsoft.com/office/drawing/2014/main" id="{B79575A2-919A-D395-0031-2F127DEF7CA9}"/>
+              </a:ext>
+            </a:extLst>
+          </p:cNvPr>
+          <p:cNvCxnSpPr>
+            <a:cxnSpLocks/>
+            <a:stCxn id="43" idx="1"/>
+            <a:endCxn id="25" idx="3"/>
+          </p:cNvCxnSpPr>
+          <p:nvPr/>
+        </p:nvCxnSpPr>
+        <p:spPr>
+          <a:xfrm flipH="1" flipV="1">
+            <a:off x="6163562" y="1351830"/>
+            <a:ext cx="425706" cy="1"/>
+          </a:xfrm>
+          <a:prstGeom prst="straightConnector1">
+            <a:avLst/>
+          </a:prstGeom>
+          <a:ln w="19050">
+            <a:tailEnd type="triangle"/>
+          </a:ln>
+        </p:spPr>
+        <p:style>
+          <a:lnRef idx="1">
+            <a:schemeClr val="accent1"/>
+          </a:lnRef>
+          <a:fillRef idx="0">
+            <a:schemeClr val="accent1"/>
+          </a:fillRef>
+          <a:effectRef idx="0">
+            <a:schemeClr val="accent1"/>
+          </a:effectRef>
+          <a:fontRef idx="minor">
+            <a:schemeClr val="tx1"/>
+          </a:fontRef>
+        </p:style>
+      </p:cxnSp>
+      <p:cxnSp>
+        <p:nvCxnSpPr>
+          <p:cNvPr id="49" name="直接箭头连接符 48">
+            <a:extLst>
+              <a:ext uri="{FF2B5EF4-FFF2-40B4-BE49-F238E27FC236}">
+                <a16:creationId xmlns:a16="http://schemas.microsoft.com/office/drawing/2014/main" id="{33090BFD-C09A-84A8-B1E4-B55E6258D34C}"/>
+              </a:ext>
+            </a:extLst>
+          </p:cNvPr>
+          <p:cNvCxnSpPr>
+            <a:cxnSpLocks/>
+            <a:stCxn id="45" idx="1"/>
+            <a:endCxn id="27" idx="3"/>
+          </p:cNvCxnSpPr>
+          <p:nvPr/>
+        </p:nvCxnSpPr>
+        <p:spPr>
+          <a:xfrm flipH="1">
+            <a:off x="6163562" y="2386395"/>
+            <a:ext cx="425706" cy="8089"/>
+          </a:xfrm>
+          <a:prstGeom prst="straightConnector1">
+            <a:avLst/>
+          </a:prstGeom>
+          <a:ln w="19050">
+            <a:tailEnd type="triangle"/>
+          </a:ln>
+        </p:spPr>
+        <p:style>
+          <a:lnRef idx="1">
+            <a:schemeClr val="accent1"/>
+          </a:lnRef>
+          <a:fillRef idx="0">
+            <a:schemeClr val="accent1"/>
+          </a:fillRef>
+          <a:effectRef idx="0">
+            <a:schemeClr val="accent1"/>
+          </a:effectRef>
+          <a:fontRef idx="minor">
+            <a:schemeClr val="tx1"/>
+          </a:fontRef>
+        </p:style>
+      </p:cxnSp>
+      <p:sp>
+        <p:nvSpPr>
+          <p:cNvPr id="52" name="圆角矩形 59">
+            <a:extLst>
+              <a:ext uri="{FF2B5EF4-FFF2-40B4-BE49-F238E27FC236}">
+                <a16:creationId xmlns:a16="http://schemas.microsoft.com/office/drawing/2014/main" id="{C7FA86F8-ACCF-493B-9601-7FDEBB6A6BBE}"/>
+              </a:ext>
+            </a:extLst>
+          </p:cNvPr>
+          <p:cNvSpPr/>
+          <p:nvPr/>
+        </p:nvSpPr>
+        <p:spPr>
+          <a:xfrm>
+            <a:off x="6717731" y="140391"/>
+            <a:ext cx="902269" cy="567158"/>
+          </a:xfrm>
+          <a:prstGeom prst="roundRect">
+            <a:avLst/>
+          </a:prstGeom>
+          <a:solidFill>
+            <a:schemeClr val="bg1"/>
+          </a:solidFill>
+        </p:spPr>
+        <p:style>
+          <a:lnRef idx="2">
+            <a:schemeClr val="accent1">
+              <a:shade val="50000"/>
+            </a:schemeClr>
+          </a:lnRef>
+          <a:fillRef idx="1">
+            <a:schemeClr val="accent1"/>
+          </a:fillRef>
+          <a:effectRef idx="0">
+            <a:schemeClr val="accent1"/>
+          </a:effectRef>
+          <a:fontRef idx="minor">
+            <a:schemeClr val="lt1"/>
+          </a:fontRef>
+        </p:style>
+        <p:txBody>
+          <a:bodyPr rtlCol="0" anchor="ctr"/>
+          <a:lstStyle/>
+          <a:p>
+            <a:pPr algn="ctr"/>
+            <a:r>
+              <a:rPr lang="zh-CN" altLang="en-US" b="1" dirty="0">
+                <a:solidFill>
+                  <a:schemeClr val="tx1"/>
+                </a:solidFill>
+              </a:rPr>
+              <a:t>流</a:t>
+            </a:r>
+            <a:endParaRPr lang="en-US" altLang="zh-CN" b="1" dirty="0">
+              <a:solidFill>
+                <a:schemeClr val="tx1"/>
+              </a:solidFill>
+            </a:endParaRPr>
+          </a:p>
+          <a:p>
+            <a:pPr algn="ctr"/>
+            <a:r>
+              <a:rPr lang="zh-CN" altLang="en-US" b="1" dirty="0">
+                <a:solidFill>
+                  <a:schemeClr val="tx1"/>
+                </a:solidFill>
+              </a:rPr>
+              <a:t>服务器</a:t>
+            </a:r>
+          </a:p>
+        </p:txBody>
+      </p:sp>
+      <p:sp>
+        <p:nvSpPr>
+          <p:cNvPr id="55" name="圆角矩形 59">
+            <a:extLst>
+              <a:ext uri="{FF2B5EF4-FFF2-40B4-BE49-F238E27FC236}">
+                <a16:creationId xmlns:a16="http://schemas.microsoft.com/office/drawing/2014/main" id="{77041457-51AB-3C82-CB93-CF8ACAE64B3A}"/>
+              </a:ext>
+            </a:extLst>
+          </p:cNvPr>
+          <p:cNvSpPr/>
+          <p:nvPr/>
+        </p:nvSpPr>
+        <p:spPr>
+          <a:xfrm>
+            <a:off x="6717731" y="3047602"/>
+            <a:ext cx="949894" cy="567158"/>
+          </a:xfrm>
+          <a:prstGeom prst="roundRect">
+            <a:avLst/>
+          </a:prstGeom>
+          <a:solidFill>
+            <a:schemeClr val="bg1"/>
+          </a:solidFill>
+        </p:spPr>
+        <p:style>
+          <a:lnRef idx="2">
+            <a:schemeClr val="accent1">
+              <a:shade val="50000"/>
+            </a:schemeClr>
+          </a:lnRef>
+          <a:fillRef idx="1">
+            <a:schemeClr val="accent1"/>
+          </a:fillRef>
+          <a:effectRef idx="0">
+            <a:schemeClr val="accent1"/>
+          </a:effectRef>
+          <a:fontRef idx="minor">
+            <a:schemeClr val="lt1"/>
+          </a:fontRef>
+        </p:style>
+        <p:txBody>
+          <a:bodyPr rtlCol="0" anchor="ctr"/>
+          <a:lstStyle/>
+          <a:p>
+            <a:pPr algn="ctr"/>
+            <a:r>
+              <a:rPr lang="zh-CN" altLang="en-US" b="1" dirty="0">
+                <a:solidFill>
+                  <a:schemeClr val="tx1"/>
+                </a:solidFill>
+              </a:rPr>
+              <a:t>流</a:t>
+            </a:r>
+            <a:endParaRPr lang="en-US" altLang="zh-CN" b="1" dirty="0">
+              <a:solidFill>
+                <a:schemeClr val="tx1"/>
+              </a:solidFill>
+            </a:endParaRPr>
+          </a:p>
+          <a:p>
+            <a:pPr algn="ctr"/>
+            <a:r>
+              <a:rPr lang="zh-CN" altLang="en-US" b="1" dirty="0">
+                <a:solidFill>
+                  <a:schemeClr val="tx1"/>
+                </a:solidFill>
+              </a:rPr>
+              <a:t>服务器</a:t>
+            </a:r>
+          </a:p>
+        </p:txBody>
+      </p:sp>
+      <p:cxnSp>
+        <p:nvCxnSpPr>
+          <p:cNvPr id="59" name="直接箭头连接符 58">
+            <a:extLst>
+              <a:ext uri="{FF2B5EF4-FFF2-40B4-BE49-F238E27FC236}">
+                <a16:creationId xmlns:a16="http://schemas.microsoft.com/office/drawing/2014/main" id="{22A60533-DE06-5B1D-51CB-5318F2733053}"/>
+              </a:ext>
+            </a:extLst>
+          </p:cNvPr>
+          <p:cNvCxnSpPr>
+            <a:cxnSpLocks/>
+            <a:stCxn id="43" idx="0"/>
+            <a:endCxn id="52" idx="2"/>
+          </p:cNvCxnSpPr>
+          <p:nvPr/>
+        </p:nvCxnSpPr>
+        <p:spPr>
+          <a:xfrm flipH="1" flipV="1">
+            <a:off x="7168866" y="707549"/>
+            <a:ext cx="4825" cy="360702"/>
+          </a:xfrm>
+          <a:prstGeom prst="straightConnector1">
+            <a:avLst/>
+          </a:prstGeom>
+          <a:ln w="19050">
+            <a:tailEnd type="triangle"/>
+          </a:ln>
+        </p:spPr>
+        <p:style>
+          <a:lnRef idx="1">
+            <a:schemeClr val="accent1"/>
+          </a:lnRef>
+          <a:fillRef idx="0">
+            <a:schemeClr val="accent1"/>
+          </a:fillRef>
+          <a:effectRef idx="0">
+            <a:schemeClr val="accent1"/>
+          </a:effectRef>
+          <a:fontRef idx="minor">
+            <a:schemeClr val="tx1"/>
+          </a:fontRef>
+        </p:style>
+      </p:cxnSp>
+      <p:cxnSp>
+        <p:nvCxnSpPr>
+          <p:cNvPr id="65" name="直接箭头连接符 64">
+            <a:extLst>
+              <a:ext uri="{FF2B5EF4-FFF2-40B4-BE49-F238E27FC236}">
+                <a16:creationId xmlns:a16="http://schemas.microsoft.com/office/drawing/2014/main" id="{3A44C18E-A907-0841-2D45-5A2BE99BC773}"/>
+              </a:ext>
+            </a:extLst>
+          </p:cNvPr>
+          <p:cNvCxnSpPr>
+            <a:cxnSpLocks/>
+            <a:stCxn id="45" idx="2"/>
+            <a:endCxn id="55" idx="0"/>
+          </p:cNvCxnSpPr>
+          <p:nvPr/>
+        </p:nvCxnSpPr>
+        <p:spPr>
+          <a:xfrm>
+            <a:off x="7173691" y="2669974"/>
+            <a:ext cx="18987" cy="377628"/>
+          </a:xfrm>
+          <a:prstGeom prst="straightConnector1">
+            <a:avLst/>
+          </a:prstGeom>
+          <a:ln w="19050">
+            <a:tailEnd type="triangle"/>
+          </a:ln>
+        </p:spPr>
+        <p:style>
+          <a:lnRef idx="1">
+            <a:schemeClr val="accent1"/>
+          </a:lnRef>
+          <a:fillRef idx="0">
+            <a:schemeClr val="accent1"/>
+          </a:fillRef>
+          <a:effectRef idx="0">
+            <a:schemeClr val="accent1"/>
+          </a:effectRef>
+          <a:fontRef idx="minor">
+            <a:schemeClr val="tx1"/>
+          </a:fontRef>
+        </p:style>
+      </p:cxnSp>
+      <p:sp>
+        <p:nvSpPr>
+          <p:cNvPr id="67" name="平行四边形 66">
+            <a:extLst>
+              <a:ext uri="{FF2B5EF4-FFF2-40B4-BE49-F238E27FC236}">
+                <a16:creationId xmlns:a16="http://schemas.microsoft.com/office/drawing/2014/main" id="{32327F82-9444-A20B-A795-1A755FD0899E}"/>
+              </a:ext>
+            </a:extLst>
+          </p:cNvPr>
+          <p:cNvSpPr/>
+          <p:nvPr/>
+        </p:nvSpPr>
+        <p:spPr>
+          <a:xfrm>
+            <a:off x="39518" y="1584609"/>
+            <a:ext cx="896610" cy="475496"/>
+          </a:xfrm>
+          <a:prstGeom prst="parallelogram">
+            <a:avLst/>
+          </a:prstGeom>
+          <a:solidFill>
+            <a:schemeClr val="bg1"/>
+          </a:solidFill>
+          <a:ln>
+            <a:solidFill>
+              <a:schemeClr val="bg1">
+                <a:lumMod val="50000"/>
+              </a:schemeClr>
+            </a:solidFill>
+          </a:ln>
+        </p:spPr>
+        <p:style>
+          <a:lnRef idx="2">
+            <a:schemeClr val="accent1">
+              <a:shade val="15000"/>
+            </a:schemeClr>
+          </a:lnRef>
+          <a:fillRef idx="1">
+            <a:schemeClr val="accent1"/>
+          </a:fillRef>
+          <a:effectRef idx="0">
+            <a:schemeClr val="accent1"/>
+          </a:effectRef>
+          <a:fontRef idx="minor">
+            <a:schemeClr val="lt1"/>
+          </a:fontRef>
+        </p:style>
+        <p:txBody>
+          <a:bodyPr rtlCol="0" anchor="ctr"/>
+          <a:lstStyle/>
+          <a:p>
+            <a:pPr algn="ctr"/>
+            <a:r>
+              <a:rPr lang="zh-CN" altLang="en-US" b="1" dirty="0">
+                <a:solidFill>
+                  <a:schemeClr val="bg1">
+                    <a:lumMod val="50000"/>
+                  </a:schemeClr>
+                </a:solidFill>
+              </a:rPr>
+              <a:t>无</a:t>
+            </a:r>
+            <a:r>
+              <a:rPr lang="en-US" altLang="zh-CN" b="1" dirty="0">
+                <a:solidFill>
+                  <a:schemeClr val="bg1">
+                    <a:lumMod val="50000"/>
+                  </a:schemeClr>
+                </a:solidFill>
+              </a:rPr>
+              <a:t>GPU</a:t>
+            </a:r>
+            <a:endParaRPr lang="zh-CN" altLang="en-US" b="1" dirty="0">
+              <a:solidFill>
+                <a:schemeClr val="bg1">
+                  <a:lumMod val="50000"/>
+                </a:schemeClr>
+              </a:solidFill>
+            </a:endParaRPr>
+          </a:p>
+        </p:txBody>
+      </p:sp>
+      <p:sp>
+        <p:nvSpPr>
+          <p:cNvPr id="71" name="平行四边形 70">
+            <a:extLst>
+              <a:ext uri="{FF2B5EF4-FFF2-40B4-BE49-F238E27FC236}">
+                <a16:creationId xmlns:a16="http://schemas.microsoft.com/office/drawing/2014/main" id="{8CEE5094-F810-0007-4C50-E8BAB6C6AB34}"/>
+              </a:ext>
+            </a:extLst>
+          </p:cNvPr>
+          <p:cNvSpPr/>
+          <p:nvPr/>
+        </p:nvSpPr>
+        <p:spPr>
+          <a:xfrm>
+            <a:off x="8292165" y="2150174"/>
+            <a:ext cx="806251" cy="475496"/>
+          </a:xfrm>
+          <a:prstGeom prst="parallelogram">
+            <a:avLst/>
+          </a:prstGeom>
+          <a:solidFill>
+            <a:schemeClr val="bg1"/>
+          </a:solidFill>
+          <a:ln>
+            <a:solidFill>
+              <a:schemeClr val="bg1">
+                <a:lumMod val="50000"/>
+              </a:schemeClr>
+            </a:solidFill>
+          </a:ln>
+        </p:spPr>
+        <p:style>
+          <a:lnRef idx="2">
+            <a:schemeClr val="accent1">
+              <a:shade val="15000"/>
+            </a:schemeClr>
+          </a:lnRef>
+          <a:fillRef idx="1">
+            <a:schemeClr val="accent1"/>
+          </a:fillRef>
+          <a:effectRef idx="0">
+            <a:schemeClr val="accent1"/>
+          </a:effectRef>
+          <a:fontRef idx="minor">
+            <a:schemeClr val="lt1"/>
+          </a:fontRef>
+        </p:style>
+        <p:txBody>
+          <a:bodyPr rtlCol="0" anchor="ctr"/>
+          <a:lstStyle/>
+          <a:p>
+            <a:pPr algn="ctr"/>
+            <a:r>
+              <a:rPr lang="zh-CN" altLang="en-US" b="1" dirty="0">
+                <a:solidFill>
+                  <a:schemeClr val="bg1">
+                    <a:lumMod val="50000"/>
+                  </a:schemeClr>
+                </a:solidFill>
+              </a:rPr>
+              <a:t>无</a:t>
+            </a:r>
+            <a:r>
+              <a:rPr lang="en-US" altLang="zh-CN" b="1" dirty="0">
+                <a:solidFill>
+                  <a:schemeClr val="bg1">
+                    <a:lumMod val="50000"/>
+                  </a:schemeClr>
+                </a:solidFill>
+              </a:rPr>
+              <a:t>GPU</a:t>
+            </a:r>
+            <a:endParaRPr lang="zh-CN" altLang="en-US" b="1" dirty="0">
+              <a:solidFill>
+                <a:schemeClr val="bg1">
+                  <a:lumMod val="50000"/>
+                </a:schemeClr>
+              </a:solidFill>
+            </a:endParaRPr>
+          </a:p>
+        </p:txBody>
+      </p:sp>
+      <p:sp>
+        <p:nvSpPr>
+          <p:cNvPr id="74" name="平行四边形 73">
+            <a:extLst>
+              <a:ext uri="{FF2B5EF4-FFF2-40B4-BE49-F238E27FC236}">
+                <a16:creationId xmlns:a16="http://schemas.microsoft.com/office/drawing/2014/main" id="{D17426C8-3F6A-4D34-AF0A-05CBCDD42F5F}"/>
+              </a:ext>
+            </a:extLst>
+          </p:cNvPr>
+          <p:cNvSpPr/>
+          <p:nvPr/>
+        </p:nvSpPr>
+        <p:spPr>
+          <a:xfrm>
+            <a:off x="8232482" y="1113415"/>
+            <a:ext cx="844223" cy="475496"/>
+          </a:xfrm>
+          <a:prstGeom prst="parallelogram">
+            <a:avLst/>
+          </a:prstGeom>
+          <a:solidFill>
+            <a:schemeClr val="bg1"/>
+          </a:solidFill>
+          <a:ln>
+            <a:solidFill>
+              <a:schemeClr val="bg1">
+                <a:lumMod val="50000"/>
+              </a:schemeClr>
+            </a:solidFill>
+          </a:ln>
+        </p:spPr>
+        <p:style>
+          <a:lnRef idx="2">
+            <a:schemeClr val="accent1">
+              <a:shade val="15000"/>
+            </a:schemeClr>
+          </a:lnRef>
+          <a:fillRef idx="1">
+            <a:schemeClr val="accent1"/>
+          </a:fillRef>
+          <a:effectRef idx="0">
+            <a:schemeClr val="accent1"/>
+          </a:effectRef>
+          <a:fontRef idx="minor">
+            <a:schemeClr val="lt1"/>
+          </a:fontRef>
+        </p:style>
+        <p:txBody>
+          <a:bodyPr rtlCol="0" anchor="ctr"/>
+          <a:lstStyle/>
+          <a:p>
+            <a:pPr algn="ctr"/>
+            <a:r>
+              <a:rPr lang="zh-CN" altLang="en-US" b="1" dirty="0">
+                <a:solidFill>
+                  <a:schemeClr val="bg1">
+                    <a:lumMod val="50000"/>
+                  </a:schemeClr>
+                </a:solidFill>
+              </a:rPr>
+              <a:t>无</a:t>
+            </a:r>
+            <a:r>
+              <a:rPr lang="en-US" altLang="zh-CN" b="1" dirty="0">
+                <a:solidFill>
+                  <a:schemeClr val="bg1">
+                    <a:lumMod val="50000"/>
+                  </a:schemeClr>
+                </a:solidFill>
+              </a:rPr>
+              <a:t>GPU</a:t>
+            </a:r>
+            <a:endParaRPr lang="zh-CN" altLang="en-US" b="1" dirty="0">
+              <a:solidFill>
+                <a:schemeClr val="bg1">
+                  <a:lumMod val="50000"/>
+                </a:schemeClr>
+              </a:solidFill>
+            </a:endParaRPr>
+          </a:p>
+        </p:txBody>
+      </p:sp>
+      <p:cxnSp>
+        <p:nvCxnSpPr>
+          <p:cNvPr id="91" name="连接符: 肘形 90">
+            <a:extLst>
+              <a:ext uri="{FF2B5EF4-FFF2-40B4-BE49-F238E27FC236}">
+                <a16:creationId xmlns:a16="http://schemas.microsoft.com/office/drawing/2014/main" id="{177B08B0-1DB6-1C95-0955-53881A4CB73A}"/>
+              </a:ext>
+            </a:extLst>
+          </p:cNvPr>
+          <p:cNvCxnSpPr>
+            <a:stCxn id="52" idx="3"/>
+            <a:endCxn id="16" idx="3"/>
+          </p:cNvCxnSpPr>
+          <p:nvPr/>
+        </p:nvCxnSpPr>
+        <p:spPr>
+          <a:xfrm flipH="1">
+            <a:off x="3519930" y="423970"/>
+            <a:ext cx="4100070" cy="3407814"/>
+          </a:xfrm>
+          <a:prstGeom prst="bentConnector3">
+            <a:avLst>
+              <a:gd name="adj1" fmla="val -8480"/>
+            </a:avLst>
+          </a:prstGeom>
+          <a:ln w="19050">
+            <a:solidFill>
+              <a:schemeClr val="bg1">
+                <a:lumMod val="50000"/>
+              </a:schemeClr>
+            </a:solidFill>
+            <a:prstDash val="sysDash"/>
+            <a:tailEnd type="triangle"/>
+          </a:ln>
+        </p:spPr>
+        <p:style>
+          <a:lnRef idx="1">
+            <a:schemeClr val="accent1"/>
+          </a:lnRef>
+          <a:fillRef idx="0">
+            <a:schemeClr val="accent1"/>
+          </a:fillRef>
+          <a:effectRef idx="0">
+            <a:schemeClr val="accent1"/>
+          </a:effectRef>
+          <a:fontRef idx="minor">
+            <a:schemeClr val="tx1"/>
+          </a:fontRef>
+        </p:style>
+      </p:cxnSp>
+      <p:cxnSp>
+        <p:nvCxnSpPr>
+          <p:cNvPr id="94" name="连接符: 肘形 93">
+            <a:extLst>
+              <a:ext uri="{FF2B5EF4-FFF2-40B4-BE49-F238E27FC236}">
+                <a16:creationId xmlns:a16="http://schemas.microsoft.com/office/drawing/2014/main" id="{36B26831-178D-A9D9-7834-FCE0271D49C7}"/>
+              </a:ext>
+            </a:extLst>
+          </p:cNvPr>
+          <p:cNvCxnSpPr>
+            <a:stCxn id="55" idx="2"/>
+            <a:endCxn id="15" idx="2"/>
+          </p:cNvCxnSpPr>
+          <p:nvPr/>
+        </p:nvCxnSpPr>
+        <p:spPr>
+          <a:xfrm rot="5400000">
+            <a:off x="3913357" y="769485"/>
+            <a:ext cx="434047" cy="6124596"/>
+          </a:xfrm>
+          <a:prstGeom prst="bentConnector3">
+            <a:avLst>
+              <a:gd name="adj1" fmla="val 152667"/>
+            </a:avLst>
+          </a:prstGeom>
+          <a:ln w="19050">
+            <a:solidFill>
+              <a:schemeClr val="bg1">
+                <a:lumMod val="50000"/>
+              </a:schemeClr>
+            </a:solidFill>
+            <a:prstDash val="sysDash"/>
+            <a:tailEnd type="triangle"/>
+          </a:ln>
+        </p:spPr>
+        <p:style>
+          <a:lnRef idx="1">
+            <a:schemeClr val="accent1"/>
+          </a:lnRef>
+          <a:fillRef idx="0">
+            <a:schemeClr val="accent1"/>
+          </a:fillRef>
+          <a:effectRef idx="0">
+            <a:schemeClr val="accent1"/>
+          </a:effectRef>
+          <a:fontRef idx="minor">
+            <a:schemeClr val="tx1"/>
+          </a:fontRef>
+        </p:style>
+      </p:cxnSp>
+      <p:cxnSp>
+        <p:nvCxnSpPr>
+          <p:cNvPr id="98" name="直接连接符 97">
+            <a:extLst>
+              <a:ext uri="{FF2B5EF4-FFF2-40B4-BE49-F238E27FC236}">
+                <a16:creationId xmlns:a16="http://schemas.microsoft.com/office/drawing/2014/main" id="{1088C590-5975-EAF9-5112-2D0145D40965}"/>
+              </a:ext>
+            </a:extLst>
+          </p:cNvPr>
+          <p:cNvCxnSpPr>
+            <a:stCxn id="67" idx="2"/>
+            <a:endCxn id="50" idx="1"/>
+          </p:cNvCxnSpPr>
+          <p:nvPr/>
+        </p:nvCxnSpPr>
+        <p:spPr>
+          <a:xfrm flipV="1">
+            <a:off x="876691" y="1819236"/>
+            <a:ext cx="398155" cy="3121"/>
+          </a:xfrm>
+          <a:prstGeom prst="line">
+            <a:avLst/>
+          </a:prstGeom>
+          <a:ln w="19050">
+            <a:solidFill>
+              <a:schemeClr val="bg1">
+                <a:lumMod val="50000"/>
+              </a:schemeClr>
+            </a:solidFill>
+            <a:prstDash val="sysDash"/>
+            <a:tailEnd type="none"/>
+          </a:ln>
+        </p:spPr>
+        <p:style>
+          <a:lnRef idx="1">
+            <a:schemeClr val="accent1"/>
+          </a:lnRef>
+          <a:fillRef idx="0">
+            <a:schemeClr val="accent1"/>
+          </a:fillRef>
+          <a:effectRef idx="0">
+            <a:schemeClr val="accent1"/>
+          </a:effectRef>
+          <a:fontRef idx="minor">
+            <a:schemeClr val="tx1"/>
+          </a:fontRef>
+        </p:style>
+      </p:cxnSp>
+      <p:cxnSp>
+        <p:nvCxnSpPr>
+          <p:cNvPr id="99" name="直接连接符 98">
+            <a:extLst>
+              <a:ext uri="{FF2B5EF4-FFF2-40B4-BE49-F238E27FC236}">
+                <a16:creationId xmlns:a16="http://schemas.microsoft.com/office/drawing/2014/main" id="{788B5B0D-8905-A20C-5931-43675C4BBB9B}"/>
+              </a:ext>
+            </a:extLst>
+          </p:cNvPr>
+          <p:cNvCxnSpPr>
+            <a:cxnSpLocks/>
+            <a:stCxn id="43" idx="3"/>
+            <a:endCxn id="74" idx="5"/>
+          </p:cNvCxnSpPr>
+          <p:nvPr/>
+        </p:nvCxnSpPr>
+        <p:spPr>
+          <a:xfrm flipV="1">
+            <a:off x="7758113" y="1351163"/>
+            <a:ext cx="533806" cy="668"/>
+          </a:xfrm>
+          <a:prstGeom prst="line">
+            <a:avLst/>
+          </a:prstGeom>
+          <a:ln w="19050">
+            <a:solidFill>
+              <a:schemeClr val="bg1">
+                <a:lumMod val="50000"/>
+              </a:schemeClr>
+            </a:solidFill>
+            <a:prstDash val="sysDash"/>
+            <a:tailEnd type="none"/>
+          </a:ln>
+        </p:spPr>
+        <p:style>
+          <a:lnRef idx="1">
+            <a:schemeClr val="accent1"/>
+          </a:lnRef>
+          <a:fillRef idx="0">
+            <a:schemeClr val="accent1"/>
+          </a:fillRef>
+          <a:effectRef idx="0">
+            <a:schemeClr val="accent1"/>
+          </a:effectRef>
+          <a:fontRef idx="minor">
+            <a:schemeClr val="tx1"/>
+          </a:fontRef>
+        </p:style>
+      </p:cxnSp>
+      <p:cxnSp>
+        <p:nvCxnSpPr>
+          <p:cNvPr id="102" name="直接连接符 101">
+            <a:extLst>
+              <a:ext uri="{FF2B5EF4-FFF2-40B4-BE49-F238E27FC236}">
+                <a16:creationId xmlns:a16="http://schemas.microsoft.com/office/drawing/2014/main" id="{3CD55DDA-1F41-831E-FE34-CC885F32FB9D}"/>
+              </a:ext>
+            </a:extLst>
+          </p:cNvPr>
+          <p:cNvCxnSpPr>
+            <a:cxnSpLocks/>
+            <a:stCxn id="45" idx="3"/>
+            <a:endCxn id="71" idx="5"/>
+          </p:cNvCxnSpPr>
+          <p:nvPr/>
+        </p:nvCxnSpPr>
+        <p:spPr>
+          <a:xfrm>
+            <a:off x="7758113" y="2386395"/>
+            <a:ext cx="593489" cy="1527"/>
+          </a:xfrm>
+          <a:prstGeom prst="line">
+            <a:avLst/>
+          </a:prstGeom>
+          <a:ln w="19050">
+            <a:solidFill>
+              <a:schemeClr val="bg1">
+                <a:lumMod val="50000"/>
+              </a:schemeClr>
+            </a:solidFill>
+            <a:prstDash val="sysDash"/>
+            <a:tailEnd type="none"/>
+          </a:ln>
+        </p:spPr>
+        <p:style>
+          <a:lnRef idx="1">
+            <a:schemeClr val="accent1"/>
+          </a:lnRef>
+          <a:fillRef idx="0">
+            <a:schemeClr val="accent1"/>
+          </a:fillRef>
+          <a:effectRef idx="0">
+            <a:schemeClr val="accent1"/>
+          </a:effectRef>
+          <a:fontRef idx="minor">
+            <a:schemeClr val="tx1"/>
+          </a:fontRef>
+        </p:style>
+      </p:cxnSp>
+    </p:spTree>
+    <p:extLst>
+      <p:ext uri="{BB962C8B-B14F-4D97-AF65-F5344CB8AC3E}">
+        <p14:creationId xmlns:p14="http://schemas.microsoft.com/office/powerpoint/2010/main" val="1182252067"/>
+      </p:ext>
+    </p:extLst>
+  </p:cSld>
+  <p:clrMapOvr>
+    <a:masterClrMapping/>
+  </p:clrMapOvr>
+  <p:timing>
+    <p:tnLst>
+      <p:par>
+        <p:cTn id="1" dur="indefinite" restart="never" nodeType="tmRoot"/>
+      </p:par>
+    </p:tnLst>
+  </p:timing>
+</p:sld>
+</file>
+
+<file path=ppt/slides/slide8.xml><?xml version="1.0" encoding="utf-8"?>
+<p:sld xmlns:a="http://schemas.openxmlformats.org/drawingml/2006/main" xmlns:r="http://schemas.openxmlformats.org/officeDocument/2006/relationships" xmlns:p="http://schemas.openxmlformats.org/presentationml/2006/main">
+  <p:cSld>
+    <p:spTree>
+      <p:nvGrpSpPr>
+        <p:cNvPr id="1" name="Shape 91"/>
+        <p:cNvGrpSpPr/>
+        <p:nvPr/>
+      </p:nvGrpSpPr>
+      <p:grpSpPr>
+        <a:xfrm>
+          <a:off x="0" y="0"/>
+          <a:ext cx="0" cy="0"/>
+          <a:chOff x="0" y="0"/>
+          <a:chExt cx="0" cy="0"/>
+        </a:xfrm>
+      </p:grpSpPr>
+      <p:sp>
+        <p:nvSpPr>
           <p:cNvPr id="26" name="矩形 25">
             <a:extLst>
               <a:ext uri="{FF2B5EF4-FFF2-40B4-BE49-F238E27FC236}">
@@ -21638,7 +23183,7 @@
 </p:sld>
 </file>
 
-<file path=ppt/slides/slide8.xml><?xml version="1.0" encoding="utf-8"?>
+<file path=ppt/slides/slide9.xml><?xml version="1.0" encoding="utf-8"?>
 <p:sld xmlns:a="http://schemas.openxmlformats.org/drawingml/2006/main" xmlns:r="http://schemas.openxmlformats.org/officeDocument/2006/relationships" xmlns:p="http://schemas.openxmlformats.org/presentationml/2006/main">
   <p:cSld>
     <p:spTree>

</xml_diff>

<commit_message>
Deployed c6494962 with MkDocs version: 1.5.3
</commit_message>
<xml_diff>
--- a/img/Carla.pptx
+++ b/img/Carla.pptx
@@ -22,36 +22,36 @@
   <p:notesSz cx="9144000" cy="5143500"/>
   <p:embeddedFontLst>
     <p:embeddedFont>
-      <p:font typeface="Wingdings 2" panose="05020102010507070707" pitchFamily="18" charset="2"/>
+      <p:font typeface="Open Sans" panose="020B0604020202020204" charset="0"/>
       <p:regular r:id="rId12"/>
+      <p:bold r:id="rId13"/>
+      <p:italic r:id="rId14"/>
+      <p:boldItalic r:id="rId15"/>
     </p:embeddedFont>
     <p:embeddedFont>
-      <p:font typeface="Economica" panose="020B0604020202020204" charset="0"/>
-      <p:regular r:id="rId13"/>
-      <p:bold r:id="rId14"/>
-      <p:italic r:id="rId15"/>
-      <p:boldItalic r:id="rId16"/>
+      <p:font typeface="Wingdings 2" panose="05020102010507070707" pitchFamily="18" charset="2"/>
+      <p:regular r:id="rId16"/>
+    </p:embeddedFont>
+    <p:embeddedFont>
+      <p:font typeface="宋体" panose="02010600030101010101" pitchFamily="2" charset="-122"/>
+      <p:regular r:id="rId17"/>
+    </p:embeddedFont>
+    <p:embeddedFont>
+      <p:font typeface="Muli Regular" panose="020B0604020202020204" charset="0"/>
+      <p:regular r:id="rId18"/>
+      <p:bold r:id="rId19"/>
+      <p:italic r:id="rId20"/>
+      <p:boldItalic r:id="rId21"/>
     </p:embeddedFont>
     <p:embeddedFont>
       <p:font typeface="Muli" panose="020B0604020202020204" charset="0"/>
-      <p:regular r:id="rId17"/>
-      <p:bold r:id="rId18"/>
-      <p:italic r:id="rId19"/>
-      <p:boldItalic r:id="rId20"/>
-    </p:embeddedFont>
-    <p:embeddedFont>
-      <p:font typeface="宋体" panose="02010600030101010101" pitchFamily="2" charset="-122"/>
-      <p:regular r:id="rId21"/>
-    </p:embeddedFont>
-    <p:embeddedFont>
-      <p:font typeface="Open Sans" panose="020B0604020202020204" charset="0"/>
       <p:regular r:id="rId22"/>
       <p:bold r:id="rId23"/>
       <p:italic r:id="rId24"/>
       <p:boldItalic r:id="rId25"/>
     </p:embeddedFont>
     <p:embeddedFont>
-      <p:font typeface="Muli Regular" panose="020B0604020202020204" charset="0"/>
+      <p:font typeface="Economica" panose="020B0604020202020204" charset="0"/>
       <p:regular r:id="rId26"/>
       <p:bold r:id="rId27"/>
       <p:italic r:id="rId28"/>
@@ -303,7 +303,7 @@
       </p15:sldGuideLst>
     </p:ext>
     <p:ext uri="http://customooxmlschemas.google.com/">
-      <go:slidesCustomData xmlns:go="http://customooxmlschemas.google.com/" xmlns:p15="http://schemas.microsoft.com/office/powerpoint/2012/main" xmlns:p14="http://schemas.microsoft.com/office/powerpoint/2010/main" xmlns:com="http://schemas.openxmlformats.org/drawingml/2006/compatibility" xmlns:pvml="urn:schemas-microsoft-com:office:powerpoint" xmlns:v="urn:schemas-microsoft-com:vml" xmlns:o="urn:schemas-microsoft-com:office:office" xmlns:dgm="http://schemas.openxmlformats.org/drawingml/2006/diagram" xmlns:c="http://schemas.openxmlformats.org/drawingml/2006/chart" xmlns:mv="urn:schemas-microsoft-com:mac:vml" xmlns:mc="http://schemas.openxmlformats.org/markup-compatibility/2006" xmlns="" r:id="rId66" roundtripDataSignature="AMtx7mjk7ddpjVrAQkfiI2o1sWSlPxIqDQ=="/>
+      <go:slidesCustomData xmlns="" xmlns:mc="http://schemas.openxmlformats.org/markup-compatibility/2006" xmlns:mv="urn:schemas-microsoft-com:mac:vml" xmlns:c="http://schemas.openxmlformats.org/drawingml/2006/chart" xmlns:dgm="http://schemas.openxmlformats.org/drawingml/2006/diagram" xmlns:o="urn:schemas-microsoft-com:office:office" xmlns:v="urn:schemas-microsoft-com:vml" xmlns:pvml="urn:schemas-microsoft-com:office:powerpoint" xmlns:com="http://schemas.openxmlformats.org/drawingml/2006/compatibility" xmlns:p14="http://schemas.microsoft.com/office/powerpoint/2010/main" xmlns:p15="http://schemas.microsoft.com/office/powerpoint/2012/main" xmlns:go="http://customooxmlschemas.google.com/" r:id="rId66" roundtripDataSignature="AMtx7mjk7ddpjVrAQkfiI2o1sWSlPxIqDQ=="/>
     </p:ext>
   </p:extLst>
 </p:presentation>
@@ -1703,11 +1703,6 @@
               </a:rPr>
               <a:t>file_specification_build_tools</a:t>
             </a:r>
-            <a:endParaRPr lang="en-US" smtClean="0">
-              <a:solidFill>
-                <a:srgbClr val="39373D"/>
-              </a:solidFill>
-            </a:endParaRPr>
           </a:p>
           <a:p>
             <a:pPr marL="0" lvl="0" indent="0" algn="l" rtl="0">
@@ -13291,15 +13286,7 @@
                   <a:schemeClr val="tx1"/>
                 </a:solidFill>
               </a:rPr>
-              <a:t>L</a:t>
-            </a:r>
-            <a:r>
-              <a:rPr lang="en-US" altLang="zh-CN" b="1" smtClean="0">
-                <a:solidFill>
-                  <a:schemeClr val="tx1"/>
-                </a:solidFill>
-              </a:rPr>
-              <a:t>ibCarla </a:t>
+              <a:t>LibCarla </a:t>
             </a:r>
             <a:r>
               <a:rPr lang="zh-CN" altLang="en-US" b="1">
@@ -13491,15 +13478,7 @@
                   <a:schemeClr val="tx1"/>
                 </a:solidFill>
               </a:rPr>
-              <a:t>L</a:t>
-            </a:r>
-            <a:r>
-              <a:rPr lang="en-US" altLang="zh-CN" b="1" smtClean="0">
-                <a:solidFill>
-                  <a:schemeClr val="tx1"/>
-                </a:solidFill>
-              </a:rPr>
-              <a:t>ibCarla </a:t>
+              <a:t>LibCarla </a:t>
             </a:r>
             <a:r>
               <a:rPr lang="zh-CN" altLang="en-US" b="1">
@@ -14430,7 +14409,7 @@
         <p:spPr>
           <a:xfrm>
             <a:off x="7605722" y="3197190"/>
-            <a:ext cx="1349794" cy="398617"/>
+            <a:ext cx="1430702" cy="398617"/>
           </a:xfrm>
           <a:prstGeom prst="rect">
             <a:avLst/>
@@ -14464,14 +14443,14 @@
           <a:p>
             <a:pPr algn="ctr"/>
             <a:r>
-              <a:rPr lang="en-US" altLang="zh-CN" sz="1200" b="1" smtClean="0">
+              <a:rPr lang="en-US" altLang="zh-CN" sz="1200" b="1">
                 <a:solidFill>
                   <a:schemeClr val="bg1">
                     <a:lumMod val="50000"/>
                   </a:schemeClr>
                 </a:solidFill>
               </a:rPr>
-              <a:t>LibCarla/source/carla/*</a:t>
+              <a:t>Unreal/CarlaUE4/Plugins/Carla/Source/Carla/Game/CarlaEngine.cpp</a:t>
             </a:r>
             <a:endParaRPr lang="zh-CN" altLang="en-US" sz="1200" b="1">
               <a:solidFill>
@@ -14657,7 +14636,15 @@
                   </a:schemeClr>
                 </a:solidFill>
               </a:rPr>
-              <a:t>LibCarla/source/Carla/client</a:t>
+              <a:t>LibCarla/source/Carla/</a:t>
+            </a:r>
+            <a:r>
+              <a:rPr lang="en-US" altLang="zh-CN" sz="1200" b="1" smtClean="0">
+                <a:solidFill>
+                  <a:schemeClr val="tx1"/>
+                </a:solidFill>
+              </a:rPr>
+              <a:t>client</a:t>
             </a:r>
             <a:r>
               <a:rPr lang="en-US" altLang="zh-CN" sz="1200" b="1">
@@ -14963,19 +14950,7 @@
                 <a:cs typeface="Muli"/>
                 <a:sym typeface="Muli"/>
               </a:rPr>
-              <a:t>程序</a:t>
-            </a:r>
-            <a:r>
-              <a:rPr lang="zh-CN" altLang="en-US" sz="2400" b="1">
-                <a:solidFill>
-                  <a:srgbClr val="39373D"/>
-                </a:solidFill>
-                <a:latin typeface="Muli"/>
-                <a:ea typeface="Muli"/>
-                <a:cs typeface="Muli"/>
-                <a:sym typeface="Muli"/>
-              </a:rPr>
-              <a:t>调用</a:t>
+              <a:t>程序调用</a:t>
             </a:r>
             <a:r>
               <a:rPr lang="zh-CN" altLang="en-US" sz="2400" b="1" smtClean="0">
@@ -14997,6 +14972,96 @@
               <a:ea typeface="Muli"/>
               <a:cs typeface="Muli"/>
               <a:sym typeface="Muli"/>
+            </a:endParaRPr>
+          </a:p>
+        </p:txBody>
+      </p:sp>
+      <p:sp>
+        <p:nvSpPr>
+          <p:cNvPr id="39" name="矩形 38"/>
+          <p:cNvSpPr/>
+          <p:nvPr/>
+        </p:nvSpPr>
+        <p:spPr>
+          <a:xfrm>
+            <a:off x="633225" y="4050568"/>
+            <a:ext cx="1835610" cy="305652"/>
+          </a:xfrm>
+          <a:prstGeom prst="rect">
+            <a:avLst/>
+          </a:prstGeom>
+          <a:solidFill>
+            <a:schemeClr val="bg1"/>
+          </a:solidFill>
+          <a:ln>
+            <a:noFill/>
+          </a:ln>
+        </p:spPr>
+        <p:style>
+          <a:lnRef idx="2">
+            <a:schemeClr val="accent1">
+              <a:shade val="50000"/>
+            </a:schemeClr>
+          </a:lnRef>
+          <a:fillRef idx="1">
+            <a:schemeClr val="accent1"/>
+          </a:fillRef>
+          <a:effectRef idx="0">
+            <a:schemeClr val="accent1"/>
+          </a:effectRef>
+          <a:fontRef idx="minor">
+            <a:schemeClr val="lt1"/>
+          </a:fontRef>
+        </p:style>
+        <p:txBody>
+          <a:bodyPr rtlCol="0" anchor="ctr"/>
+          <a:lstStyle/>
+          <a:p>
+            <a:pPr algn="ctr"/>
+            <a:r>
+              <a:rPr lang="en-US" altLang="zh-CN" sz="1200" b="1" smtClean="0">
+                <a:solidFill>
+                  <a:schemeClr val="bg1">
+                    <a:lumMod val="50000"/>
+                  </a:schemeClr>
+                </a:solidFill>
+              </a:rPr>
+              <a:t>LibCarla/source/Carla/</a:t>
+            </a:r>
+            <a:r>
+              <a:rPr lang="en-US" altLang="zh-CN" sz="1200" b="1" smtClean="0">
+                <a:solidFill>
+                  <a:schemeClr val="tx1"/>
+                </a:solidFill>
+              </a:rPr>
+              <a:t>rpc</a:t>
+            </a:r>
+            <a:r>
+              <a:rPr lang="en-US" altLang="zh-CN" sz="1200" b="1" smtClean="0">
+                <a:solidFill>
+                  <a:schemeClr val="bg1">
+                    <a:lumMod val="50000"/>
+                  </a:schemeClr>
+                </a:solidFill>
+              </a:rPr>
+              <a:t>/*.</a:t>
+            </a:r>
+            <a:r>
+              <a:rPr lang="en-US" altLang="zh-CN" sz="1200" b="1">
+                <a:solidFill>
+                  <a:schemeClr val="bg1">
+                    <a:lumMod val="50000"/>
+                  </a:schemeClr>
+                </a:solidFill>
+              </a:rPr>
+              <a:t>cpp</a:t>
+            </a:r>
+            <a:endParaRPr lang="zh-CN" altLang="en-US" sz="1200" b="1">
+              <a:solidFill>
+                <a:schemeClr val="bg1">
+                  <a:lumMod val="50000"/>
+                </a:schemeClr>
+              </a:solidFill>
             </a:endParaRPr>
           </a:p>
         </p:txBody>

</xml_diff>